<commit_message>
Final PDR and presentation updates
</commit_message>
<xml_diff>
--- a/Presentation/SnapSat PDR Presentation.pptx
+++ b/Presentation/SnapSat PDR Presentation.pptx
@@ -5,7 +5,7 @@
     <p:sldMasterId id="2147483660" r:id="rId1"/>
   </p:sldMasterIdLst>
   <p:notesMasterIdLst>
-    <p:notesMasterId r:id="rId17"/>
+    <p:notesMasterId r:id="rId20"/>
   </p:notesMasterIdLst>
   <p:sldIdLst>
     <p:sldId id="256" r:id="rId2"/>
@@ -14,15 +14,18 @@
     <p:sldId id="271" r:id="rId5"/>
     <p:sldId id="259" r:id="rId6"/>
     <p:sldId id="260" r:id="rId7"/>
-    <p:sldId id="268" r:id="rId8"/>
-    <p:sldId id="261" r:id="rId9"/>
-    <p:sldId id="262" r:id="rId10"/>
-    <p:sldId id="263" r:id="rId11"/>
-    <p:sldId id="264" r:id="rId12"/>
-    <p:sldId id="265" r:id="rId13"/>
-    <p:sldId id="267" r:id="rId14"/>
-    <p:sldId id="266" r:id="rId15"/>
-    <p:sldId id="270" r:id="rId16"/>
+    <p:sldId id="272" r:id="rId8"/>
+    <p:sldId id="273" r:id="rId9"/>
+    <p:sldId id="261" r:id="rId10"/>
+    <p:sldId id="262" r:id="rId11"/>
+    <p:sldId id="274" r:id="rId12"/>
+    <p:sldId id="263" r:id="rId13"/>
+    <p:sldId id="264" r:id="rId14"/>
+    <p:sldId id="265" r:id="rId15"/>
+    <p:sldId id="267" r:id="rId16"/>
+    <p:sldId id="266" r:id="rId17"/>
+    <p:sldId id="275" r:id="rId18"/>
+    <p:sldId id="270" r:id="rId19"/>
   </p:sldIdLst>
   <p:sldSz cx="9144000" cy="6858000" type="screen4x3"/>
   <p:notesSz cx="6858000" cy="9144000"/>
@@ -211,7 +214,7 @@
           <a:p>
             <a:fld id="{368BEC02-127C-4DF1-91B2-69F3EE66D6CF}" type="datetimeFigureOut">
               <a:rPr lang="en-AU" smtClean="0"/>
-              <a:t>23/08/2015</a:t>
+              <a:t>24/08/2015</a:t>
             </a:fld>
             <a:endParaRPr lang="en-AU"/>
           </a:p>
@@ -1108,7 +1111,7 @@
           <a:p>
             <a:fld id="{EE3D259A-0B22-4204-B86E-533FB56D31D0}" type="slidenum">
               <a:rPr lang="en-AU" smtClean="0"/>
-              <a:t>11</a:t>
+              <a:t>13</a:t>
             </a:fld>
             <a:endParaRPr lang="en-AU"/>
           </a:p>
@@ -1240,7 +1243,7 @@
           <a:p>
             <a:fld id="{EE3D259A-0B22-4204-B86E-533FB56D31D0}" type="slidenum">
               <a:rPr lang="en-AU" smtClean="0"/>
-              <a:t>13</a:t>
+              <a:t>15</a:t>
             </a:fld>
             <a:endParaRPr lang="en-AU"/>
           </a:p>
@@ -1449,7 +1452,7 @@
           <a:p>
             <a:fld id="{A19870C3-D5D5-44E4-ADD6-CAA6571321B0}" type="datetimeFigureOut">
               <a:rPr lang="en-AU" smtClean="0"/>
-              <a:t>23/08/2015</a:t>
+              <a:t>24/08/2015</a:t>
             </a:fld>
             <a:endParaRPr lang="en-AU"/>
           </a:p>
@@ -1626,7 +1629,7 @@
           <a:p>
             <a:fld id="{A19870C3-D5D5-44E4-ADD6-CAA6571321B0}" type="datetimeFigureOut">
               <a:rPr lang="en-AU" smtClean="0"/>
-              <a:t>23/08/2015</a:t>
+              <a:t>24/08/2015</a:t>
             </a:fld>
             <a:endParaRPr lang="en-AU"/>
           </a:p>
@@ -1806,7 +1809,7 @@
           <a:p>
             <a:fld id="{A19870C3-D5D5-44E4-ADD6-CAA6571321B0}" type="datetimeFigureOut">
               <a:rPr lang="en-AU" smtClean="0"/>
-              <a:t>23/08/2015</a:t>
+              <a:t>24/08/2015</a:t>
             </a:fld>
             <a:endParaRPr lang="en-AU"/>
           </a:p>
@@ -1999,7 +2002,7 @@
             <a:fld id="{BBC7A9B0-89D2-465A-AF0A-443056999F2B}" type="datetime3">
               <a:rPr lang="en-AU" smtClean="0"/>
               <a:pPr/>
-              <a:t>23 August, 2015</a:t>
+              <a:t>24 August, 2015</a:t>
             </a:fld>
             <a:endParaRPr lang="en-AU" dirty="0"/>
           </a:p>
@@ -2442,7 +2445,7 @@
           <a:p>
             <a:fld id="{A19870C3-D5D5-44E4-ADD6-CAA6571321B0}" type="datetimeFigureOut">
               <a:rPr lang="en-AU" smtClean="0"/>
-              <a:t>23/08/2015</a:t>
+              <a:t>24/08/2015</a:t>
             </a:fld>
             <a:endParaRPr lang="en-AU"/>
           </a:p>
@@ -2694,7 +2697,7 @@
           <a:p>
             <a:fld id="{A19870C3-D5D5-44E4-ADD6-CAA6571321B0}" type="datetimeFigureOut">
               <a:rPr lang="en-AU" smtClean="0"/>
-              <a:t>23/08/2015</a:t>
+              <a:t>24/08/2015</a:t>
             </a:fld>
             <a:endParaRPr lang="en-AU"/>
           </a:p>
@@ -3180,7 +3183,7 @@
           <a:p>
             <a:fld id="{A19870C3-D5D5-44E4-ADD6-CAA6571321B0}" type="datetimeFigureOut">
               <a:rPr lang="en-AU" smtClean="0"/>
-              <a:t>23/08/2015</a:t>
+              <a:t>24/08/2015</a:t>
             </a:fld>
             <a:endParaRPr lang="en-AU"/>
           </a:p>
@@ -3430,7 +3433,7 @@
           <a:p>
             <a:fld id="{A19870C3-D5D5-44E4-ADD6-CAA6571321B0}" type="datetimeFigureOut">
               <a:rPr lang="en-AU" smtClean="0"/>
-              <a:t>23/08/2015</a:t>
+              <a:t>24/08/2015</a:t>
             </a:fld>
             <a:endParaRPr lang="en-AU"/>
           </a:p>
@@ -3637,7 +3640,7 @@
           <a:p>
             <a:fld id="{A19870C3-D5D5-44E4-ADD6-CAA6571321B0}" type="datetimeFigureOut">
               <a:rPr lang="en-AU" smtClean="0"/>
-              <a:t>23/08/2015</a:t>
+              <a:t>24/08/2015</a:t>
             </a:fld>
             <a:endParaRPr lang="en-AU"/>
           </a:p>
@@ -3921,7 +3924,7 @@
           <a:p>
             <a:fld id="{A19870C3-D5D5-44E4-ADD6-CAA6571321B0}" type="datetimeFigureOut">
               <a:rPr lang="en-AU" smtClean="0"/>
-              <a:t>23/08/2015</a:t>
+              <a:t>24/08/2015</a:t>
             </a:fld>
             <a:endParaRPr lang="en-AU"/>
           </a:p>
@@ -4185,7 +4188,7 @@
           <a:p>
             <a:fld id="{A19870C3-D5D5-44E4-ADD6-CAA6571321B0}" type="datetimeFigureOut">
               <a:rPr lang="en-AU" smtClean="0"/>
-              <a:t>23/08/2015</a:t>
+              <a:t>24/08/2015</a:t>
             </a:fld>
             <a:endParaRPr lang="en-AU"/>
           </a:p>
@@ -4406,7 +4409,7 @@
             <a:fld id="{70820FD3-10FA-474E-9B19-1F83AA45001E}" type="datetime3">
               <a:rPr lang="en-AU" smtClean="0"/>
               <a:pPr/>
-              <a:t>23 August, 2015</a:t>
+              <a:t>24 August, 2015</a:t>
             </a:fld>
             <a:endParaRPr lang="en-AU" dirty="0"/>
           </a:p>
@@ -4980,7 +4983,7 @@
           <a:p>
             <a:r>
               <a:rPr lang="en-AU" dirty="0" smtClean="0"/>
-              <a:t>System Budgets</a:t>
+              <a:t>Design Considerations</a:t>
             </a:r>
             <a:endParaRPr lang="en-AU" dirty="0"/>
           </a:p>
@@ -4988,12 +4991,12 @@
       </p:sp>
       <p:sp>
         <p:nvSpPr>
-          <p:cNvPr id="3" name="Text Placeholder 2"/>
-          <p:cNvSpPr>
-            <a:spLocks noGrp="1"/>
-          </p:cNvSpPr>
-          <p:nvPr>
-            <p:ph type="body" idx="1"/>
+          <p:cNvPr id="3" name="Content Placeholder 2"/>
+          <p:cNvSpPr>
+            <a:spLocks noGrp="1"/>
+          </p:cNvSpPr>
+          <p:nvPr>
+            <p:ph sz="half" idx="1"/>
           </p:nvPr>
         </p:nvSpPr>
         <p:spPr/>
@@ -5003,16 +5006,190 @@
           <a:p>
             <a:r>
               <a:rPr lang="en-AU" dirty="0" smtClean="0"/>
-              <a:t>Power, Data and Mass Considerations</a:t>
+              <a:t>(include picture of deployed solar panels also?)</a:t>
             </a:r>
             <a:endParaRPr lang="en-AU" dirty="0"/>
+          </a:p>
+        </p:txBody>
+      </p:sp>
+      <p:pic>
+        <p:nvPicPr>
+          <p:cNvPr id="5" name="Content Placeholder 4"/>
+          <p:cNvPicPr>
+            <a:picLocks noGrp="1" noChangeAspect="1"/>
+          </p:cNvPicPr>
+          <p:nvPr>
+            <p:ph sz="half" idx="2"/>
+          </p:nvPr>
+        </p:nvPicPr>
+        <p:blipFill rotWithShape="1">
+          <a:blip r:embed="rId2" cstate="print">
+            <a:extLst>
+              <a:ext uri="{28A0092B-C50C-407E-A947-70E740481C1C}">
+                <a14:useLocalDpi xmlns:a14="http://schemas.microsoft.com/office/drawing/2010/main" val="0"/>
+              </a:ext>
+            </a:extLst>
+          </a:blip>
+          <a:srcRect l="30126" r="19902"/>
+          <a:stretch/>
+        </p:blipFill>
+        <p:spPr>
+          <a:xfrm>
+            <a:off x="4641668" y="1288869"/>
+            <a:ext cx="4190866" cy="4798422"/>
+          </a:xfrm>
+          <a:prstGeom prst="roundRect">
+            <a:avLst>
+              <a:gd name="adj" fmla="val 2542"/>
+            </a:avLst>
+          </a:prstGeom>
+          <a:solidFill>
+            <a:srgbClr val="FFFFFF">
+              <a:shade val="85000"/>
+            </a:srgbClr>
+          </a:solidFill>
+          <a:ln>
+            <a:noFill/>
+          </a:ln>
+          <a:effectLst/>
+        </p:spPr>
+      </p:pic>
+      <p:sp>
+        <p:nvSpPr>
+          <p:cNvPr id="6" name="Date Placeholder 3"/>
+          <p:cNvSpPr>
+            <a:spLocks noGrp="1"/>
+          </p:cNvSpPr>
+          <p:nvPr>
+            <p:ph type="dt" sz="half" idx="10"/>
+          </p:nvPr>
+        </p:nvSpPr>
+        <p:spPr>
+          <a:xfrm>
+            <a:off x="628650" y="6356351"/>
+            <a:ext cx="2057400" cy="365125"/>
+          </a:xfrm>
+        </p:spPr>
+        <p:txBody>
+          <a:bodyPr/>
+          <a:lstStyle>
+            <a:lvl1pPr>
+              <a:defRPr>
+                <a:solidFill>
+                  <a:schemeClr val="accent4">
+                    <a:lumMod val="75000"/>
+                  </a:schemeClr>
+                </a:solidFill>
+              </a:defRPr>
+            </a:lvl1pPr>
+          </a:lstStyle>
+          <a:p>
+            <a:r>
+              <a:rPr lang="en-AU" dirty="0" smtClean="0">
+                <a:latin typeface="+mj-lt"/>
+              </a:rPr>
+              <a:t>Tuesday 24 August 2015</a:t>
+            </a:r>
+            <a:endParaRPr lang="en-AU" dirty="0">
+              <a:latin typeface="+mj-lt"/>
+            </a:endParaRPr>
+          </a:p>
+        </p:txBody>
+      </p:sp>
+      <p:sp>
+        <p:nvSpPr>
+          <p:cNvPr id="7" name="Footer Placeholder 4"/>
+          <p:cNvSpPr>
+            <a:spLocks noGrp="1"/>
+          </p:cNvSpPr>
+          <p:nvPr>
+            <p:ph type="ftr" sz="quarter" idx="11"/>
+          </p:nvPr>
+        </p:nvSpPr>
+        <p:spPr>
+          <a:xfrm>
+            <a:off x="3028950" y="6356351"/>
+            <a:ext cx="3086100" cy="365125"/>
+          </a:xfrm>
+        </p:spPr>
+        <p:txBody>
+          <a:bodyPr/>
+          <a:lstStyle>
+            <a:lvl1pPr>
+              <a:defRPr lang="en-AU" sz="1200" kern="1200" dirty="0" smtClean="0">
+                <a:solidFill>
+                  <a:schemeClr val="accent4">
+                    <a:lumMod val="75000"/>
+                  </a:schemeClr>
+                </a:solidFill>
+                <a:latin typeface="+mn-lt"/>
+                <a:ea typeface="+mn-ea"/>
+                <a:cs typeface="+mn-cs"/>
+              </a:defRPr>
+            </a:lvl1pPr>
+          </a:lstStyle>
+          <a:p>
+            <a:r>
+              <a:rPr lang="en-AU" dirty="0" smtClean="0">
+                <a:latin typeface="+mj-lt"/>
+              </a:rPr>
+              <a:t>SnapSat Preliminary Design Presentation</a:t>
+            </a:r>
+            <a:endParaRPr lang="en-AU" dirty="0">
+              <a:latin typeface="+mj-lt"/>
+            </a:endParaRPr>
+          </a:p>
+        </p:txBody>
+      </p:sp>
+      <p:sp>
+        <p:nvSpPr>
+          <p:cNvPr id="8" name="Slide Number Placeholder 5"/>
+          <p:cNvSpPr>
+            <a:spLocks noGrp="1"/>
+          </p:cNvSpPr>
+          <p:nvPr>
+            <p:ph type="sldNum" sz="quarter" idx="12"/>
+          </p:nvPr>
+        </p:nvSpPr>
+        <p:spPr>
+          <a:xfrm>
+            <a:off x="6457950" y="6356351"/>
+            <a:ext cx="2057400" cy="365125"/>
+          </a:xfrm>
+        </p:spPr>
+        <p:txBody>
+          <a:bodyPr/>
+          <a:lstStyle>
+            <a:lvl1pPr>
+              <a:defRPr lang="en-AU" sz="1200" kern="1200" smtClean="0">
+                <a:solidFill>
+                  <a:schemeClr val="accent4">
+                    <a:lumMod val="75000"/>
+                  </a:schemeClr>
+                </a:solidFill>
+                <a:latin typeface="+mn-lt"/>
+                <a:ea typeface="+mn-ea"/>
+                <a:cs typeface="+mn-cs"/>
+              </a:defRPr>
+            </a:lvl1pPr>
+          </a:lstStyle>
+          <a:p>
+            <a:fld id="{6C5E801A-27FC-4E4C-A43C-DCD3D3677F04}" type="slidenum">
+              <a:rPr lang="en-AU" smtClean="0">
+                <a:latin typeface="+mj-lt"/>
+              </a:rPr>
+              <a:t>10</a:t>
+            </a:fld>
+            <a:endParaRPr lang="en-AU" dirty="0">
+              <a:latin typeface="+mj-lt"/>
+            </a:endParaRPr>
           </a:p>
         </p:txBody>
       </p:sp>
     </p:spTree>
     <p:extLst>
       <p:ext uri="{BB962C8B-B14F-4D97-AF65-F5344CB8AC3E}">
-        <p14:creationId xmlns:p14="http://schemas.microsoft.com/office/powerpoint/2010/main" val="1921610032"/>
+        <p14:creationId xmlns:p14="http://schemas.microsoft.com/office/powerpoint/2010/main" val="1456499067"/>
       </p:ext>
     </p:extLst>
   </p:cSld>
@@ -5063,6 +5240,161 @@
           <a:p>
             <a:r>
               <a:rPr lang="en-AU" dirty="0" smtClean="0"/>
+              <a:t>Simulation</a:t>
+            </a:r>
+            <a:endParaRPr lang="en-AU" dirty="0"/>
+          </a:p>
+        </p:txBody>
+      </p:sp>
+      <p:sp>
+        <p:nvSpPr>
+          <p:cNvPr id="3" name="Content Placeholder 2"/>
+          <p:cNvSpPr>
+            <a:spLocks noGrp="1"/>
+          </p:cNvSpPr>
+          <p:nvPr>
+            <p:ph idx="1"/>
+          </p:nvPr>
+        </p:nvSpPr>
+        <p:spPr/>
+        <p:txBody>
+          <a:bodyPr/>
+          <a:lstStyle/>
+          <a:p>
+            <a:endParaRPr lang="en-AU"/>
+          </a:p>
+        </p:txBody>
+      </p:sp>
+    </p:spTree>
+    <p:extLst>
+      <p:ext uri="{BB962C8B-B14F-4D97-AF65-F5344CB8AC3E}">
+        <p14:creationId xmlns:p14="http://schemas.microsoft.com/office/powerpoint/2010/main" val="2685337617"/>
+      </p:ext>
+    </p:extLst>
+  </p:cSld>
+  <p:clrMapOvr>
+    <a:masterClrMapping/>
+  </p:clrMapOvr>
+</p:sld>
+</file>
+
+<file path=ppt/slides/slide12.xml><?xml version="1.0" encoding="utf-8"?>
+<p:sld xmlns:a="http://schemas.openxmlformats.org/drawingml/2006/main" xmlns:r="http://schemas.openxmlformats.org/officeDocument/2006/relationships" xmlns:p="http://schemas.openxmlformats.org/presentationml/2006/main">
+  <p:cSld>
+    <p:spTree>
+      <p:nvGrpSpPr>
+        <p:cNvPr id="1" name=""/>
+        <p:cNvGrpSpPr/>
+        <p:nvPr/>
+      </p:nvGrpSpPr>
+      <p:grpSpPr>
+        <a:xfrm>
+          <a:off x="0" y="0"/>
+          <a:ext cx="0" cy="0"/>
+          <a:chOff x="0" y="0"/>
+          <a:chExt cx="0" cy="0"/>
+        </a:xfrm>
+      </p:grpSpPr>
+      <p:sp>
+        <p:nvSpPr>
+          <p:cNvPr id="2" name="Title 1"/>
+          <p:cNvSpPr>
+            <a:spLocks noGrp="1"/>
+          </p:cNvSpPr>
+          <p:nvPr>
+            <p:ph type="title"/>
+          </p:nvPr>
+        </p:nvSpPr>
+        <p:spPr/>
+        <p:txBody>
+          <a:bodyPr/>
+          <a:lstStyle/>
+          <a:p>
+            <a:r>
+              <a:rPr lang="en-AU" dirty="0" smtClean="0"/>
+              <a:t>System Budgets</a:t>
+            </a:r>
+            <a:endParaRPr lang="en-AU" dirty="0"/>
+          </a:p>
+        </p:txBody>
+      </p:sp>
+      <p:sp>
+        <p:nvSpPr>
+          <p:cNvPr id="3" name="Text Placeholder 2"/>
+          <p:cNvSpPr>
+            <a:spLocks noGrp="1"/>
+          </p:cNvSpPr>
+          <p:nvPr>
+            <p:ph type="body" idx="1"/>
+          </p:nvPr>
+        </p:nvSpPr>
+        <p:spPr/>
+        <p:txBody>
+          <a:bodyPr/>
+          <a:lstStyle/>
+          <a:p>
+            <a:r>
+              <a:rPr lang="en-AU" dirty="0" smtClean="0"/>
+              <a:t>Power, Data and Mass Considerations</a:t>
+            </a:r>
+            <a:endParaRPr lang="en-AU" dirty="0"/>
+          </a:p>
+        </p:txBody>
+      </p:sp>
+    </p:spTree>
+    <p:extLst>
+      <p:ext uri="{BB962C8B-B14F-4D97-AF65-F5344CB8AC3E}">
+        <p14:creationId xmlns:p14="http://schemas.microsoft.com/office/powerpoint/2010/main" val="1921610032"/>
+      </p:ext>
+    </p:extLst>
+  </p:cSld>
+  <p:clrMapOvr>
+    <a:masterClrMapping/>
+  </p:clrMapOvr>
+  <p:timing>
+    <p:tnLst>
+      <p:par>
+        <p:cTn id="1" dur="indefinite" restart="never" nodeType="tmRoot"/>
+      </p:par>
+    </p:tnLst>
+  </p:timing>
+</p:sld>
+</file>
+
+<file path=ppt/slides/slide13.xml><?xml version="1.0" encoding="utf-8"?>
+<p:sld xmlns:a="http://schemas.openxmlformats.org/drawingml/2006/main" xmlns:r="http://schemas.openxmlformats.org/officeDocument/2006/relationships" xmlns:p="http://schemas.openxmlformats.org/presentationml/2006/main">
+  <p:cSld>
+    <p:spTree>
+      <p:nvGrpSpPr>
+        <p:cNvPr id="1" name=""/>
+        <p:cNvGrpSpPr/>
+        <p:nvPr/>
+      </p:nvGrpSpPr>
+      <p:grpSpPr>
+        <a:xfrm>
+          <a:off x="0" y="0"/>
+          <a:ext cx="0" cy="0"/>
+          <a:chOff x="0" y="0"/>
+          <a:chExt cx="0" cy="0"/>
+        </a:xfrm>
+      </p:grpSpPr>
+      <p:sp>
+        <p:nvSpPr>
+          <p:cNvPr id="2" name="Title 1"/>
+          <p:cNvSpPr>
+            <a:spLocks noGrp="1"/>
+          </p:cNvSpPr>
+          <p:nvPr>
+            <p:ph type="title"/>
+          </p:nvPr>
+        </p:nvSpPr>
+        <p:spPr/>
+        <p:txBody>
+          <a:bodyPr/>
+          <a:lstStyle/>
+          <a:p>
+            <a:r>
+              <a:rPr lang="en-AU" dirty="0" smtClean="0"/>
               <a:t>Mass Budget</a:t>
             </a:r>
             <a:endParaRPr lang="en-AU" dirty="0"/>
@@ -5079,7 +5411,7 @@
             <p:ph idx="1"/>
             <p:extLst>
               <p:ext uri="{D42A27DB-BD31-4B8C-83A1-F6EECF244321}">
-                <p14:modId xmlns:p14="http://schemas.microsoft.com/office/powerpoint/2010/main" val="424011039"/>
+                <p14:modId xmlns:p14="http://schemas.microsoft.com/office/powerpoint/2010/main" val="3709133905"/>
               </p:ext>
             </p:extLst>
           </p:nvPr>
@@ -5206,12 +5538,24 @@
                         <a:rPr lang="en-AU" sz="1600" dirty="0" smtClean="0"/>
                       </a:br>
                       <a:r>
-                        <a:rPr lang="en-AU" sz="1600" dirty="0" smtClean="0"/>
+                        <a:rPr lang="en-AU" sz="1600" dirty="0" smtClean="0">
+                          <a:solidFill>
+                            <a:srgbClr val="FF0000"/>
+                          </a:solidFill>
+                        </a:rPr>
                         <a:t>Solar</a:t>
                       </a:r>
                       <a:r>
+                        <a:rPr lang="en-AU" sz="1600" baseline="0" dirty="0" smtClean="0">
+                          <a:solidFill>
+                            <a:srgbClr val="FF0000"/>
+                          </a:solidFill>
+                        </a:rPr>
+                        <a:t> Panels – Australian </a:t>
+                      </a:r>
+                      <a:r>
                         <a:rPr lang="en-AU" sz="1600" baseline="0" dirty="0" smtClean="0"/>
-                        <a:t> Panels – Australian Robotics</a:t>
+                        <a:t>Robotics</a:t>
                       </a:r>
                       <a:endParaRPr lang="en-AU" sz="1600" dirty="0"/>
                     </a:p>
@@ -5629,10 +5973,18 @@
                     <a:lstStyle/>
                     <a:p>
                       <a:r>
-                        <a:rPr lang="en-AU" sz="1600" dirty="0" smtClean="0"/>
+                        <a:rPr lang="en-AU" sz="1600" dirty="0" smtClean="0">
+                          <a:solidFill>
+                            <a:srgbClr val="FF0000"/>
+                          </a:solidFill>
+                        </a:rPr>
                         <a:t>Payload</a:t>
                       </a:r>
-                      <a:endParaRPr lang="en-AU" sz="1600" dirty="0"/>
+                      <a:endParaRPr lang="en-AU" sz="1600" dirty="0">
+                        <a:solidFill>
+                          <a:srgbClr val="FF0000"/>
+                        </a:solidFill>
+                      </a:endParaRPr>
                     </a:p>
                   </a:txBody>
                   <a:tcPr anchor="ctr"/>
@@ -5643,10 +5995,18 @@
                     <a:lstStyle/>
                     <a:p>
                       <a:r>
-                        <a:rPr lang="en-AU" sz="1600" dirty="0" err="1" smtClean="0"/>
+                        <a:rPr lang="en-AU" sz="1600" dirty="0" err="1" smtClean="0">
+                          <a:solidFill>
+                            <a:srgbClr val="FF0000"/>
+                          </a:solidFill>
+                        </a:rPr>
                         <a:t>Arducam</a:t>
                       </a:r>
-                      <a:endParaRPr lang="en-AU" sz="1600" dirty="0"/>
+                      <a:endParaRPr lang="en-AU" sz="1600" dirty="0">
+                        <a:solidFill>
+                          <a:srgbClr val="FF0000"/>
+                        </a:solidFill>
+                      </a:endParaRPr>
                     </a:p>
                   </a:txBody>
                   <a:tcPr/>
@@ -5870,7 +6230,7 @@
               <a:rPr lang="en-AU" smtClean="0">
                 <a:latin typeface="+mj-lt"/>
               </a:rPr>
-              <a:t>11</a:t>
+              <a:t>13</a:t>
             </a:fld>
             <a:endParaRPr lang="en-AU" dirty="0">
               <a:latin typeface="+mj-lt"/>
@@ -5898,7 +6258,7 @@
 </p:sld>
 </file>
 
-<file path=ppt/slides/slide12.xml><?xml version="1.0" encoding="utf-8"?>
+<file path=ppt/slides/slide14.xml><?xml version="1.0" encoding="utf-8"?>
 <p:sld xmlns:a="http://schemas.openxmlformats.org/drawingml/2006/main" xmlns:r="http://schemas.openxmlformats.org/officeDocument/2006/relationships" xmlns:p="http://schemas.openxmlformats.org/presentationml/2006/main">
   <p:cSld>
     <p:spTree>
@@ -6081,7 +6441,7 @@
               <a:rPr lang="en-AU" smtClean="0">
                 <a:latin typeface="+mj-lt"/>
               </a:rPr>
-              <a:t>12</a:t>
+              <a:t>14</a:t>
             </a:fld>
             <a:endParaRPr lang="en-AU" dirty="0">
               <a:latin typeface="+mj-lt"/>
@@ -6109,7 +6469,7 @@
 </p:sld>
 </file>
 
-<file path=ppt/slides/slide13.xml><?xml version="1.0" encoding="utf-8"?>
+<file path=ppt/slides/slide15.xml><?xml version="1.0" encoding="utf-8"?>
 <p:sld xmlns:a="http://schemas.openxmlformats.org/drawingml/2006/main" xmlns:r="http://schemas.openxmlformats.org/officeDocument/2006/relationships" xmlns:p="http://schemas.openxmlformats.org/presentationml/2006/main">
   <p:cSld>
     <p:spTree>
@@ -6567,7 +6927,7 @@
               <a:rPr lang="en-AU" smtClean="0">
                 <a:latin typeface="+mj-lt"/>
               </a:rPr>
-              <a:t>13</a:t>
+              <a:t>15</a:t>
             </a:fld>
             <a:endParaRPr lang="en-AU" dirty="0">
               <a:latin typeface="+mj-lt"/>
@@ -7206,7 +7566,7 @@
 </p:sld>
 </file>
 
-<file path=ppt/slides/slide14.xml><?xml version="1.0" encoding="utf-8"?>
+<file path=ppt/slides/slide16.xml><?xml version="1.0" encoding="utf-8"?>
 <p:sld xmlns:a="http://schemas.openxmlformats.org/drawingml/2006/main" xmlns:r="http://schemas.openxmlformats.org/officeDocument/2006/relationships" xmlns:p="http://schemas.openxmlformats.org/presentationml/2006/main">
   <p:cSld>
     <p:spTree>
@@ -7389,7 +7749,7 @@
               <a:rPr lang="en-AU" smtClean="0">
                 <a:latin typeface="+mj-lt"/>
               </a:rPr>
-              <a:t>14</a:t>
+              <a:t>16</a:t>
             </a:fld>
             <a:endParaRPr lang="en-AU" dirty="0">
               <a:latin typeface="+mj-lt"/>
@@ -7417,7 +7777,79 @@
 </p:sld>
 </file>
 
-<file path=ppt/slides/slide15.xml><?xml version="1.0" encoding="utf-8"?>
+<file path=ppt/slides/slide17.xml><?xml version="1.0" encoding="utf-8"?>
+<p:sld xmlns:a="http://schemas.openxmlformats.org/drawingml/2006/main" xmlns:r="http://schemas.openxmlformats.org/officeDocument/2006/relationships" xmlns:p="http://schemas.openxmlformats.org/presentationml/2006/main">
+  <p:cSld>
+    <p:spTree>
+      <p:nvGrpSpPr>
+        <p:cNvPr id="1" name=""/>
+        <p:cNvGrpSpPr/>
+        <p:nvPr/>
+      </p:nvGrpSpPr>
+      <p:grpSpPr>
+        <a:xfrm>
+          <a:off x="0" y="0"/>
+          <a:ext cx="0" cy="0"/>
+          <a:chOff x="0" y="0"/>
+          <a:chExt cx="0" cy="0"/>
+        </a:xfrm>
+      </p:grpSpPr>
+      <p:sp>
+        <p:nvSpPr>
+          <p:cNvPr id="2" name="Title 1"/>
+          <p:cNvSpPr>
+            <a:spLocks noGrp="1"/>
+          </p:cNvSpPr>
+          <p:nvPr>
+            <p:ph type="title"/>
+          </p:nvPr>
+        </p:nvSpPr>
+        <p:spPr/>
+        <p:txBody>
+          <a:bodyPr/>
+          <a:lstStyle/>
+          <a:p>
+            <a:r>
+              <a:rPr lang="en-AU" dirty="0" smtClean="0"/>
+              <a:t>Transmission Innovation</a:t>
+            </a:r>
+            <a:endParaRPr lang="en-AU" dirty="0"/>
+          </a:p>
+        </p:txBody>
+      </p:sp>
+      <p:sp>
+        <p:nvSpPr>
+          <p:cNvPr id="3" name="Content Placeholder 2"/>
+          <p:cNvSpPr>
+            <a:spLocks noGrp="1"/>
+          </p:cNvSpPr>
+          <p:nvPr>
+            <p:ph idx="1"/>
+          </p:nvPr>
+        </p:nvSpPr>
+        <p:spPr/>
+        <p:txBody>
+          <a:bodyPr/>
+          <a:lstStyle/>
+          <a:p>
+            <a:endParaRPr lang="en-AU"/>
+          </a:p>
+        </p:txBody>
+      </p:sp>
+    </p:spTree>
+    <p:extLst>
+      <p:ext uri="{BB962C8B-B14F-4D97-AF65-F5344CB8AC3E}">
+        <p14:creationId xmlns:p14="http://schemas.microsoft.com/office/powerpoint/2010/main" val="3690532724"/>
+      </p:ext>
+    </p:extLst>
+  </p:cSld>
+  <p:clrMapOvr>
+    <a:masterClrMapping/>
+  </p:clrMapOvr>
+</p:sld>
+</file>
+
+<file path=ppt/slides/slide18.xml><?xml version="1.0" encoding="utf-8"?>
 <p:sld xmlns:a="http://schemas.openxmlformats.org/drawingml/2006/main" xmlns:r="http://schemas.openxmlformats.org/officeDocument/2006/relationships" xmlns:p="http://schemas.openxmlformats.org/presentationml/2006/main">
   <p:cSld>
     <p:spTree>
@@ -8675,910 +9107,6 @@
       </p:sp>
       <p:sp>
         <p:nvSpPr>
-          <p:cNvPr id="3" name="Rounded Rectangle 2"/>
-          <p:cNvSpPr/>
-          <p:nvPr/>
-        </p:nvSpPr>
-        <p:spPr>
-          <a:xfrm>
-            <a:off x="3722915" y="1515292"/>
-            <a:ext cx="1698171" cy="540000"/>
-          </a:xfrm>
-          <a:prstGeom prst="roundRect">
-            <a:avLst/>
-          </a:prstGeom>
-          <a:solidFill>
-            <a:schemeClr val="accent1">
-              <a:lumMod val="20000"/>
-              <a:lumOff val="80000"/>
-            </a:schemeClr>
-          </a:solidFill>
-          <a:ln>
-            <a:solidFill>
-              <a:schemeClr val="accent1">
-                <a:lumMod val="60000"/>
-                <a:lumOff val="40000"/>
-              </a:schemeClr>
-            </a:solidFill>
-          </a:ln>
-        </p:spPr>
-        <p:style>
-          <a:lnRef idx="2">
-            <a:schemeClr val="accent1">
-              <a:shade val="50000"/>
-            </a:schemeClr>
-          </a:lnRef>
-          <a:fillRef idx="1">
-            <a:schemeClr val="accent1"/>
-          </a:fillRef>
-          <a:effectRef idx="0">
-            <a:schemeClr val="accent1"/>
-          </a:effectRef>
-          <a:fontRef idx="minor">
-            <a:schemeClr val="lt1"/>
-          </a:fontRef>
-        </p:style>
-        <p:txBody>
-          <a:bodyPr rtlCol="0" anchor="ctr"/>
-          <a:lstStyle/>
-          <a:p>
-            <a:pPr algn="ctr"/>
-            <a:r>
-              <a:rPr lang="en-AU" b="1" dirty="0" smtClean="0">
-                <a:solidFill>
-                  <a:sysClr val="windowText" lastClr="000000"/>
-                </a:solidFill>
-                <a:latin typeface="+mj-lt"/>
-              </a:rPr>
-              <a:t>Launch</a:t>
-            </a:r>
-            <a:endParaRPr lang="en-AU" b="1" dirty="0">
-              <a:solidFill>
-                <a:sysClr val="windowText" lastClr="000000"/>
-              </a:solidFill>
-              <a:latin typeface="+mj-lt"/>
-            </a:endParaRPr>
-          </a:p>
-        </p:txBody>
-      </p:sp>
-      <p:sp>
-        <p:nvSpPr>
-          <p:cNvPr id="4" name="Rounded Rectangle 3"/>
-          <p:cNvSpPr/>
-          <p:nvPr/>
-        </p:nvSpPr>
-        <p:spPr>
-          <a:xfrm>
-            <a:off x="3722915" y="2464593"/>
-            <a:ext cx="1698171" cy="540000"/>
-          </a:xfrm>
-          <a:prstGeom prst="roundRect">
-            <a:avLst/>
-          </a:prstGeom>
-          <a:solidFill>
-            <a:schemeClr val="accent1">
-              <a:lumMod val="20000"/>
-              <a:lumOff val="80000"/>
-            </a:schemeClr>
-          </a:solidFill>
-          <a:ln>
-            <a:solidFill>
-              <a:schemeClr val="accent1">
-                <a:lumMod val="60000"/>
-                <a:lumOff val="40000"/>
-              </a:schemeClr>
-            </a:solidFill>
-          </a:ln>
-        </p:spPr>
-        <p:style>
-          <a:lnRef idx="2">
-            <a:schemeClr val="accent1">
-              <a:shade val="50000"/>
-            </a:schemeClr>
-          </a:lnRef>
-          <a:fillRef idx="1">
-            <a:schemeClr val="accent1"/>
-          </a:fillRef>
-          <a:effectRef idx="0">
-            <a:schemeClr val="accent1"/>
-          </a:effectRef>
-          <a:fontRef idx="minor">
-            <a:schemeClr val="lt1"/>
-          </a:fontRef>
-        </p:style>
-        <p:txBody>
-          <a:bodyPr rtlCol="0" anchor="ctr"/>
-          <a:lstStyle/>
-          <a:p>
-            <a:pPr algn="ctr"/>
-            <a:r>
-              <a:rPr lang="en-AU" dirty="0" smtClean="0">
-                <a:solidFill>
-                  <a:sysClr val="windowText" lastClr="000000"/>
-                </a:solidFill>
-                <a:latin typeface="+mj-lt"/>
-              </a:rPr>
-              <a:t>Establish Contact</a:t>
-            </a:r>
-            <a:endParaRPr lang="en-AU" dirty="0">
-              <a:solidFill>
-                <a:sysClr val="windowText" lastClr="000000"/>
-              </a:solidFill>
-              <a:latin typeface="+mj-lt"/>
-            </a:endParaRPr>
-          </a:p>
-        </p:txBody>
-      </p:sp>
-      <p:sp>
-        <p:nvSpPr>
-          <p:cNvPr id="5" name="Rounded Rectangle 4"/>
-          <p:cNvSpPr/>
-          <p:nvPr/>
-        </p:nvSpPr>
-        <p:spPr>
-          <a:xfrm>
-            <a:off x="3722914" y="3413894"/>
-            <a:ext cx="1698171" cy="540000"/>
-          </a:xfrm>
-          <a:prstGeom prst="roundRect">
-            <a:avLst/>
-          </a:prstGeom>
-          <a:solidFill>
-            <a:schemeClr val="accent1">
-              <a:lumMod val="20000"/>
-              <a:lumOff val="80000"/>
-            </a:schemeClr>
-          </a:solidFill>
-          <a:ln>
-            <a:solidFill>
-              <a:schemeClr val="accent1">
-                <a:lumMod val="60000"/>
-                <a:lumOff val="40000"/>
-              </a:schemeClr>
-            </a:solidFill>
-          </a:ln>
-        </p:spPr>
-        <p:style>
-          <a:lnRef idx="2">
-            <a:schemeClr val="accent1">
-              <a:shade val="50000"/>
-            </a:schemeClr>
-          </a:lnRef>
-          <a:fillRef idx="1">
-            <a:schemeClr val="accent1"/>
-          </a:fillRef>
-          <a:effectRef idx="0">
-            <a:schemeClr val="accent1"/>
-          </a:effectRef>
-          <a:fontRef idx="minor">
-            <a:schemeClr val="lt1"/>
-          </a:fontRef>
-        </p:style>
-        <p:txBody>
-          <a:bodyPr rtlCol="0" anchor="ctr"/>
-          <a:lstStyle/>
-          <a:p>
-            <a:pPr algn="ctr"/>
-            <a:r>
-              <a:rPr lang="en-AU" dirty="0" smtClean="0">
-                <a:solidFill>
-                  <a:sysClr val="windowText" lastClr="000000"/>
-                </a:solidFill>
-                <a:latin typeface="+mj-lt"/>
-              </a:rPr>
-              <a:t>De-tumble / Recovery</a:t>
-            </a:r>
-            <a:endParaRPr lang="en-AU" dirty="0">
-              <a:solidFill>
-                <a:sysClr val="windowText" lastClr="000000"/>
-              </a:solidFill>
-              <a:latin typeface="+mj-lt"/>
-            </a:endParaRPr>
-          </a:p>
-        </p:txBody>
-      </p:sp>
-      <p:sp>
-        <p:nvSpPr>
-          <p:cNvPr id="6" name="Rounded Rectangle 5"/>
-          <p:cNvSpPr/>
-          <p:nvPr/>
-        </p:nvSpPr>
-        <p:spPr>
-          <a:xfrm>
-            <a:off x="3722914" y="4363195"/>
-            <a:ext cx="1698171" cy="540000"/>
-          </a:xfrm>
-          <a:prstGeom prst="roundRect">
-            <a:avLst/>
-          </a:prstGeom>
-          <a:solidFill>
-            <a:schemeClr val="accent5">
-              <a:lumMod val="20000"/>
-              <a:lumOff val="80000"/>
-            </a:schemeClr>
-          </a:solidFill>
-          <a:ln>
-            <a:solidFill>
-              <a:schemeClr val="accent5">
-                <a:lumMod val="60000"/>
-                <a:lumOff val="40000"/>
-              </a:schemeClr>
-            </a:solidFill>
-          </a:ln>
-        </p:spPr>
-        <p:style>
-          <a:lnRef idx="2">
-            <a:schemeClr val="accent1">
-              <a:shade val="50000"/>
-            </a:schemeClr>
-          </a:lnRef>
-          <a:fillRef idx="1">
-            <a:schemeClr val="accent1"/>
-          </a:fillRef>
-          <a:effectRef idx="0">
-            <a:schemeClr val="accent1"/>
-          </a:effectRef>
-          <a:fontRef idx="minor">
-            <a:schemeClr val="lt1"/>
-          </a:fontRef>
-        </p:style>
-        <p:txBody>
-          <a:bodyPr rtlCol="0" anchor="ctr"/>
-          <a:lstStyle/>
-          <a:p>
-            <a:pPr algn="ctr"/>
-            <a:r>
-              <a:rPr lang="en-AU" dirty="0" smtClean="0">
-                <a:solidFill>
-                  <a:sysClr val="windowText" lastClr="000000"/>
-                </a:solidFill>
-                <a:latin typeface="+mj-lt"/>
-              </a:rPr>
-              <a:t>Relay Telemetry</a:t>
-            </a:r>
-            <a:endParaRPr lang="en-AU" dirty="0">
-              <a:solidFill>
-                <a:sysClr val="windowText" lastClr="000000"/>
-              </a:solidFill>
-              <a:latin typeface="+mj-lt"/>
-            </a:endParaRPr>
-          </a:p>
-        </p:txBody>
-      </p:sp>
-      <p:sp>
-        <p:nvSpPr>
-          <p:cNvPr id="7" name="Rounded Rectangle 6"/>
-          <p:cNvSpPr/>
-          <p:nvPr/>
-        </p:nvSpPr>
-        <p:spPr>
-          <a:xfrm>
-            <a:off x="3722913" y="5312496"/>
-            <a:ext cx="1698171" cy="540000"/>
-          </a:xfrm>
-          <a:prstGeom prst="roundRect">
-            <a:avLst/>
-          </a:prstGeom>
-          <a:solidFill>
-            <a:schemeClr val="accent1">
-              <a:lumMod val="20000"/>
-              <a:lumOff val="80000"/>
-            </a:schemeClr>
-          </a:solidFill>
-          <a:ln>
-            <a:solidFill>
-              <a:schemeClr val="accent1">
-                <a:lumMod val="60000"/>
-                <a:lumOff val="40000"/>
-              </a:schemeClr>
-            </a:solidFill>
-          </a:ln>
-        </p:spPr>
-        <p:style>
-          <a:lnRef idx="2">
-            <a:schemeClr val="accent1">
-              <a:shade val="50000"/>
-            </a:schemeClr>
-          </a:lnRef>
-          <a:fillRef idx="1">
-            <a:schemeClr val="accent1"/>
-          </a:fillRef>
-          <a:effectRef idx="0">
-            <a:schemeClr val="accent1"/>
-          </a:effectRef>
-          <a:fontRef idx="minor">
-            <a:schemeClr val="lt1"/>
-          </a:fontRef>
-        </p:style>
-        <p:txBody>
-          <a:bodyPr rtlCol="0" anchor="ctr"/>
-          <a:lstStyle/>
-          <a:p>
-            <a:pPr algn="ctr"/>
-            <a:r>
-              <a:rPr lang="en-AU" dirty="0" smtClean="0">
-                <a:solidFill>
-                  <a:sysClr val="windowText" lastClr="000000"/>
-                </a:solidFill>
-                <a:latin typeface="+mj-lt"/>
-              </a:rPr>
-              <a:t>Payload Operation</a:t>
-            </a:r>
-            <a:endParaRPr lang="en-AU" dirty="0">
-              <a:solidFill>
-                <a:sysClr val="windowText" lastClr="000000"/>
-              </a:solidFill>
-              <a:latin typeface="+mj-lt"/>
-            </a:endParaRPr>
-          </a:p>
-        </p:txBody>
-      </p:sp>
-      <p:sp>
-        <p:nvSpPr>
-          <p:cNvPr id="8" name="Rounded Rectangle 7"/>
-          <p:cNvSpPr/>
-          <p:nvPr/>
-        </p:nvSpPr>
-        <p:spPr>
-          <a:xfrm>
-            <a:off x="6148251" y="5312496"/>
-            <a:ext cx="1698171" cy="540000"/>
-          </a:xfrm>
-          <a:prstGeom prst="roundRect">
-            <a:avLst/>
-          </a:prstGeom>
-          <a:solidFill>
-            <a:schemeClr val="accent1">
-              <a:lumMod val="20000"/>
-              <a:lumOff val="80000"/>
-            </a:schemeClr>
-          </a:solidFill>
-          <a:ln>
-            <a:solidFill>
-              <a:schemeClr val="accent1">
-                <a:lumMod val="60000"/>
-                <a:lumOff val="40000"/>
-              </a:schemeClr>
-            </a:solidFill>
-          </a:ln>
-        </p:spPr>
-        <p:style>
-          <a:lnRef idx="2">
-            <a:schemeClr val="accent1">
-              <a:shade val="50000"/>
-            </a:schemeClr>
-          </a:lnRef>
-          <a:fillRef idx="1">
-            <a:schemeClr val="accent1"/>
-          </a:fillRef>
-          <a:effectRef idx="0">
-            <a:schemeClr val="accent1"/>
-          </a:effectRef>
-          <a:fontRef idx="minor">
-            <a:schemeClr val="lt1"/>
-          </a:fontRef>
-        </p:style>
-        <p:txBody>
-          <a:bodyPr rtlCol="0" anchor="ctr"/>
-          <a:lstStyle/>
-          <a:p>
-            <a:pPr algn="ctr"/>
-            <a:r>
-              <a:rPr lang="en-AU" dirty="0" smtClean="0">
-                <a:solidFill>
-                  <a:sysClr val="windowText" lastClr="000000"/>
-                </a:solidFill>
-                <a:latin typeface="+mj-lt"/>
-              </a:rPr>
-              <a:t>Relay Payload Data</a:t>
-            </a:r>
-            <a:endParaRPr lang="en-AU" dirty="0">
-              <a:solidFill>
-                <a:sysClr val="windowText" lastClr="000000"/>
-              </a:solidFill>
-              <a:latin typeface="+mj-lt"/>
-            </a:endParaRPr>
-          </a:p>
-        </p:txBody>
-      </p:sp>
-      <p:sp>
-        <p:nvSpPr>
-          <p:cNvPr id="9" name="Rounded Rectangle 8"/>
-          <p:cNvSpPr/>
-          <p:nvPr/>
-        </p:nvSpPr>
-        <p:spPr>
-          <a:xfrm>
-            <a:off x="1314994" y="4363195"/>
-            <a:ext cx="1698171" cy="540000"/>
-          </a:xfrm>
-          <a:prstGeom prst="roundRect">
-            <a:avLst/>
-          </a:prstGeom>
-          <a:solidFill>
-            <a:schemeClr val="accent1">
-              <a:lumMod val="20000"/>
-              <a:lumOff val="80000"/>
-            </a:schemeClr>
-          </a:solidFill>
-          <a:ln>
-            <a:solidFill>
-              <a:schemeClr val="accent1">
-                <a:lumMod val="60000"/>
-                <a:lumOff val="40000"/>
-              </a:schemeClr>
-            </a:solidFill>
-          </a:ln>
-        </p:spPr>
-        <p:style>
-          <a:lnRef idx="2">
-            <a:schemeClr val="accent1">
-              <a:shade val="50000"/>
-            </a:schemeClr>
-          </a:lnRef>
-          <a:fillRef idx="1">
-            <a:schemeClr val="accent1"/>
-          </a:fillRef>
-          <a:effectRef idx="0">
-            <a:schemeClr val="accent1"/>
-          </a:effectRef>
-          <a:fontRef idx="minor">
-            <a:schemeClr val="lt1"/>
-          </a:fontRef>
-        </p:style>
-        <p:txBody>
-          <a:bodyPr rtlCol="0" anchor="ctr"/>
-          <a:lstStyle/>
-          <a:p>
-            <a:pPr algn="ctr"/>
-            <a:r>
-              <a:rPr lang="en-AU" dirty="0" smtClean="0">
-                <a:solidFill>
-                  <a:sysClr val="windowText" lastClr="000000"/>
-                </a:solidFill>
-                <a:latin typeface="+mj-lt"/>
-              </a:rPr>
-              <a:t>Safe Mode</a:t>
-            </a:r>
-            <a:endParaRPr lang="en-AU" dirty="0">
-              <a:solidFill>
-                <a:sysClr val="windowText" lastClr="000000"/>
-              </a:solidFill>
-              <a:latin typeface="+mj-lt"/>
-            </a:endParaRPr>
-          </a:p>
-        </p:txBody>
-      </p:sp>
-      <p:sp>
-        <p:nvSpPr>
-          <p:cNvPr id="10" name="Rounded Rectangle 9"/>
-          <p:cNvSpPr/>
-          <p:nvPr/>
-        </p:nvSpPr>
-        <p:spPr>
-          <a:xfrm>
-            <a:off x="1314994" y="2464729"/>
-            <a:ext cx="1698171" cy="540000"/>
-          </a:xfrm>
-          <a:prstGeom prst="roundRect">
-            <a:avLst/>
-          </a:prstGeom>
-          <a:solidFill>
-            <a:schemeClr val="accent1">
-              <a:lumMod val="20000"/>
-              <a:lumOff val="80000"/>
-            </a:schemeClr>
-          </a:solidFill>
-          <a:ln>
-            <a:solidFill>
-              <a:schemeClr val="accent1">
-                <a:lumMod val="60000"/>
-                <a:lumOff val="40000"/>
-              </a:schemeClr>
-            </a:solidFill>
-          </a:ln>
-        </p:spPr>
-        <p:style>
-          <a:lnRef idx="2">
-            <a:schemeClr val="accent1">
-              <a:shade val="50000"/>
-            </a:schemeClr>
-          </a:lnRef>
-          <a:fillRef idx="1">
-            <a:schemeClr val="accent1"/>
-          </a:fillRef>
-          <a:effectRef idx="0">
-            <a:schemeClr val="accent1"/>
-          </a:effectRef>
-          <a:fontRef idx="minor">
-            <a:schemeClr val="lt1"/>
-          </a:fontRef>
-        </p:style>
-        <p:txBody>
-          <a:bodyPr rtlCol="0" anchor="ctr"/>
-          <a:lstStyle/>
-          <a:p>
-            <a:pPr algn="ctr"/>
-            <a:r>
-              <a:rPr lang="en-AU" dirty="0" smtClean="0">
-                <a:solidFill>
-                  <a:sysClr val="windowText" lastClr="000000"/>
-                </a:solidFill>
-                <a:latin typeface="+mj-lt"/>
-              </a:rPr>
-              <a:t>Shut Down</a:t>
-            </a:r>
-            <a:endParaRPr lang="en-AU" dirty="0">
-              <a:solidFill>
-                <a:sysClr val="windowText" lastClr="000000"/>
-              </a:solidFill>
-              <a:latin typeface="+mj-lt"/>
-            </a:endParaRPr>
-          </a:p>
-        </p:txBody>
-      </p:sp>
-      <p:cxnSp>
-        <p:nvCxnSpPr>
-          <p:cNvPr id="12" name="Elbow Connector 11"/>
-          <p:cNvCxnSpPr>
-            <a:stCxn id="8" idx="0"/>
-            <a:endCxn id="5" idx="3"/>
-          </p:cNvCxnSpPr>
-          <p:nvPr/>
-        </p:nvCxnSpPr>
-        <p:spPr>
-          <a:xfrm rot="16200000" flipV="1">
-            <a:off x="5394910" y="3710069"/>
-            <a:ext cx="1628602" cy="1576252"/>
-          </a:xfrm>
-          <a:prstGeom prst="bentConnector2">
-            <a:avLst/>
-          </a:prstGeom>
-          <a:ln w="12700">
-            <a:tailEnd type="triangle"/>
-          </a:ln>
-        </p:spPr>
-        <p:style>
-          <a:lnRef idx="1">
-            <a:schemeClr val="accent1"/>
-          </a:lnRef>
-          <a:fillRef idx="0">
-            <a:schemeClr val="accent1"/>
-          </a:fillRef>
-          <a:effectRef idx="0">
-            <a:schemeClr val="accent1"/>
-          </a:effectRef>
-          <a:fontRef idx="minor">
-            <a:schemeClr val="tx1"/>
-          </a:fontRef>
-        </p:style>
-      </p:cxnSp>
-      <p:cxnSp>
-        <p:nvCxnSpPr>
-          <p:cNvPr id="14" name="Straight Arrow Connector 13"/>
-          <p:cNvCxnSpPr>
-            <a:stCxn id="3" idx="2"/>
-            <a:endCxn id="4" idx="0"/>
-          </p:cNvCxnSpPr>
-          <p:nvPr/>
-        </p:nvCxnSpPr>
-        <p:spPr>
-          <a:xfrm>
-            <a:off x="4572001" y="2055292"/>
-            <a:ext cx="0" cy="409301"/>
-          </a:xfrm>
-          <a:prstGeom prst="straightConnector1">
-            <a:avLst/>
-          </a:prstGeom>
-          <a:ln w="12700">
-            <a:tailEnd type="triangle"/>
-          </a:ln>
-        </p:spPr>
-        <p:style>
-          <a:lnRef idx="1">
-            <a:schemeClr val="accent1"/>
-          </a:lnRef>
-          <a:fillRef idx="0">
-            <a:schemeClr val="accent1"/>
-          </a:fillRef>
-          <a:effectRef idx="0">
-            <a:schemeClr val="accent1"/>
-          </a:effectRef>
-          <a:fontRef idx="minor">
-            <a:schemeClr val="tx1"/>
-          </a:fontRef>
-        </p:style>
-      </p:cxnSp>
-      <p:cxnSp>
-        <p:nvCxnSpPr>
-          <p:cNvPr id="16" name="Straight Arrow Connector 15"/>
-          <p:cNvCxnSpPr>
-            <a:stCxn id="4" idx="2"/>
-            <a:endCxn id="5" idx="0"/>
-          </p:cNvCxnSpPr>
-          <p:nvPr/>
-        </p:nvCxnSpPr>
-        <p:spPr>
-          <a:xfrm flipH="1">
-            <a:off x="4572000" y="3004593"/>
-            <a:ext cx="1" cy="409301"/>
-          </a:xfrm>
-          <a:prstGeom prst="straightConnector1">
-            <a:avLst/>
-          </a:prstGeom>
-          <a:ln w="12700">
-            <a:tailEnd type="triangle"/>
-          </a:ln>
-        </p:spPr>
-        <p:style>
-          <a:lnRef idx="1">
-            <a:schemeClr val="accent1"/>
-          </a:lnRef>
-          <a:fillRef idx="0">
-            <a:schemeClr val="accent1"/>
-          </a:fillRef>
-          <a:effectRef idx="0">
-            <a:schemeClr val="accent1"/>
-          </a:effectRef>
-          <a:fontRef idx="minor">
-            <a:schemeClr val="tx1"/>
-          </a:fontRef>
-        </p:style>
-      </p:cxnSp>
-      <p:cxnSp>
-        <p:nvCxnSpPr>
-          <p:cNvPr id="20" name="Straight Arrow Connector 19"/>
-          <p:cNvCxnSpPr>
-            <a:stCxn id="9" idx="0"/>
-            <a:endCxn id="10" idx="2"/>
-          </p:cNvCxnSpPr>
-          <p:nvPr/>
-        </p:nvCxnSpPr>
-        <p:spPr>
-          <a:xfrm flipV="1">
-            <a:off x="2164080" y="3004729"/>
-            <a:ext cx="0" cy="1358466"/>
-          </a:xfrm>
-          <a:prstGeom prst="straightConnector1">
-            <a:avLst/>
-          </a:prstGeom>
-          <a:ln w="12700">
-            <a:tailEnd type="triangle"/>
-          </a:ln>
-        </p:spPr>
-        <p:style>
-          <a:lnRef idx="1">
-            <a:schemeClr val="accent1"/>
-          </a:lnRef>
-          <a:fillRef idx="0">
-            <a:schemeClr val="accent1"/>
-          </a:fillRef>
-          <a:effectRef idx="0">
-            <a:schemeClr val="accent1"/>
-          </a:effectRef>
-          <a:fontRef idx="minor">
-            <a:schemeClr val="tx1"/>
-          </a:fontRef>
-        </p:style>
-      </p:cxnSp>
-      <p:cxnSp>
-        <p:nvCxnSpPr>
-          <p:cNvPr id="22" name="Straight Arrow Connector 21"/>
-          <p:cNvCxnSpPr>
-            <a:stCxn id="10" idx="3"/>
-            <a:endCxn id="4" idx="1"/>
-          </p:cNvCxnSpPr>
-          <p:nvPr/>
-        </p:nvCxnSpPr>
-        <p:spPr>
-          <a:xfrm flipV="1">
-            <a:off x="3013165" y="2734593"/>
-            <a:ext cx="709750" cy="136"/>
-          </a:xfrm>
-          <a:prstGeom prst="straightConnector1">
-            <a:avLst/>
-          </a:prstGeom>
-          <a:ln w="12700">
-            <a:tailEnd type="triangle"/>
-          </a:ln>
-        </p:spPr>
-        <p:style>
-          <a:lnRef idx="1">
-            <a:schemeClr val="accent1"/>
-          </a:lnRef>
-          <a:fillRef idx="0">
-            <a:schemeClr val="accent1"/>
-          </a:fillRef>
-          <a:effectRef idx="0">
-            <a:schemeClr val="accent1"/>
-          </a:effectRef>
-          <a:fontRef idx="minor">
-            <a:schemeClr val="tx1"/>
-          </a:fontRef>
-        </p:style>
-      </p:cxnSp>
-      <p:cxnSp>
-        <p:nvCxnSpPr>
-          <p:cNvPr id="24" name="Straight Arrow Connector 23"/>
-          <p:cNvCxnSpPr>
-            <a:stCxn id="6" idx="1"/>
-            <a:endCxn id="9" idx="3"/>
-          </p:cNvCxnSpPr>
-          <p:nvPr/>
-        </p:nvCxnSpPr>
-        <p:spPr>
-          <a:xfrm flipH="1">
-            <a:off x="3013165" y="4633195"/>
-            <a:ext cx="709749" cy="0"/>
-          </a:xfrm>
-          <a:prstGeom prst="straightConnector1">
-            <a:avLst/>
-          </a:prstGeom>
-          <a:ln>
-            <a:tailEnd type="triangle"/>
-          </a:ln>
-        </p:spPr>
-        <p:style>
-          <a:lnRef idx="1">
-            <a:schemeClr val="accent1"/>
-          </a:lnRef>
-          <a:fillRef idx="0">
-            <a:schemeClr val="accent1"/>
-          </a:fillRef>
-          <a:effectRef idx="0">
-            <a:schemeClr val="accent1"/>
-          </a:effectRef>
-          <a:fontRef idx="minor">
-            <a:schemeClr val="tx1"/>
-          </a:fontRef>
-        </p:style>
-      </p:cxnSp>
-      <p:cxnSp>
-        <p:nvCxnSpPr>
-          <p:cNvPr id="26" name="Straight Arrow Connector 25"/>
-          <p:cNvCxnSpPr>
-            <a:stCxn id="5" idx="2"/>
-            <a:endCxn id="6" idx="0"/>
-          </p:cNvCxnSpPr>
-          <p:nvPr/>
-        </p:nvCxnSpPr>
-        <p:spPr>
-          <a:xfrm>
-            <a:off x="4572000" y="3953894"/>
-            <a:ext cx="0" cy="409301"/>
-          </a:xfrm>
-          <a:prstGeom prst="straightConnector1">
-            <a:avLst/>
-          </a:prstGeom>
-          <a:ln w="12700">
-            <a:tailEnd type="triangle"/>
-          </a:ln>
-        </p:spPr>
-        <p:style>
-          <a:lnRef idx="1">
-            <a:schemeClr val="accent1"/>
-          </a:lnRef>
-          <a:fillRef idx="0">
-            <a:schemeClr val="accent1"/>
-          </a:fillRef>
-          <a:effectRef idx="0">
-            <a:schemeClr val="accent1"/>
-          </a:effectRef>
-          <a:fontRef idx="minor">
-            <a:schemeClr val="tx1"/>
-          </a:fontRef>
-        </p:style>
-      </p:cxnSp>
-      <p:cxnSp>
-        <p:nvCxnSpPr>
-          <p:cNvPr id="28" name="Straight Arrow Connector 27"/>
-          <p:cNvCxnSpPr>
-            <a:stCxn id="9" idx="3"/>
-            <a:endCxn id="6" idx="1"/>
-          </p:cNvCxnSpPr>
-          <p:nvPr/>
-        </p:nvCxnSpPr>
-        <p:spPr>
-          <a:xfrm>
-            <a:off x="3013165" y="4633195"/>
-            <a:ext cx="709749" cy="0"/>
-          </a:xfrm>
-          <a:prstGeom prst="straightConnector1">
-            <a:avLst/>
-          </a:prstGeom>
-          <a:ln w="12700">
-            <a:tailEnd type="triangle"/>
-          </a:ln>
-        </p:spPr>
-        <p:style>
-          <a:lnRef idx="1">
-            <a:schemeClr val="accent1"/>
-          </a:lnRef>
-          <a:fillRef idx="0">
-            <a:schemeClr val="accent1"/>
-          </a:fillRef>
-          <a:effectRef idx="0">
-            <a:schemeClr val="accent1"/>
-          </a:effectRef>
-          <a:fontRef idx="minor">
-            <a:schemeClr val="tx1"/>
-          </a:fontRef>
-        </p:style>
-      </p:cxnSp>
-      <p:cxnSp>
-        <p:nvCxnSpPr>
-          <p:cNvPr id="30" name="Straight Arrow Connector 29"/>
-          <p:cNvCxnSpPr>
-            <a:stCxn id="6" idx="2"/>
-            <a:endCxn id="7" idx="0"/>
-          </p:cNvCxnSpPr>
-          <p:nvPr/>
-        </p:nvCxnSpPr>
-        <p:spPr>
-          <a:xfrm flipH="1">
-            <a:off x="4571999" y="4903195"/>
-            <a:ext cx="1" cy="409301"/>
-          </a:xfrm>
-          <a:prstGeom prst="straightConnector1">
-            <a:avLst/>
-          </a:prstGeom>
-          <a:ln w="12700">
-            <a:tailEnd type="triangle"/>
-          </a:ln>
-        </p:spPr>
-        <p:style>
-          <a:lnRef idx="1">
-            <a:schemeClr val="accent1"/>
-          </a:lnRef>
-          <a:fillRef idx="0">
-            <a:schemeClr val="accent1"/>
-          </a:fillRef>
-          <a:effectRef idx="0">
-            <a:schemeClr val="accent1"/>
-          </a:effectRef>
-          <a:fontRef idx="minor">
-            <a:schemeClr val="tx1"/>
-          </a:fontRef>
-        </p:style>
-      </p:cxnSp>
-      <p:cxnSp>
-        <p:nvCxnSpPr>
-          <p:cNvPr id="32" name="Straight Arrow Connector 31"/>
-          <p:cNvCxnSpPr>
-            <a:stCxn id="7" idx="3"/>
-            <a:endCxn id="8" idx="1"/>
-          </p:cNvCxnSpPr>
-          <p:nvPr/>
-        </p:nvCxnSpPr>
-        <p:spPr>
-          <a:xfrm>
-            <a:off x="5421084" y="5582496"/>
-            <a:ext cx="727167" cy="0"/>
-          </a:xfrm>
-          <a:prstGeom prst="straightConnector1">
-            <a:avLst/>
-          </a:prstGeom>
-          <a:ln w="12700">
-            <a:tailEnd type="triangle"/>
-          </a:ln>
-        </p:spPr>
-        <p:style>
-          <a:lnRef idx="1">
-            <a:schemeClr val="accent1"/>
-          </a:lnRef>
-          <a:fillRef idx="0">
-            <a:schemeClr val="accent1"/>
-          </a:fillRef>
-          <a:effectRef idx="0">
-            <a:schemeClr val="accent1"/>
-          </a:effectRef>
-          <a:fontRef idx="minor">
-            <a:schemeClr val="tx1"/>
-          </a:fontRef>
-        </p:style>
-      </p:cxnSp>
-      <p:sp>
-        <p:nvSpPr>
           <p:cNvPr id="33" name="Date Placeholder 3"/>
           <p:cNvSpPr>
             <a:spLocks noGrp="1"/>
@@ -9709,6 +9237,36 @@
           </a:p>
         </p:txBody>
       </p:sp>
+      <p:pic>
+        <p:nvPicPr>
+          <p:cNvPr id="25" name="Picture 24"/>
+          <p:cNvPicPr>
+            <a:picLocks noChangeAspect="1"/>
+          </p:cNvPicPr>
+          <p:nvPr/>
+        </p:nvPicPr>
+        <p:blipFill>
+          <a:blip r:embed="rId2">
+            <a:extLst>
+              <a:ext uri="{28A0092B-C50C-407E-A947-70E740481C1C}">
+                <a14:useLocalDpi xmlns:a14="http://schemas.microsoft.com/office/drawing/2010/main" val="0"/>
+              </a:ext>
+            </a:extLst>
+          </a:blip>
+          <a:stretch>
+            <a:fillRect/>
+          </a:stretch>
+        </p:blipFill>
+        <p:spPr>
+          <a:xfrm>
+            <a:off x="968190" y="1625429"/>
+            <a:ext cx="5371650" cy="4434570"/>
+          </a:xfrm>
+          <a:prstGeom prst="rect">
+            <a:avLst/>
+          </a:prstGeom>
+        </p:spPr>
+      </p:pic>
     </p:spTree>
     <p:extLst>
       <p:ext uri="{BB962C8B-B14F-4D97-AF65-F5344CB8AC3E}">
@@ -9763,7 +9321,7 @@
           <a:p>
             <a:r>
               <a:rPr lang="en-AU" dirty="0" smtClean="0"/>
-              <a:t>System Schematic</a:t>
+              <a:t>CubeSat Limitations</a:t>
             </a:r>
             <a:endParaRPr lang="en-AU" dirty="0"/>
           </a:p>
@@ -9786,7 +9344,34 @@
           <a:p>
             <a:r>
               <a:rPr lang="en-AU" dirty="0" smtClean="0"/>
-              <a:t>(to insert schematic when completed)</a:t>
+              <a:t>Discuss mission and component limitations</a:t>
+            </a:r>
+          </a:p>
+          <a:p>
+            <a:r>
+              <a:rPr lang="en-AU" dirty="0" smtClean="0"/>
+              <a:t>Demonstration of capability</a:t>
+            </a:r>
+          </a:p>
+          <a:p>
+            <a:endParaRPr lang="en-AU" dirty="0"/>
+          </a:p>
+          <a:p>
+            <a:r>
+              <a:rPr lang="en-AU" dirty="0" smtClean="0"/>
+              <a:t>Power</a:t>
+            </a:r>
+          </a:p>
+          <a:p>
+            <a:r>
+              <a:rPr lang="en-AU" dirty="0" smtClean="0"/>
+              <a:t>Size</a:t>
+            </a:r>
+          </a:p>
+          <a:p>
+            <a:r>
+              <a:rPr lang="en-AU" dirty="0" smtClean="0"/>
+              <a:t>Transmission (power)</a:t>
             </a:r>
             <a:endParaRPr lang="en-AU" dirty="0"/>
           </a:p>
@@ -9795,7 +9380,7 @@
     </p:spTree>
     <p:extLst>
       <p:ext uri="{BB962C8B-B14F-4D97-AF65-F5344CB8AC3E}">
-        <p14:creationId xmlns:p14="http://schemas.microsoft.com/office/powerpoint/2010/main" val="3565422311"/>
+        <p14:creationId xmlns:p14="http://schemas.microsoft.com/office/powerpoint/2010/main" val="4045029302"/>
       </p:ext>
     </p:extLst>
   </p:cSld>
@@ -9846,35 +9431,46 @@
           <a:p>
             <a:r>
               <a:rPr lang="en-AU" dirty="0" smtClean="0"/>
-              <a:t>Structural Design</a:t>
+              <a:t>Design Schematic</a:t>
             </a:r>
             <a:endParaRPr lang="en-AU" dirty="0"/>
           </a:p>
         </p:txBody>
       </p:sp>
-      <p:sp>
-        <p:nvSpPr>
-          <p:cNvPr id="3" name="Text Placeholder 2"/>
-          <p:cNvSpPr>
-            <a:spLocks noGrp="1"/>
-          </p:cNvSpPr>
-          <p:nvPr>
-            <p:ph type="body" idx="1"/>
-          </p:nvPr>
-        </p:nvSpPr>
-        <p:spPr/>
-        <p:txBody>
-          <a:bodyPr/>
-          <a:lstStyle/>
-          <a:p>
-            <a:endParaRPr lang="en-AU"/>
-          </a:p>
-        </p:txBody>
-      </p:sp>
+      <p:pic>
+        <p:nvPicPr>
+          <p:cNvPr id="4" name="Picture 3"/>
+          <p:cNvPicPr>
+            <a:picLocks noChangeAspect="1"/>
+          </p:cNvPicPr>
+          <p:nvPr/>
+        </p:nvPicPr>
+        <p:blipFill>
+          <a:blip r:embed="rId2">
+            <a:extLst>
+              <a:ext uri="{28A0092B-C50C-407E-A947-70E740481C1C}">
+                <a14:useLocalDpi xmlns:a14="http://schemas.microsoft.com/office/drawing/2010/main" val="0"/>
+              </a:ext>
+            </a:extLst>
+          </a:blip>
+          <a:stretch>
+            <a:fillRect/>
+          </a:stretch>
+        </p:blipFill>
+        <p:spPr>
+          <a:xfrm>
+            <a:off x="1120827" y="1219200"/>
+            <a:ext cx="4784007" cy="4737660"/>
+          </a:xfrm>
+          <a:prstGeom prst="rect">
+            <a:avLst/>
+          </a:prstGeom>
+        </p:spPr>
+      </p:pic>
     </p:spTree>
     <p:extLst>
       <p:ext uri="{BB962C8B-B14F-4D97-AF65-F5344CB8AC3E}">
-        <p14:creationId xmlns:p14="http://schemas.microsoft.com/office/powerpoint/2010/main" val="4036474924"/>
+        <p14:creationId xmlns:p14="http://schemas.microsoft.com/office/powerpoint/2010/main" val="1382147126"/>
       </p:ext>
     </p:extLst>
   </p:cSld>
@@ -9925,7 +9521,7 @@
           <a:p>
             <a:r>
               <a:rPr lang="en-AU" dirty="0" smtClean="0"/>
-              <a:t>Design Considerations</a:t>
+              <a:t>Structural Design</a:t>
             </a:r>
             <a:endParaRPr lang="en-AU" dirty="0"/>
           </a:p>
@@ -9933,12 +9529,12 @@
       </p:sp>
       <p:sp>
         <p:nvSpPr>
-          <p:cNvPr id="3" name="Content Placeholder 2"/>
-          <p:cNvSpPr>
-            <a:spLocks noGrp="1"/>
-          </p:cNvSpPr>
-          <p:nvPr>
-            <p:ph sz="half" idx="1"/>
+          <p:cNvPr id="3" name="Text Placeholder 2"/>
+          <p:cNvSpPr>
+            <a:spLocks noGrp="1"/>
+          </p:cNvSpPr>
+          <p:nvPr>
+            <p:ph type="body" idx="1"/>
           </p:nvPr>
         </p:nvSpPr>
         <p:spPr/>
@@ -9946,192 +9542,14 @@
           <a:bodyPr/>
           <a:lstStyle/>
           <a:p>
-            <a:r>
-              <a:rPr lang="en-AU" dirty="0" smtClean="0"/>
-              <a:t>(include picture of deployed solar panels also?)</a:t>
-            </a:r>
-            <a:endParaRPr lang="en-AU" dirty="0"/>
-          </a:p>
-        </p:txBody>
-      </p:sp>
-      <p:pic>
-        <p:nvPicPr>
-          <p:cNvPr id="5" name="Content Placeholder 4"/>
-          <p:cNvPicPr>
-            <a:picLocks noGrp="1" noChangeAspect="1"/>
-          </p:cNvPicPr>
-          <p:nvPr>
-            <p:ph sz="half" idx="2"/>
-          </p:nvPr>
-        </p:nvPicPr>
-        <p:blipFill rotWithShape="1">
-          <a:blip r:embed="rId2" cstate="print">
-            <a:extLst>
-              <a:ext uri="{28A0092B-C50C-407E-A947-70E740481C1C}">
-                <a14:useLocalDpi xmlns:a14="http://schemas.microsoft.com/office/drawing/2010/main" val="0"/>
-              </a:ext>
-            </a:extLst>
-          </a:blip>
-          <a:srcRect l="30126" r="19902"/>
-          <a:stretch/>
-        </p:blipFill>
-        <p:spPr>
-          <a:xfrm>
-            <a:off x="4641668" y="1288869"/>
-            <a:ext cx="4190866" cy="4798422"/>
-          </a:xfrm>
-          <a:prstGeom prst="roundRect">
-            <a:avLst>
-              <a:gd name="adj" fmla="val 2542"/>
-            </a:avLst>
-          </a:prstGeom>
-          <a:solidFill>
-            <a:srgbClr val="FFFFFF">
-              <a:shade val="85000"/>
-            </a:srgbClr>
-          </a:solidFill>
-          <a:ln>
-            <a:noFill/>
-          </a:ln>
-          <a:effectLst/>
-        </p:spPr>
-      </p:pic>
-      <p:sp>
-        <p:nvSpPr>
-          <p:cNvPr id="6" name="Date Placeholder 3"/>
-          <p:cNvSpPr>
-            <a:spLocks noGrp="1"/>
-          </p:cNvSpPr>
-          <p:nvPr>
-            <p:ph type="dt" sz="half" idx="10"/>
-          </p:nvPr>
-        </p:nvSpPr>
-        <p:spPr>
-          <a:xfrm>
-            <a:off x="628650" y="6356351"/>
-            <a:ext cx="2057400" cy="365125"/>
-          </a:xfrm>
-        </p:spPr>
-        <p:txBody>
-          <a:bodyPr/>
-          <a:lstStyle>
-            <a:lvl1pPr>
-              <a:defRPr>
-                <a:solidFill>
-                  <a:schemeClr val="accent4">
-                    <a:lumMod val="75000"/>
-                  </a:schemeClr>
-                </a:solidFill>
-              </a:defRPr>
-            </a:lvl1pPr>
-          </a:lstStyle>
-          <a:p>
-            <a:r>
-              <a:rPr lang="en-AU" dirty="0" smtClean="0">
-                <a:latin typeface="+mj-lt"/>
-              </a:rPr>
-              <a:t>Tuesday 24 August 2015</a:t>
-            </a:r>
-            <a:endParaRPr lang="en-AU" dirty="0">
-              <a:latin typeface="+mj-lt"/>
-            </a:endParaRPr>
-          </a:p>
-        </p:txBody>
-      </p:sp>
-      <p:sp>
-        <p:nvSpPr>
-          <p:cNvPr id="7" name="Footer Placeholder 4"/>
-          <p:cNvSpPr>
-            <a:spLocks noGrp="1"/>
-          </p:cNvSpPr>
-          <p:nvPr>
-            <p:ph type="ftr" sz="quarter" idx="11"/>
-          </p:nvPr>
-        </p:nvSpPr>
-        <p:spPr>
-          <a:xfrm>
-            <a:off x="3028950" y="6356351"/>
-            <a:ext cx="3086100" cy="365125"/>
-          </a:xfrm>
-        </p:spPr>
-        <p:txBody>
-          <a:bodyPr/>
-          <a:lstStyle>
-            <a:lvl1pPr>
-              <a:defRPr lang="en-AU" sz="1200" kern="1200" dirty="0" smtClean="0">
-                <a:solidFill>
-                  <a:schemeClr val="accent4">
-                    <a:lumMod val="75000"/>
-                  </a:schemeClr>
-                </a:solidFill>
-                <a:latin typeface="+mn-lt"/>
-                <a:ea typeface="+mn-ea"/>
-                <a:cs typeface="+mn-cs"/>
-              </a:defRPr>
-            </a:lvl1pPr>
-          </a:lstStyle>
-          <a:p>
-            <a:r>
-              <a:rPr lang="en-AU" dirty="0" smtClean="0">
-                <a:latin typeface="+mj-lt"/>
-              </a:rPr>
-              <a:t>SnapSat Preliminary Design Presentation</a:t>
-            </a:r>
-            <a:endParaRPr lang="en-AU" dirty="0">
-              <a:latin typeface="+mj-lt"/>
-            </a:endParaRPr>
-          </a:p>
-        </p:txBody>
-      </p:sp>
-      <p:sp>
-        <p:nvSpPr>
-          <p:cNvPr id="8" name="Slide Number Placeholder 5"/>
-          <p:cNvSpPr>
-            <a:spLocks noGrp="1"/>
-          </p:cNvSpPr>
-          <p:nvPr>
-            <p:ph type="sldNum" sz="quarter" idx="12"/>
-          </p:nvPr>
-        </p:nvSpPr>
-        <p:spPr>
-          <a:xfrm>
-            <a:off x="6457950" y="6356351"/>
-            <a:ext cx="2057400" cy="365125"/>
-          </a:xfrm>
-        </p:spPr>
-        <p:txBody>
-          <a:bodyPr/>
-          <a:lstStyle>
-            <a:lvl1pPr>
-              <a:defRPr lang="en-AU" sz="1200" kern="1200" smtClean="0">
-                <a:solidFill>
-                  <a:schemeClr val="accent4">
-                    <a:lumMod val="75000"/>
-                  </a:schemeClr>
-                </a:solidFill>
-                <a:latin typeface="+mn-lt"/>
-                <a:ea typeface="+mn-ea"/>
-                <a:cs typeface="+mn-cs"/>
-              </a:defRPr>
-            </a:lvl1pPr>
-          </a:lstStyle>
-          <a:p>
-            <a:fld id="{6C5E801A-27FC-4E4C-A43C-DCD3D3677F04}" type="slidenum">
-              <a:rPr lang="en-AU" smtClean="0">
-                <a:latin typeface="+mj-lt"/>
-              </a:rPr>
-              <a:t>9</a:t>
-            </a:fld>
-            <a:endParaRPr lang="en-AU" dirty="0">
-              <a:latin typeface="+mj-lt"/>
-            </a:endParaRPr>
+            <a:endParaRPr lang="en-AU"/>
           </a:p>
         </p:txBody>
       </p:sp>
     </p:spTree>
     <p:extLst>
       <p:ext uri="{BB962C8B-B14F-4D97-AF65-F5344CB8AC3E}">
-        <p14:creationId xmlns:p14="http://schemas.microsoft.com/office/powerpoint/2010/main" val="1456499067"/>
+        <p14:creationId xmlns:p14="http://schemas.microsoft.com/office/powerpoint/2010/main" val="4036474924"/>
       </p:ext>
     </p:extLst>
   </p:cSld>

</xml_diff>

<commit_message>
Changed order of preso sections around a bit
</commit_message>
<xml_diff>
--- a/Presentation/SnapSat PDR Presentation.pptx
+++ b/Presentation/SnapSat PDR Presentation.pptx
@@ -5,27 +5,29 @@
     <p:sldMasterId id="2147483660" r:id="rId1"/>
   </p:sldMasterIdLst>
   <p:notesMasterIdLst>
-    <p:notesMasterId r:id="rId20"/>
+    <p:notesMasterId r:id="rId22"/>
   </p:notesMasterIdLst>
   <p:sldIdLst>
     <p:sldId id="256" r:id="rId2"/>
     <p:sldId id="257" r:id="rId3"/>
     <p:sldId id="258" r:id="rId4"/>
     <p:sldId id="271" r:id="rId5"/>
-    <p:sldId id="259" r:id="rId6"/>
-    <p:sldId id="260" r:id="rId7"/>
-    <p:sldId id="272" r:id="rId8"/>
-    <p:sldId id="273" r:id="rId9"/>
-    <p:sldId id="261" r:id="rId10"/>
-    <p:sldId id="262" r:id="rId11"/>
-    <p:sldId id="274" r:id="rId12"/>
-    <p:sldId id="263" r:id="rId13"/>
-    <p:sldId id="264" r:id="rId14"/>
-    <p:sldId id="265" r:id="rId15"/>
-    <p:sldId id="267" r:id="rId16"/>
-    <p:sldId id="266" r:id="rId17"/>
-    <p:sldId id="275" r:id="rId18"/>
-    <p:sldId id="270" r:id="rId19"/>
+    <p:sldId id="277" r:id="rId6"/>
+    <p:sldId id="272" r:id="rId7"/>
+    <p:sldId id="261" r:id="rId8"/>
+    <p:sldId id="262" r:id="rId9"/>
+    <p:sldId id="274" r:id="rId10"/>
+    <p:sldId id="276" r:id="rId11"/>
+    <p:sldId id="263" r:id="rId12"/>
+    <p:sldId id="264" r:id="rId13"/>
+    <p:sldId id="265" r:id="rId14"/>
+    <p:sldId id="267" r:id="rId15"/>
+    <p:sldId id="266" r:id="rId16"/>
+    <p:sldId id="275" r:id="rId17"/>
+    <p:sldId id="259" r:id="rId18"/>
+    <p:sldId id="260" r:id="rId19"/>
+    <p:sldId id="273" r:id="rId20"/>
+    <p:sldId id="270" r:id="rId21"/>
   </p:sldIdLst>
   <p:sldSz cx="9144000" cy="6858000" type="screen4x3"/>
   <p:notesSz cx="6858000" cy="9144000"/>
@@ -570,6 +572,138 @@
 </p:notes>
 </file>
 
+<file path=ppt/notesSlides/notesSlide10.xml><?xml version="1.0" encoding="utf-8"?>
+<p:notes xmlns:a="http://schemas.openxmlformats.org/drawingml/2006/main" xmlns:r="http://schemas.openxmlformats.org/officeDocument/2006/relationships" xmlns:p="http://schemas.openxmlformats.org/presentationml/2006/main">
+  <p:cSld>
+    <p:spTree>
+      <p:nvGrpSpPr>
+        <p:cNvPr id="1" name=""/>
+        <p:cNvGrpSpPr/>
+        <p:nvPr/>
+      </p:nvGrpSpPr>
+      <p:grpSpPr>
+        <a:xfrm>
+          <a:off x="0" y="0"/>
+          <a:ext cx="0" cy="0"/>
+          <a:chOff x="0" y="0"/>
+          <a:chExt cx="0" cy="0"/>
+        </a:xfrm>
+      </p:grpSpPr>
+      <p:sp>
+        <p:nvSpPr>
+          <p:cNvPr id="2" name="Slide Image Placeholder 1"/>
+          <p:cNvSpPr>
+            <a:spLocks noGrp="1" noRot="1" noChangeAspect="1"/>
+          </p:cNvSpPr>
+          <p:nvPr>
+            <p:ph type="sldImg"/>
+          </p:nvPr>
+        </p:nvSpPr>
+        <p:spPr/>
+      </p:sp>
+      <p:sp>
+        <p:nvSpPr>
+          <p:cNvPr id="3" name="Notes Placeholder 2"/>
+          <p:cNvSpPr>
+            <a:spLocks noGrp="1"/>
+          </p:cNvSpPr>
+          <p:nvPr>
+            <p:ph type="body" idx="1"/>
+          </p:nvPr>
+        </p:nvSpPr>
+        <p:spPr/>
+        <p:txBody>
+          <a:bodyPr/>
+          <a:lstStyle/>
+          <a:p>
+            <a:r>
+              <a:rPr lang="en-AU" dirty="0" smtClean="0"/>
+              <a:t>Since this spacecraft is performing Earth observation, it requires a pointing budget. This refers to the ability to orient the spacecraft towards a target having a specific geographical orientation. Along with the pointing accuracy, the satellite needs to be able to map the location from its own location. Errors in both pointing and mapping accuracies will be discussed here.</a:t>
+            </a:r>
+          </a:p>
+          <a:p>
+            <a:r>
+              <a:rPr lang="en-AU" dirty="0" smtClean="0"/>
+              <a:t> The attitude control system for SnapSat will consist of three air core </a:t>
+            </a:r>
+            <a:r>
+              <a:rPr lang="en-AU" dirty="0" err="1" smtClean="0"/>
+              <a:t>magnetorquers</a:t>
+            </a:r>
+            <a:r>
+              <a:rPr lang="en-AU" dirty="0" smtClean="0"/>
+              <a:t> operating on 3 separate planes capable of producing 0.05Am2 each.  Only two of the </a:t>
+            </a:r>
+            <a:r>
+              <a:rPr lang="en-AU" dirty="0" err="1" smtClean="0"/>
+              <a:t>magnetorquers</a:t>
+            </a:r>
+            <a:r>
+              <a:rPr lang="en-AU" dirty="0" smtClean="0"/>
+              <a:t> can work at any one time, which will reduce total power usage for the system.  The first component of the determination system is a 9-DOF IMU which will primarily be used in the de-tumble phase due to accumulated error issues with this equipment which are expected to occur later in the mission.  The second component is a solar tracker system consisting of six photodiode pins, one on each face, which will be used to accurately determine the attitude of the satellite based on the location of the Sun. </a:t>
+            </a:r>
+          </a:p>
+          <a:p>
+            <a:r>
+              <a:rPr lang="en-AU" dirty="0" smtClean="0"/>
+              <a:t>According to the specification data, the IMU will experience a 2\% error based on the expected temperature range, although this will increase over the course of the mission due to the accumulated error.  Although the exact error will need to be calculated during calibration and testing, based on current literature there are a number of similar solar tracking systems which are able to achieve an accuracy of 0.2\% \cite{</a:t>
+            </a:r>
+            <a:r>
+              <a:rPr lang="en-AU" dirty="0" err="1" smtClean="0"/>
+              <a:t>beaudette</a:t>
+            </a:r>
+            <a:r>
+              <a:rPr lang="en-AU" dirty="0" smtClean="0"/>
+              <a:t>}.  However given the low budget and subsequently slightly inferior equipment conservative estimate of 0.5\% will be used for the solar tracker error.  In regards to the </a:t>
+            </a:r>
+            <a:r>
+              <a:rPr lang="en-AU" dirty="0" err="1" smtClean="0"/>
+              <a:t>magnetorquers</a:t>
+            </a:r>
+            <a:r>
+              <a:rPr lang="en-AU" dirty="0" smtClean="0"/>
+              <a:t> expected error based on similar models 1\%, although error will be finalised during the calibration and testing phase.</a:t>
+            </a:r>
+            <a:endParaRPr lang="en-AU" dirty="0"/>
+          </a:p>
+        </p:txBody>
+      </p:sp>
+      <p:sp>
+        <p:nvSpPr>
+          <p:cNvPr id="4" name="Slide Number Placeholder 3"/>
+          <p:cNvSpPr>
+            <a:spLocks noGrp="1"/>
+          </p:cNvSpPr>
+          <p:nvPr>
+            <p:ph type="sldNum" sz="quarter" idx="10"/>
+          </p:nvPr>
+        </p:nvSpPr>
+        <p:spPr/>
+        <p:txBody>
+          <a:bodyPr/>
+          <a:lstStyle/>
+          <a:p>
+            <a:fld id="{EE3D259A-0B22-4204-B86E-533FB56D31D0}" type="slidenum">
+              <a:rPr lang="en-AU" smtClean="0"/>
+              <a:t>14</a:t>
+            </a:fld>
+            <a:endParaRPr lang="en-AU"/>
+          </a:p>
+        </p:txBody>
+      </p:sp>
+    </p:spTree>
+    <p:extLst>
+      <p:ext uri="{BB962C8B-B14F-4D97-AF65-F5344CB8AC3E}">
+        <p14:creationId xmlns:p14="http://schemas.microsoft.com/office/powerpoint/2010/main" val="3385491287"/>
+      </p:ext>
+    </p:extLst>
+  </p:cSld>
+  <p:clrMapOvr>
+    <a:masterClrMapping/>
+  </p:clrMapOvr>
+</p:notes>
+</file>
+
 <file path=ppt/notesSlides/notesSlide2.xml><?xml version="1.0" encoding="utf-8"?>
 <p:notes xmlns:a="http://schemas.openxmlformats.org/drawingml/2006/main" xmlns:r="http://schemas.openxmlformats.org/officeDocument/2006/relationships" xmlns:p="http://schemas.openxmlformats.org/presentationml/2006/main">
   <p:cSld>
@@ -1050,47 +1184,86 @@
           <a:bodyPr/>
           <a:lstStyle/>
           <a:p>
-            <a:pPr marL="171450" indent="-171450">
-              <a:buFontTx/>
-              <a:buChar char="-"/>
+            <a:r>
+              <a:rPr lang="en-AU" dirty="0" smtClean="0"/>
+              <a:t>Secondary objective is</a:t>
+            </a:r>
+            <a:r>
+              <a:rPr lang="en-AU" baseline="0" dirty="0" smtClean="0"/>
+              <a:t> to demonstrate that a functional CubeSat can be built on a low budget.  </a:t>
+            </a:r>
+          </a:p>
+          <a:p>
+            <a:r>
+              <a:rPr lang="en-AU" baseline="0" dirty="0" smtClean="0"/>
+              <a:t>Current </a:t>
+            </a:r>
+            <a:r>
+              <a:rPr lang="en-AU" baseline="0" dirty="0" err="1" smtClean="0"/>
+              <a:t>cubesats</a:t>
+            </a:r>
+            <a:r>
+              <a:rPr lang="en-AU" baseline="0" dirty="0" smtClean="0"/>
+              <a:t> </a:t>
+            </a:r>
+            <a:r>
+              <a:rPr lang="en-AU" baseline="0" dirty="0" err="1" smtClean="0"/>
+              <a:t>eg</a:t>
+            </a:r>
+            <a:r>
+              <a:rPr lang="en-AU" baseline="0" dirty="0" smtClean="0"/>
+              <a:t>. </a:t>
+            </a:r>
+            <a:r>
+              <a:rPr lang="en-AU" baseline="0" dirty="0" err="1" smtClean="0"/>
+              <a:t>Skycube</a:t>
+            </a:r>
+            <a:r>
+              <a:rPr lang="en-AU" baseline="0" dirty="0" smtClean="0"/>
+              <a:t> cost $100000 dollars – and even then sometimes they don’t work.  In their review they said that if they did it again they would concentre on the simple things – well yes, we would too if we had this much money behind it – but we don’t which gives us flexibility to mess up.</a:t>
+            </a:r>
+          </a:p>
+          <a:p>
+            <a:r>
+              <a:rPr lang="en-AU" baseline="0" dirty="0" smtClean="0"/>
+              <a:t>Solve problem of high end satellites, using low end ones.</a:t>
+            </a:r>
+          </a:p>
+          <a:p>
+            <a:endParaRPr lang="en-AU" baseline="0" dirty="0" smtClean="0"/>
+          </a:p>
+          <a:p>
+            <a:r>
+              <a:rPr lang="en-AU" baseline="0" dirty="0" smtClean="0"/>
+              <a:t>To this end we are focusing on what is hard to </a:t>
+            </a:r>
+            <a:r>
+              <a:rPr lang="en-AU" baseline="0" dirty="0" err="1" smtClean="0"/>
+              <a:t>to</a:t>
+            </a:r>
+            <a:r>
+              <a:rPr lang="en-AU" baseline="0" dirty="0" smtClean="0"/>
+              <a:t> cheaply in space.</a:t>
+            </a:r>
+          </a:p>
+          <a:p>
+            <a:pPr marL="228600" indent="-228600">
+              <a:buAutoNum type="arabicPeriod"/>
             </a:pPr>
             <a:r>
-              <a:rPr lang="en-AU" dirty="0" smtClean="0"/>
-              <a:t>Go though component selection</a:t>
-            </a:r>
-          </a:p>
-          <a:p>
-            <a:pPr marL="171450" indent="-171450">
-              <a:buFontTx/>
-              <a:buChar char="-"/>
+              <a:rPr lang="en-AU" baseline="0" dirty="0" smtClean="0"/>
+              <a:t>Generate enough power</a:t>
+            </a:r>
+          </a:p>
+          <a:p>
+            <a:pPr marL="228600" indent="-228600">
+              <a:buAutoNum type="arabicPeriod"/>
             </a:pPr>
-            <a:endParaRPr lang="en-AU" baseline="0" dirty="0" smtClean="0"/>
-          </a:p>
-          <a:p>
-            <a:pPr marL="171450" indent="-171450">
-              <a:buFontTx/>
-              <a:buChar char="-"/>
-            </a:pPr>
             <a:r>
               <a:rPr lang="en-AU" baseline="0" dirty="0" smtClean="0"/>
-              <a:t>Note: we were able to achieve such a high mass budget since </a:t>
-            </a:r>
-            <a:r>
-              <a:rPr lang="en-AU" baseline="0" dirty="0" err="1" smtClean="0"/>
-              <a:t>expesive</a:t>
-            </a:r>
-            <a:r>
-              <a:rPr lang="en-AU" baseline="0" dirty="0" smtClean="0"/>
-              <a:t>, space rated and optimised </a:t>
-            </a:r>
-            <a:r>
-              <a:rPr lang="en-AU" baseline="0" dirty="0" err="1" smtClean="0"/>
-              <a:t>componenet</a:t>
-            </a:r>
-            <a:r>
-              <a:rPr lang="en-AU" baseline="0" dirty="0" smtClean="0"/>
-              <a:t> were selected. </a:t>
-            </a:r>
+              <a:t>Transmit enough data back</a:t>
+            </a:r>
+            <a:endParaRPr lang="en-AU" dirty="0"/>
           </a:p>
         </p:txBody>
       </p:sp>
@@ -1111,7 +1284,7 @@
           <a:p>
             <a:fld id="{EE3D259A-0B22-4204-B86E-533FB56D31D0}" type="slidenum">
               <a:rPr lang="en-AU" smtClean="0"/>
-              <a:t>13</a:t>
+              <a:t>5</a:t>
             </a:fld>
             <a:endParaRPr lang="en-AU"/>
           </a:p>
@@ -1120,7 +1293,7 @@
     </p:spTree>
     <p:extLst>
       <p:ext uri="{BB962C8B-B14F-4D97-AF65-F5344CB8AC3E}">
-        <p14:creationId xmlns:p14="http://schemas.microsoft.com/office/powerpoint/2010/main" val="2482216687"/>
+        <p14:creationId xmlns:p14="http://schemas.microsoft.com/office/powerpoint/2010/main" val="348040942"/>
       </p:ext>
     </p:extLst>
   </p:cSld>
@@ -1174,54 +1347,82 @@
           <a:bodyPr/>
           <a:lstStyle/>
           <a:p>
+            <a:pPr marL="0" marR="0" indent="0" algn="l" defTabSz="914400" rtl="0" eaLnBrk="1" fontAlgn="auto" latinLnBrk="0" hangingPunct="1">
+              <a:lnSpc>
+                <a:spcPct val="100000"/>
+              </a:lnSpc>
+              <a:spcBef>
+                <a:spcPts val="0"/>
+              </a:spcBef>
+              <a:spcAft>
+                <a:spcPts val="0"/>
+              </a:spcAft>
+              <a:buClrTx/>
+              <a:buSzTx/>
+              <a:buFontTx/>
+              <a:buNone/>
+              <a:tabLst/>
+              <a:defRPr/>
+            </a:pPr>
             <a:r>
               <a:rPr lang="en-AU" dirty="0" smtClean="0"/>
-              <a:t>Since this spacecraft is performing Earth observation, it requires a pointing budget. This refers to the ability to orient the spacecraft towards a target having a specific geographical orientation. Along with the pointing accuracy, the satellite needs to be able to map the location from its own location. Errors in both pointing and mapping accuracies will be discussed here.</a:t>
-            </a:r>
-          </a:p>
-          <a:p>
+              <a:t>TOM PLEASE WRITE HERE WHY THERE IS NORMALLY NOT ENOUGH TRANSMISSION</a:t>
+            </a:r>
+            <a:r>
+              <a:rPr lang="en-AU" baseline="0" dirty="0" smtClean="0"/>
+              <a:t> POWER</a:t>
+            </a:r>
+            <a:endParaRPr lang="en-AU" dirty="0" smtClean="0"/>
+          </a:p>
+          <a:p>
+            <a:pPr marL="0" marR="0" indent="0" algn="l" defTabSz="914400" rtl="0" eaLnBrk="1" fontAlgn="auto" latinLnBrk="0" hangingPunct="1">
+              <a:lnSpc>
+                <a:spcPct val="100000"/>
+              </a:lnSpc>
+              <a:spcBef>
+                <a:spcPts val="0"/>
+              </a:spcBef>
+              <a:spcAft>
+                <a:spcPts val="0"/>
+              </a:spcAft>
+              <a:buClrTx/>
+              <a:buSzTx/>
+              <a:buFontTx/>
+              <a:buNone/>
+              <a:tabLst/>
+              <a:defRPr/>
+            </a:pPr>
+            <a:endParaRPr lang="en-AU" dirty="0" smtClean="0"/>
+          </a:p>
+          <a:p>
+            <a:pPr marL="0" marR="0" indent="0" algn="l" defTabSz="914400" rtl="0" eaLnBrk="1" fontAlgn="auto" latinLnBrk="0" hangingPunct="1">
+              <a:lnSpc>
+                <a:spcPct val="100000"/>
+              </a:lnSpc>
+              <a:spcBef>
+                <a:spcPts val="0"/>
+              </a:spcBef>
+              <a:spcAft>
+                <a:spcPts val="0"/>
+              </a:spcAft>
+              <a:buClrTx/>
+              <a:buSzTx/>
+              <a:buFontTx/>
+              <a:buNone/>
+              <a:tabLst/>
+              <a:defRPr/>
+            </a:pPr>
             <a:r>
               <a:rPr lang="en-AU" dirty="0" smtClean="0"/>
-              <a:t> The attitude control system for SnapSat will consist of three air core </a:t>
-            </a:r>
-            <a:r>
-              <a:rPr lang="en-AU" dirty="0" err="1" smtClean="0"/>
-              <a:t>magnetorquers</a:t>
-            </a:r>
-            <a:r>
-              <a:rPr lang="en-AU" dirty="0" smtClean="0"/>
-              <a:t> operating on 3 separate planes capable of producing 0.05Am2 each.  Only two of the </a:t>
-            </a:r>
-            <a:r>
-              <a:rPr lang="en-AU" dirty="0" err="1" smtClean="0"/>
-              <a:t>magnetorquers</a:t>
-            </a:r>
-            <a:r>
-              <a:rPr lang="en-AU" dirty="0" smtClean="0"/>
-              <a:t> can work at any one time, which will reduce total power usage for the system.  The first component of the determination system is a 9-DOF IMU which will primarily be used in the de-tumble phase due to accumulated error issues with this equipment which are expected to occur later in the mission.  The second component is a solar tracker system consisting of six photodiode pins, one on each face, which will be used to accurately determine the attitude of the satellite based on the location of the Sun. </a:t>
-            </a:r>
-          </a:p>
-          <a:p>
-            <a:r>
-              <a:rPr lang="en-AU" dirty="0" smtClean="0"/>
-              <a:t>According to the specification data, the IMU will experience a 2\% error based on the expected temperature range, although this will increase over the course of the mission due to the accumulated error.  Although the exact error will need to be calculated during calibration and testing, based on current literature there are a number of similar solar tracking systems which are able to achieve an accuracy of 0.2\% \cite{</a:t>
-            </a:r>
-            <a:r>
-              <a:rPr lang="en-AU" dirty="0" err="1" smtClean="0"/>
-              <a:t>beaudette</a:t>
-            </a:r>
-            <a:r>
-              <a:rPr lang="en-AU" dirty="0" smtClean="0"/>
-              <a:t>}.  However given the low budget and subsequently slightly inferior equipment conservative estimate of 0.5\% will be used for the solar tracker error.  In regards to the </a:t>
-            </a:r>
-            <a:r>
-              <a:rPr lang="en-AU" dirty="0" err="1" smtClean="0"/>
-              <a:t>magnetorquers</a:t>
-            </a:r>
-            <a:r>
-              <a:rPr lang="en-AU" dirty="0" smtClean="0"/>
-              <a:t> expected error based on similar models 1\%, although error will be finalised during the calibration and testing phase.</a:t>
-            </a:r>
+              <a:t>First</a:t>
+            </a:r>
+            <a:r>
+              <a:rPr lang="en-AU" baseline="0" dirty="0" smtClean="0"/>
+              <a:t> innovation is in the structure</a:t>
+            </a:r>
+            <a:endParaRPr lang="en-AU" dirty="0" smtClean="0"/>
+          </a:p>
+          <a:p>
             <a:endParaRPr lang="en-AU" dirty="0"/>
           </a:p>
         </p:txBody>
@@ -1243,7 +1444,7 @@
           <a:p>
             <a:fld id="{EE3D259A-0B22-4204-B86E-533FB56D31D0}" type="slidenum">
               <a:rPr lang="en-AU" smtClean="0"/>
-              <a:t>15</a:t>
+              <a:t>6</a:t>
             </a:fld>
             <a:endParaRPr lang="en-AU"/>
           </a:p>
@@ -1252,7 +1453,320 @@
     </p:spTree>
     <p:extLst>
       <p:ext uri="{BB962C8B-B14F-4D97-AF65-F5344CB8AC3E}">
-        <p14:creationId xmlns:p14="http://schemas.microsoft.com/office/powerpoint/2010/main" val="3385491287"/>
+        <p14:creationId xmlns:p14="http://schemas.microsoft.com/office/powerpoint/2010/main" val="2400016214"/>
+      </p:ext>
+    </p:extLst>
+  </p:cSld>
+  <p:clrMapOvr>
+    <a:masterClrMapping/>
+  </p:clrMapOvr>
+</p:notes>
+</file>
+
+<file path=ppt/notesSlides/notesSlide7.xml><?xml version="1.0" encoding="utf-8"?>
+<p:notes xmlns:a="http://schemas.openxmlformats.org/drawingml/2006/main" xmlns:r="http://schemas.openxmlformats.org/officeDocument/2006/relationships" xmlns:p="http://schemas.openxmlformats.org/presentationml/2006/main">
+  <p:cSld>
+    <p:spTree>
+      <p:nvGrpSpPr>
+        <p:cNvPr id="1" name=""/>
+        <p:cNvGrpSpPr/>
+        <p:nvPr/>
+      </p:nvGrpSpPr>
+      <p:grpSpPr>
+        <a:xfrm>
+          <a:off x="0" y="0"/>
+          <a:ext cx="0" cy="0"/>
+          <a:chOff x="0" y="0"/>
+          <a:chExt cx="0" cy="0"/>
+        </a:xfrm>
+      </p:grpSpPr>
+      <p:sp>
+        <p:nvSpPr>
+          <p:cNvPr id="2" name="Slide Image Placeholder 1"/>
+          <p:cNvSpPr>
+            <a:spLocks noGrp="1" noRot="1" noChangeAspect="1"/>
+          </p:cNvSpPr>
+          <p:nvPr>
+            <p:ph type="sldImg"/>
+          </p:nvPr>
+        </p:nvSpPr>
+        <p:spPr/>
+      </p:sp>
+      <p:sp>
+        <p:nvSpPr>
+          <p:cNvPr id="3" name="Notes Placeholder 2"/>
+          <p:cNvSpPr>
+            <a:spLocks noGrp="1"/>
+          </p:cNvSpPr>
+          <p:nvPr>
+            <p:ph type="body" idx="1"/>
+          </p:nvPr>
+        </p:nvSpPr>
+        <p:spPr/>
+        <p:txBody>
+          <a:bodyPr/>
+          <a:lstStyle/>
+          <a:p>
+            <a:r>
+              <a:rPr lang="en-AU" dirty="0" smtClean="0"/>
+              <a:t>Option</a:t>
+            </a:r>
+            <a:r>
+              <a:rPr lang="en-AU" baseline="0" dirty="0" smtClean="0"/>
+              <a:t> 2 is 3D printing, will be more accessible to people in future</a:t>
+            </a:r>
+            <a:endParaRPr lang="en-AU" dirty="0"/>
+          </a:p>
+        </p:txBody>
+      </p:sp>
+      <p:sp>
+        <p:nvSpPr>
+          <p:cNvPr id="4" name="Slide Number Placeholder 3"/>
+          <p:cNvSpPr>
+            <a:spLocks noGrp="1"/>
+          </p:cNvSpPr>
+          <p:nvPr>
+            <p:ph type="sldNum" sz="quarter" idx="10"/>
+          </p:nvPr>
+        </p:nvSpPr>
+        <p:spPr/>
+        <p:txBody>
+          <a:bodyPr/>
+          <a:lstStyle/>
+          <a:p>
+            <a:fld id="{EE3D259A-0B22-4204-B86E-533FB56D31D0}" type="slidenum">
+              <a:rPr lang="en-AU" smtClean="0"/>
+              <a:t>8</a:t>
+            </a:fld>
+            <a:endParaRPr lang="en-AU"/>
+          </a:p>
+        </p:txBody>
+      </p:sp>
+    </p:spTree>
+    <p:extLst>
+      <p:ext uri="{BB962C8B-B14F-4D97-AF65-F5344CB8AC3E}">
+        <p14:creationId xmlns:p14="http://schemas.microsoft.com/office/powerpoint/2010/main" val="175394851"/>
+      </p:ext>
+    </p:extLst>
+  </p:cSld>
+  <p:clrMapOvr>
+    <a:masterClrMapping/>
+  </p:clrMapOvr>
+</p:notes>
+</file>
+
+<file path=ppt/notesSlides/notesSlide8.xml><?xml version="1.0" encoding="utf-8"?>
+<p:notes xmlns:a="http://schemas.openxmlformats.org/drawingml/2006/main" xmlns:r="http://schemas.openxmlformats.org/officeDocument/2006/relationships" xmlns:p="http://schemas.openxmlformats.org/presentationml/2006/main">
+  <p:cSld>
+    <p:spTree>
+      <p:nvGrpSpPr>
+        <p:cNvPr id="1" name=""/>
+        <p:cNvGrpSpPr/>
+        <p:nvPr/>
+      </p:nvGrpSpPr>
+      <p:grpSpPr>
+        <a:xfrm>
+          <a:off x="0" y="0"/>
+          <a:ext cx="0" cy="0"/>
+          <a:chOff x="0" y="0"/>
+          <a:chExt cx="0" cy="0"/>
+        </a:xfrm>
+      </p:grpSpPr>
+      <p:sp>
+        <p:nvSpPr>
+          <p:cNvPr id="2" name="Slide Image Placeholder 1"/>
+          <p:cNvSpPr>
+            <a:spLocks noGrp="1" noRot="1" noChangeAspect="1"/>
+          </p:cNvSpPr>
+          <p:nvPr>
+            <p:ph type="sldImg"/>
+          </p:nvPr>
+        </p:nvSpPr>
+        <p:spPr/>
+      </p:sp>
+      <p:sp>
+        <p:nvSpPr>
+          <p:cNvPr id="3" name="Notes Placeholder 2"/>
+          <p:cNvSpPr>
+            <a:spLocks noGrp="1"/>
+          </p:cNvSpPr>
+          <p:nvPr>
+            <p:ph type="body" idx="1"/>
+          </p:nvPr>
+        </p:nvSpPr>
+        <p:spPr/>
+        <p:txBody>
+          <a:bodyPr/>
+          <a:lstStyle/>
+          <a:p>
+            <a:pPr marL="171450" indent="-171450">
+              <a:buFontTx/>
+              <a:buChar char="-"/>
+            </a:pPr>
+            <a:r>
+              <a:rPr lang="en-AU" dirty="0" smtClean="0"/>
+              <a:t>Go though component selection</a:t>
+            </a:r>
+          </a:p>
+          <a:p>
+            <a:pPr marL="171450" indent="-171450">
+              <a:buFontTx/>
+              <a:buChar char="-"/>
+            </a:pPr>
+            <a:endParaRPr lang="en-AU" baseline="0" dirty="0" smtClean="0"/>
+          </a:p>
+          <a:p>
+            <a:pPr marL="171450" indent="-171450">
+              <a:buFontTx/>
+              <a:buChar char="-"/>
+            </a:pPr>
+            <a:r>
+              <a:rPr lang="en-AU" baseline="0" dirty="0" smtClean="0"/>
+              <a:t>Note: we were able to achieve such a high mass budget since </a:t>
+            </a:r>
+            <a:r>
+              <a:rPr lang="en-AU" baseline="0" dirty="0" err="1" smtClean="0"/>
+              <a:t>expesive</a:t>
+            </a:r>
+            <a:r>
+              <a:rPr lang="en-AU" baseline="0" dirty="0" smtClean="0"/>
+              <a:t>, space rated and optimised </a:t>
+            </a:r>
+            <a:r>
+              <a:rPr lang="en-AU" baseline="0" dirty="0" err="1" smtClean="0"/>
+              <a:t>componenet</a:t>
+            </a:r>
+            <a:r>
+              <a:rPr lang="en-AU" baseline="0" dirty="0" smtClean="0"/>
+              <a:t> were selected. </a:t>
+            </a:r>
+          </a:p>
+        </p:txBody>
+      </p:sp>
+      <p:sp>
+        <p:nvSpPr>
+          <p:cNvPr id="4" name="Slide Number Placeholder 3"/>
+          <p:cNvSpPr>
+            <a:spLocks noGrp="1"/>
+          </p:cNvSpPr>
+          <p:nvPr>
+            <p:ph type="sldNum" sz="quarter" idx="10"/>
+          </p:nvPr>
+        </p:nvSpPr>
+        <p:spPr/>
+        <p:txBody>
+          <a:bodyPr/>
+          <a:lstStyle/>
+          <a:p>
+            <a:fld id="{EE3D259A-0B22-4204-B86E-533FB56D31D0}" type="slidenum">
+              <a:rPr lang="en-AU" smtClean="0"/>
+              <a:t>12</a:t>
+            </a:fld>
+            <a:endParaRPr lang="en-AU"/>
+          </a:p>
+        </p:txBody>
+      </p:sp>
+    </p:spTree>
+    <p:extLst>
+      <p:ext uri="{BB962C8B-B14F-4D97-AF65-F5344CB8AC3E}">
+        <p14:creationId xmlns:p14="http://schemas.microsoft.com/office/powerpoint/2010/main" val="2482216687"/>
+      </p:ext>
+    </p:extLst>
+  </p:cSld>
+  <p:clrMapOvr>
+    <a:masterClrMapping/>
+  </p:clrMapOvr>
+</p:notes>
+</file>
+
+<file path=ppt/notesSlides/notesSlide9.xml><?xml version="1.0" encoding="utf-8"?>
+<p:notes xmlns:a="http://schemas.openxmlformats.org/drawingml/2006/main" xmlns:r="http://schemas.openxmlformats.org/officeDocument/2006/relationships" xmlns:p="http://schemas.openxmlformats.org/presentationml/2006/main">
+  <p:cSld>
+    <p:spTree>
+      <p:nvGrpSpPr>
+        <p:cNvPr id="1" name=""/>
+        <p:cNvGrpSpPr/>
+        <p:nvPr/>
+      </p:nvGrpSpPr>
+      <p:grpSpPr>
+        <a:xfrm>
+          <a:off x="0" y="0"/>
+          <a:ext cx="0" cy="0"/>
+          <a:chOff x="0" y="0"/>
+          <a:chExt cx="0" cy="0"/>
+        </a:xfrm>
+      </p:grpSpPr>
+      <p:sp>
+        <p:nvSpPr>
+          <p:cNvPr id="2" name="Slide Image Placeholder 1"/>
+          <p:cNvSpPr>
+            <a:spLocks noGrp="1" noRot="1" noChangeAspect="1"/>
+          </p:cNvSpPr>
+          <p:nvPr>
+            <p:ph type="sldImg"/>
+          </p:nvPr>
+        </p:nvSpPr>
+        <p:spPr/>
+      </p:sp>
+      <p:sp>
+        <p:nvSpPr>
+          <p:cNvPr id="3" name="Notes Placeholder 2"/>
+          <p:cNvSpPr>
+            <a:spLocks noGrp="1"/>
+          </p:cNvSpPr>
+          <p:nvPr>
+            <p:ph type="body" idx="1"/>
+          </p:nvPr>
+        </p:nvSpPr>
+        <p:spPr/>
+        <p:txBody>
+          <a:bodyPr/>
+          <a:lstStyle/>
+          <a:p>
+            <a:r>
+              <a:rPr lang="en-AU" dirty="0" smtClean="0"/>
+              <a:t>Most power is reserved for</a:t>
+            </a:r>
+            <a:r>
+              <a:rPr lang="en-AU" baseline="0" dirty="0" smtClean="0"/>
+              <a:t> transmissions</a:t>
+            </a:r>
+          </a:p>
+          <a:p>
+            <a:r>
+              <a:rPr lang="en-AU" baseline="0" dirty="0" smtClean="0"/>
+              <a:t>Priority one is a working cube sat, then the quality of the payload</a:t>
+            </a:r>
+          </a:p>
+        </p:txBody>
+      </p:sp>
+      <p:sp>
+        <p:nvSpPr>
+          <p:cNvPr id="4" name="Slide Number Placeholder 3"/>
+          <p:cNvSpPr>
+            <a:spLocks noGrp="1"/>
+          </p:cNvSpPr>
+          <p:nvPr>
+            <p:ph type="sldNum" sz="quarter" idx="10"/>
+          </p:nvPr>
+        </p:nvSpPr>
+        <p:spPr/>
+        <p:txBody>
+          <a:bodyPr/>
+          <a:lstStyle/>
+          <a:p>
+            <a:fld id="{EE3D259A-0B22-4204-B86E-533FB56D31D0}" type="slidenum">
+              <a:rPr lang="en-AU" smtClean="0"/>
+              <a:t>13</a:t>
+            </a:fld>
+            <a:endParaRPr lang="en-AU"/>
+          </a:p>
+        </p:txBody>
+      </p:sp>
+    </p:spTree>
+    <p:extLst>
+      <p:ext uri="{BB962C8B-B14F-4D97-AF65-F5344CB8AC3E}">
+        <p14:creationId xmlns:p14="http://schemas.microsoft.com/office/powerpoint/2010/main" val="777384008"/>
       </p:ext>
     </p:extLst>
   </p:cSld>
@@ -4983,30 +5497,7 @@
           <a:p>
             <a:r>
               <a:rPr lang="en-AU" dirty="0" smtClean="0"/>
-              <a:t>Design Considerations</a:t>
-            </a:r>
-            <a:endParaRPr lang="en-AU" dirty="0"/>
-          </a:p>
-        </p:txBody>
-      </p:sp>
-      <p:sp>
-        <p:nvSpPr>
-          <p:cNvPr id="3" name="Content Placeholder 2"/>
-          <p:cNvSpPr>
-            <a:spLocks noGrp="1"/>
-          </p:cNvSpPr>
-          <p:nvPr>
-            <p:ph sz="half" idx="1"/>
-          </p:nvPr>
-        </p:nvSpPr>
-        <p:spPr/>
-        <p:txBody>
-          <a:bodyPr/>
-          <a:lstStyle/>
-          <a:p>
-            <a:r>
-              <a:rPr lang="en-AU" dirty="0" smtClean="0"/>
-              <a:t>(include picture of deployed solar panels also?)</a:t>
+              <a:t>Deployable Solar Panels</a:t>
             </a:r>
             <a:endParaRPr lang="en-AU" dirty="0"/>
           </a:p>
@@ -5014,174 +5505,102 @@
       </p:sp>
       <p:pic>
         <p:nvPicPr>
-          <p:cNvPr id="5" name="Content Placeholder 4"/>
+          <p:cNvPr id="4" name="Picture 3"/>
           <p:cNvPicPr>
-            <a:picLocks noGrp="1" noChangeAspect="1"/>
+            <a:picLocks noChangeAspect="1"/>
           </p:cNvPicPr>
-          <p:nvPr>
-            <p:ph sz="half" idx="2"/>
-          </p:nvPr>
+          <p:nvPr/>
         </p:nvPicPr>
-        <p:blipFill rotWithShape="1">
-          <a:blip r:embed="rId2" cstate="print">
-            <a:extLst>
-              <a:ext uri="{28A0092B-C50C-407E-A947-70E740481C1C}">
-                <a14:useLocalDpi xmlns:a14="http://schemas.microsoft.com/office/drawing/2010/main" val="0"/>
-              </a:ext>
-            </a:extLst>
-          </a:blip>
-          <a:srcRect l="30126" r="19902"/>
-          <a:stretch/>
+        <p:blipFill>
+          <a:blip r:embed="rId2"/>
+          <a:stretch>
+            <a:fillRect/>
+          </a:stretch>
         </p:blipFill>
         <p:spPr>
           <a:xfrm>
-            <a:off x="4641668" y="1288869"/>
-            <a:ext cx="4190866" cy="4798422"/>
+            <a:off x="273377" y="2194268"/>
+            <a:ext cx="8549630" cy="4293780"/>
           </a:xfrm>
-          <a:prstGeom prst="roundRect">
-            <a:avLst>
-              <a:gd name="adj" fmla="val 2542"/>
-            </a:avLst>
+          <a:prstGeom prst="rect">
+            <a:avLst/>
           </a:prstGeom>
-          <a:solidFill>
-            <a:srgbClr val="FFFFFF">
-              <a:shade val="85000"/>
-            </a:srgbClr>
-          </a:solidFill>
-          <a:ln>
-            <a:noFill/>
-          </a:ln>
-          <a:effectLst/>
         </p:spPr>
       </p:pic>
       <p:sp>
         <p:nvSpPr>
-          <p:cNvPr id="6" name="Date Placeholder 3"/>
-          <p:cNvSpPr>
-            <a:spLocks noGrp="1"/>
-          </p:cNvSpPr>
-          <p:nvPr>
-            <p:ph type="dt" sz="half" idx="10"/>
+          <p:cNvPr id="3" name="Content Placeholder 2"/>
+          <p:cNvSpPr>
+            <a:spLocks noGrp="1"/>
+          </p:cNvSpPr>
+          <p:nvPr>
+            <p:ph idx="1"/>
           </p:nvPr>
         </p:nvSpPr>
         <p:spPr>
           <a:xfrm>
-            <a:off x="628650" y="6356351"/>
-            <a:ext cx="2057400" cy="365125"/>
+            <a:off x="604842" y="1314277"/>
+            <a:ext cx="7886700" cy="4853260"/>
           </a:xfrm>
         </p:spPr>
         <p:txBody>
           <a:bodyPr/>
-          <a:lstStyle>
-            <a:lvl1pPr>
-              <a:defRPr>
+          <a:lstStyle/>
+          <a:p>
+            <a:pPr marL="0" indent="0">
+              <a:buNone/>
+            </a:pPr>
+            <a:r>
+              <a:rPr lang="en-AU" dirty="0" smtClean="0"/>
+              <a:t>Inspirations</a:t>
+            </a:r>
+          </a:p>
+          <a:p>
+            <a:r>
+              <a:rPr lang="en-AU" dirty="0" err="1" smtClean="0"/>
+              <a:t>SkyCube</a:t>
+            </a:r>
+            <a:r>
+              <a:rPr lang="en-AU" dirty="0" smtClean="0"/>
+              <a:t> - Kickstarter</a:t>
+            </a:r>
+            <a:endParaRPr lang="en-AU" dirty="0" smtClean="0">
+              <a:solidFill>
+                <a:schemeClr val="bg1"/>
+              </a:solidFill>
+            </a:endParaRPr>
+          </a:p>
+          <a:p>
+            <a:r>
+              <a:rPr lang="en-AU" dirty="0" err="1" smtClean="0">
                 <a:solidFill>
-                  <a:schemeClr val="accent4">
-                    <a:lumMod val="75000"/>
-                  </a:schemeClr>
+                  <a:schemeClr val="bg1"/>
                 </a:solidFill>
-              </a:defRPr>
-            </a:lvl1pPr>
-          </a:lstStyle>
-          <a:p>
+              </a:rPr>
+              <a:t>FlowerSat</a:t>
+            </a:r>
             <a:r>
               <a:rPr lang="en-AU" dirty="0" smtClean="0">
-                <a:latin typeface="+mj-lt"/>
+                <a:solidFill>
+                  <a:schemeClr val="bg1"/>
+                </a:solidFill>
               </a:rPr>
-              <a:t>Tuesday 24 August 2015</a:t>
+              <a:t> – STEMN</a:t>
+            </a:r>
+          </a:p>
+          <a:p>
+            <a:r>
+              <a:rPr lang="en-AU" dirty="0" smtClean="0">
+                <a:solidFill>
+                  <a:schemeClr val="bg1"/>
+                </a:solidFill>
+              </a:rPr>
+              <a:t>Only if we 3D print structure</a:t>
             </a:r>
             <a:endParaRPr lang="en-AU" dirty="0">
-              <a:latin typeface="+mj-lt"/>
-            </a:endParaRPr>
-          </a:p>
-        </p:txBody>
-      </p:sp>
-      <p:sp>
-        <p:nvSpPr>
-          <p:cNvPr id="7" name="Footer Placeholder 4"/>
-          <p:cNvSpPr>
-            <a:spLocks noGrp="1"/>
-          </p:cNvSpPr>
-          <p:nvPr>
-            <p:ph type="ftr" sz="quarter" idx="11"/>
-          </p:nvPr>
-        </p:nvSpPr>
-        <p:spPr>
-          <a:xfrm>
-            <a:off x="3028950" y="6356351"/>
-            <a:ext cx="3086100" cy="365125"/>
-          </a:xfrm>
-        </p:spPr>
-        <p:txBody>
-          <a:bodyPr/>
-          <a:lstStyle>
-            <a:lvl1pPr>
-              <a:defRPr lang="en-AU" sz="1200" kern="1200" dirty="0" smtClean="0">
-                <a:solidFill>
-                  <a:schemeClr val="accent4">
-                    <a:lumMod val="75000"/>
-                  </a:schemeClr>
-                </a:solidFill>
-                <a:latin typeface="+mn-lt"/>
-                <a:ea typeface="+mn-ea"/>
-                <a:cs typeface="+mn-cs"/>
-              </a:defRPr>
-            </a:lvl1pPr>
-          </a:lstStyle>
-          <a:p>
-            <a:r>
-              <a:rPr lang="en-AU" dirty="0" smtClean="0">
-                <a:latin typeface="+mj-lt"/>
-              </a:rPr>
-              <a:t>SnapSat Preliminary Design Presentation</a:t>
-            </a:r>
-            <a:endParaRPr lang="en-AU" dirty="0">
-              <a:latin typeface="+mj-lt"/>
-            </a:endParaRPr>
-          </a:p>
-        </p:txBody>
-      </p:sp>
-      <p:sp>
-        <p:nvSpPr>
-          <p:cNvPr id="8" name="Slide Number Placeholder 5"/>
-          <p:cNvSpPr>
-            <a:spLocks noGrp="1"/>
-          </p:cNvSpPr>
-          <p:nvPr>
-            <p:ph type="sldNum" sz="quarter" idx="12"/>
-          </p:nvPr>
-        </p:nvSpPr>
-        <p:spPr>
-          <a:xfrm>
-            <a:off x="6457950" y="6356351"/>
-            <a:ext cx="2057400" cy="365125"/>
-          </a:xfrm>
-        </p:spPr>
-        <p:txBody>
-          <a:bodyPr/>
-          <a:lstStyle>
-            <a:lvl1pPr>
-              <a:defRPr lang="en-AU" sz="1200" kern="1200" smtClean="0">
-                <a:solidFill>
-                  <a:schemeClr val="accent4">
-                    <a:lumMod val="75000"/>
-                  </a:schemeClr>
-                </a:solidFill>
-                <a:latin typeface="+mn-lt"/>
-                <a:ea typeface="+mn-ea"/>
-                <a:cs typeface="+mn-cs"/>
-              </a:defRPr>
-            </a:lvl1pPr>
-          </a:lstStyle>
-          <a:p>
-            <a:fld id="{6C5E801A-27FC-4E4C-A43C-DCD3D3677F04}" type="slidenum">
-              <a:rPr lang="en-AU" smtClean="0">
-                <a:latin typeface="+mj-lt"/>
-              </a:rPr>
-              <a:t>10</a:t>
-            </a:fld>
-            <a:endParaRPr lang="en-AU" dirty="0">
-              <a:latin typeface="+mj-lt"/>
+              <a:solidFill>
+                <a:schemeClr val="bg1"/>
+              </a:solidFill>
             </a:endParaRPr>
           </a:p>
         </p:txBody>
@@ -5189,20 +5608,13 @@
     </p:spTree>
     <p:extLst>
       <p:ext uri="{BB962C8B-B14F-4D97-AF65-F5344CB8AC3E}">
-        <p14:creationId xmlns:p14="http://schemas.microsoft.com/office/powerpoint/2010/main" val="1456499067"/>
+        <p14:creationId xmlns:p14="http://schemas.microsoft.com/office/powerpoint/2010/main" val="1745869430"/>
       </p:ext>
     </p:extLst>
   </p:cSld>
   <p:clrMapOvr>
     <a:masterClrMapping/>
   </p:clrMapOvr>
-  <p:timing>
-    <p:tnLst>
-      <p:par>
-        <p:cTn id="1" dur="indefinite" restart="never" nodeType="tmRoot"/>
-      </p:par>
-    </p:tnLst>
-  </p:timing>
 </p:sld>
 </file>
 
@@ -5240,78 +5652,6 @@
           <a:p>
             <a:r>
               <a:rPr lang="en-AU" dirty="0" smtClean="0"/>
-              <a:t>Simulation</a:t>
-            </a:r>
-            <a:endParaRPr lang="en-AU" dirty="0"/>
-          </a:p>
-        </p:txBody>
-      </p:sp>
-      <p:sp>
-        <p:nvSpPr>
-          <p:cNvPr id="3" name="Content Placeholder 2"/>
-          <p:cNvSpPr>
-            <a:spLocks noGrp="1"/>
-          </p:cNvSpPr>
-          <p:nvPr>
-            <p:ph idx="1"/>
-          </p:nvPr>
-        </p:nvSpPr>
-        <p:spPr/>
-        <p:txBody>
-          <a:bodyPr/>
-          <a:lstStyle/>
-          <a:p>
-            <a:endParaRPr lang="en-AU"/>
-          </a:p>
-        </p:txBody>
-      </p:sp>
-    </p:spTree>
-    <p:extLst>
-      <p:ext uri="{BB962C8B-B14F-4D97-AF65-F5344CB8AC3E}">
-        <p14:creationId xmlns:p14="http://schemas.microsoft.com/office/powerpoint/2010/main" val="2685337617"/>
-      </p:ext>
-    </p:extLst>
-  </p:cSld>
-  <p:clrMapOvr>
-    <a:masterClrMapping/>
-  </p:clrMapOvr>
-</p:sld>
-</file>
-
-<file path=ppt/slides/slide12.xml><?xml version="1.0" encoding="utf-8"?>
-<p:sld xmlns:a="http://schemas.openxmlformats.org/drawingml/2006/main" xmlns:r="http://schemas.openxmlformats.org/officeDocument/2006/relationships" xmlns:p="http://schemas.openxmlformats.org/presentationml/2006/main">
-  <p:cSld>
-    <p:spTree>
-      <p:nvGrpSpPr>
-        <p:cNvPr id="1" name=""/>
-        <p:cNvGrpSpPr/>
-        <p:nvPr/>
-      </p:nvGrpSpPr>
-      <p:grpSpPr>
-        <a:xfrm>
-          <a:off x="0" y="0"/>
-          <a:ext cx="0" cy="0"/>
-          <a:chOff x="0" y="0"/>
-          <a:chExt cx="0" cy="0"/>
-        </a:xfrm>
-      </p:grpSpPr>
-      <p:sp>
-        <p:nvSpPr>
-          <p:cNvPr id="2" name="Title 1"/>
-          <p:cNvSpPr>
-            <a:spLocks noGrp="1"/>
-          </p:cNvSpPr>
-          <p:nvPr>
-            <p:ph type="title"/>
-          </p:nvPr>
-        </p:nvSpPr>
-        <p:spPr/>
-        <p:txBody>
-          <a:bodyPr/>
-          <a:lstStyle/>
-          <a:p>
-            <a:r>
-              <a:rPr lang="en-AU" dirty="0" smtClean="0"/>
               <a:t>System Budgets</a:t>
             </a:r>
             <a:endParaRPr lang="en-AU" dirty="0"/>
@@ -5361,7 +5701,7 @@
 </p:sld>
 </file>
 
-<file path=ppt/slides/slide13.xml><?xml version="1.0" encoding="utf-8"?>
+<file path=ppt/slides/slide12.xml><?xml version="1.0" encoding="utf-8"?>
 <p:sld xmlns:a="http://schemas.openxmlformats.org/drawingml/2006/main" xmlns:r="http://schemas.openxmlformats.org/officeDocument/2006/relationships" xmlns:p="http://schemas.openxmlformats.org/presentationml/2006/main">
   <p:cSld>
     <p:spTree>
@@ -6230,7 +6570,7 @@
               <a:rPr lang="en-AU" smtClean="0">
                 <a:latin typeface="+mj-lt"/>
               </a:rPr>
-              <a:t>13</a:t>
+              <a:t>12</a:t>
             </a:fld>
             <a:endParaRPr lang="en-AU" dirty="0">
               <a:latin typeface="+mj-lt"/>
@@ -6258,7 +6598,7 @@
 </p:sld>
 </file>
 
-<file path=ppt/slides/slide14.xml><?xml version="1.0" encoding="utf-8"?>
+<file path=ppt/slides/slide13.xml><?xml version="1.0" encoding="utf-8"?>
 <p:sld xmlns:a="http://schemas.openxmlformats.org/drawingml/2006/main" xmlns:r="http://schemas.openxmlformats.org/officeDocument/2006/relationships" xmlns:p="http://schemas.openxmlformats.org/presentationml/2006/main">
   <p:cSld>
     <p:spTree>
@@ -6298,25 +6638,35 @@
           </a:p>
         </p:txBody>
       </p:sp>
-      <p:sp>
-        <p:nvSpPr>
-          <p:cNvPr id="3" name="Content Placeholder 2"/>
-          <p:cNvSpPr>
-            <a:spLocks noGrp="1"/>
-          </p:cNvSpPr>
+      <p:pic>
+        <p:nvPicPr>
+          <p:cNvPr id="7" name="Content Placeholder 6"/>
+          <p:cNvPicPr>
+            <a:picLocks noGrp="1" noChangeAspect="1"/>
+          </p:cNvPicPr>
           <p:nvPr>
             <p:ph idx="1"/>
           </p:nvPr>
-        </p:nvSpPr>
-        <p:spPr/>
-        <p:txBody>
-          <a:bodyPr/>
-          <a:lstStyle/>
-          <a:p>
-            <a:endParaRPr lang="en-AU" dirty="0"/>
-          </a:p>
-        </p:txBody>
-      </p:sp>
+        </p:nvPicPr>
+        <p:blipFill>
+          <a:blip r:embed="rId3">
+            <a:extLst>
+              <a:ext uri="{28A0092B-C50C-407E-A947-70E740481C1C}">
+                <a14:useLocalDpi xmlns:a14="http://schemas.microsoft.com/office/drawing/2010/main" val="0"/>
+              </a:ext>
+            </a:extLst>
+          </a:blip>
+          <a:stretch>
+            <a:fillRect/>
+          </a:stretch>
+        </p:blipFill>
+        <p:spPr>
+          <a:xfrm>
+            <a:off x="1568539" y="1323975"/>
+            <a:ext cx="6006921" cy="4852988"/>
+          </a:xfrm>
+        </p:spPr>
+      </p:pic>
       <p:sp>
         <p:nvSpPr>
           <p:cNvPr id="4" name="Date Placeholder 3"/>
@@ -6441,7 +6791,7 @@
               <a:rPr lang="en-AU" smtClean="0">
                 <a:latin typeface="+mj-lt"/>
               </a:rPr>
-              <a:t>14</a:t>
+              <a:t>13</a:t>
             </a:fld>
             <a:endParaRPr lang="en-AU" dirty="0">
               <a:latin typeface="+mj-lt"/>
@@ -6469,7 +6819,7 @@
 </p:sld>
 </file>
 
-<file path=ppt/slides/slide15.xml><?xml version="1.0" encoding="utf-8"?>
+<file path=ppt/slides/slide14.xml><?xml version="1.0" encoding="utf-8"?>
 <p:sld xmlns:a="http://schemas.openxmlformats.org/drawingml/2006/main" xmlns:r="http://schemas.openxmlformats.org/officeDocument/2006/relationships" xmlns:p="http://schemas.openxmlformats.org/presentationml/2006/main">
   <p:cSld>
     <p:spTree>
@@ -6927,7 +7277,7 @@
               <a:rPr lang="en-AU" smtClean="0">
                 <a:latin typeface="+mj-lt"/>
               </a:rPr>
-              <a:t>15</a:t>
+              <a:t>14</a:t>
             </a:fld>
             <a:endParaRPr lang="en-AU" dirty="0">
               <a:latin typeface="+mj-lt"/>
@@ -7566,7 +7916,7 @@
 </p:sld>
 </file>
 
-<file path=ppt/slides/slide16.xml><?xml version="1.0" encoding="utf-8"?>
+<file path=ppt/slides/slide15.xml><?xml version="1.0" encoding="utf-8"?>
 <p:sld xmlns:a="http://schemas.openxmlformats.org/drawingml/2006/main" xmlns:r="http://schemas.openxmlformats.org/officeDocument/2006/relationships" xmlns:p="http://schemas.openxmlformats.org/presentationml/2006/main">
   <p:cSld>
     <p:spTree>
@@ -7621,7 +7971,11 @@
           <a:bodyPr/>
           <a:lstStyle/>
           <a:p>
-            <a:endParaRPr lang="en-AU"/>
+            <a:r>
+              <a:rPr lang="en-AU" dirty="0" smtClean="0"/>
+              <a:t>TOM</a:t>
+            </a:r>
+            <a:endParaRPr lang="en-AU" dirty="0"/>
           </a:p>
         </p:txBody>
       </p:sp>
@@ -7749,7 +8103,7 @@
               <a:rPr lang="en-AU" smtClean="0">
                 <a:latin typeface="+mj-lt"/>
               </a:rPr>
-              <a:t>16</a:t>
+              <a:t>15</a:t>
             </a:fld>
             <a:endParaRPr lang="en-AU" dirty="0">
               <a:latin typeface="+mj-lt"/>
@@ -7777,6 +8131,82 @@
 </p:sld>
 </file>
 
+<file path=ppt/slides/slide16.xml><?xml version="1.0" encoding="utf-8"?>
+<p:sld xmlns:a="http://schemas.openxmlformats.org/drawingml/2006/main" xmlns:r="http://schemas.openxmlformats.org/officeDocument/2006/relationships" xmlns:p="http://schemas.openxmlformats.org/presentationml/2006/main">
+  <p:cSld>
+    <p:spTree>
+      <p:nvGrpSpPr>
+        <p:cNvPr id="1" name=""/>
+        <p:cNvGrpSpPr/>
+        <p:nvPr/>
+      </p:nvGrpSpPr>
+      <p:grpSpPr>
+        <a:xfrm>
+          <a:off x="0" y="0"/>
+          <a:ext cx="0" cy="0"/>
+          <a:chOff x="0" y="0"/>
+          <a:chExt cx="0" cy="0"/>
+        </a:xfrm>
+      </p:grpSpPr>
+      <p:sp>
+        <p:nvSpPr>
+          <p:cNvPr id="2" name="Title 1"/>
+          <p:cNvSpPr>
+            <a:spLocks noGrp="1"/>
+          </p:cNvSpPr>
+          <p:nvPr>
+            <p:ph type="title"/>
+          </p:nvPr>
+        </p:nvSpPr>
+        <p:spPr/>
+        <p:txBody>
+          <a:bodyPr/>
+          <a:lstStyle/>
+          <a:p>
+            <a:r>
+              <a:rPr lang="en-AU" dirty="0" smtClean="0"/>
+              <a:t>Transmission Innovation</a:t>
+            </a:r>
+            <a:endParaRPr lang="en-AU" dirty="0"/>
+          </a:p>
+        </p:txBody>
+      </p:sp>
+      <p:sp>
+        <p:nvSpPr>
+          <p:cNvPr id="3" name="Content Placeholder 2"/>
+          <p:cNvSpPr>
+            <a:spLocks noGrp="1"/>
+          </p:cNvSpPr>
+          <p:nvPr>
+            <p:ph idx="1"/>
+          </p:nvPr>
+        </p:nvSpPr>
+        <p:spPr/>
+        <p:txBody>
+          <a:bodyPr/>
+          <a:lstStyle/>
+          <a:p>
+            <a:r>
+              <a:rPr lang="en-AU" dirty="0" smtClean="0"/>
+              <a:t>TOM</a:t>
+            </a:r>
+            <a:endParaRPr lang="en-AU" dirty="0"/>
+          </a:p>
+        </p:txBody>
+      </p:sp>
+    </p:spTree>
+    <p:extLst>
+      <p:ext uri="{BB962C8B-B14F-4D97-AF65-F5344CB8AC3E}">
+        <p14:creationId xmlns:p14="http://schemas.microsoft.com/office/powerpoint/2010/main" val="3690532724"/>
+      </p:ext>
+    </p:extLst>
+  </p:cSld>
+  <p:clrMapOvr>
+    <a:masterClrMapping/>
+  </p:clrMapOvr>
+</p:sld>
+</file>
+
 <file path=ppt/slides/slide17.xml><?xml version="1.0" encoding="utf-8"?>
 <p:sld xmlns:a="http://schemas.openxmlformats.org/drawingml/2006/main" xmlns:r="http://schemas.openxmlformats.org/officeDocument/2006/relationships" xmlns:p="http://schemas.openxmlformats.org/presentationml/2006/main">
   <p:cSld>
@@ -7811,7 +8241,7 @@
           <a:p>
             <a:r>
               <a:rPr lang="en-AU" dirty="0" smtClean="0"/>
-              <a:t>Transmission Innovation</a:t>
+              <a:t>Operation Overview</a:t>
             </a:r>
             <a:endParaRPr lang="en-AU" dirty="0"/>
           </a:p>
@@ -7819,12 +8249,12 @@
       </p:sp>
       <p:sp>
         <p:nvSpPr>
-          <p:cNvPr id="3" name="Content Placeholder 2"/>
-          <p:cNvSpPr>
-            <a:spLocks noGrp="1"/>
-          </p:cNvSpPr>
-          <p:nvPr>
-            <p:ph idx="1"/>
+          <p:cNvPr id="3" name="Text Placeholder 2"/>
+          <p:cNvSpPr>
+            <a:spLocks noGrp="1"/>
+          </p:cNvSpPr>
+          <p:nvPr>
+            <p:ph type="body" idx="1"/>
           </p:nvPr>
         </p:nvSpPr>
         <p:spPr/>
@@ -7832,24 +8262,671 @@
           <a:bodyPr/>
           <a:lstStyle/>
           <a:p>
-            <a:endParaRPr lang="en-AU"/>
+            <a:r>
+              <a:rPr lang="en-AU" dirty="0" smtClean="0"/>
+              <a:t>Component Selection and Operation</a:t>
+            </a:r>
+            <a:endParaRPr lang="en-AU" dirty="0"/>
           </a:p>
         </p:txBody>
       </p:sp>
     </p:spTree>
     <p:extLst>
       <p:ext uri="{BB962C8B-B14F-4D97-AF65-F5344CB8AC3E}">
-        <p14:creationId xmlns:p14="http://schemas.microsoft.com/office/powerpoint/2010/main" val="3690532724"/>
+        <p14:creationId xmlns:p14="http://schemas.microsoft.com/office/powerpoint/2010/main" val="3357271950"/>
       </p:ext>
     </p:extLst>
   </p:cSld>
   <p:clrMapOvr>
     <a:masterClrMapping/>
   </p:clrMapOvr>
+  <p:timing>
+    <p:tnLst>
+      <p:par>
+        <p:cTn id="1" dur="indefinite" restart="never" nodeType="tmRoot"/>
+      </p:par>
+    </p:tnLst>
+  </p:timing>
 </p:sld>
 </file>
 
 <file path=ppt/slides/slide18.xml><?xml version="1.0" encoding="utf-8"?>
+<p:sld xmlns:a="http://schemas.openxmlformats.org/drawingml/2006/main" xmlns:r="http://schemas.openxmlformats.org/officeDocument/2006/relationships" xmlns:p="http://schemas.openxmlformats.org/presentationml/2006/main">
+  <p:cSld>
+    <p:spTree>
+      <p:nvGrpSpPr>
+        <p:cNvPr id="1" name=""/>
+        <p:cNvGrpSpPr/>
+        <p:nvPr/>
+      </p:nvGrpSpPr>
+      <p:grpSpPr>
+        <a:xfrm>
+          <a:off x="0" y="0"/>
+          <a:ext cx="0" cy="0"/>
+          <a:chOff x="0" y="0"/>
+          <a:chExt cx="0" cy="0"/>
+        </a:xfrm>
+      </p:grpSpPr>
+      <p:sp>
+        <p:nvSpPr>
+          <p:cNvPr id="2" name="Title 1"/>
+          <p:cNvSpPr>
+            <a:spLocks noGrp="1"/>
+          </p:cNvSpPr>
+          <p:nvPr>
+            <p:ph type="title"/>
+          </p:nvPr>
+        </p:nvSpPr>
+        <p:spPr/>
+        <p:txBody>
+          <a:bodyPr/>
+          <a:lstStyle/>
+          <a:p>
+            <a:r>
+              <a:rPr lang="en-AU" dirty="0" smtClean="0"/>
+              <a:t>Modes of Operation</a:t>
+            </a:r>
+            <a:endParaRPr lang="en-AU" dirty="0"/>
+          </a:p>
+        </p:txBody>
+      </p:sp>
+      <p:sp>
+        <p:nvSpPr>
+          <p:cNvPr id="33" name="Date Placeholder 3"/>
+          <p:cNvSpPr>
+            <a:spLocks noGrp="1"/>
+          </p:cNvSpPr>
+          <p:nvPr>
+            <p:ph type="dt" sz="half" idx="10"/>
+          </p:nvPr>
+        </p:nvSpPr>
+        <p:spPr>
+          <a:xfrm>
+            <a:off x="628650" y="6356351"/>
+            <a:ext cx="2057400" cy="365125"/>
+          </a:xfrm>
+        </p:spPr>
+        <p:txBody>
+          <a:bodyPr/>
+          <a:lstStyle>
+            <a:lvl1pPr>
+              <a:defRPr>
+                <a:solidFill>
+                  <a:schemeClr val="accent4">
+                    <a:lumMod val="75000"/>
+                  </a:schemeClr>
+                </a:solidFill>
+              </a:defRPr>
+            </a:lvl1pPr>
+          </a:lstStyle>
+          <a:p>
+            <a:r>
+              <a:rPr lang="en-AU" dirty="0" smtClean="0">
+                <a:latin typeface="+mj-lt"/>
+              </a:rPr>
+              <a:t>Tuesday 24 August 2015</a:t>
+            </a:r>
+            <a:endParaRPr lang="en-AU" dirty="0">
+              <a:latin typeface="+mj-lt"/>
+            </a:endParaRPr>
+          </a:p>
+        </p:txBody>
+      </p:sp>
+      <p:sp>
+        <p:nvSpPr>
+          <p:cNvPr id="34" name="Footer Placeholder 4"/>
+          <p:cNvSpPr>
+            <a:spLocks noGrp="1"/>
+          </p:cNvSpPr>
+          <p:nvPr>
+            <p:ph type="ftr" sz="quarter" idx="11"/>
+          </p:nvPr>
+        </p:nvSpPr>
+        <p:spPr>
+          <a:xfrm>
+            <a:off x="3028950" y="6356351"/>
+            <a:ext cx="3086100" cy="365125"/>
+          </a:xfrm>
+        </p:spPr>
+        <p:txBody>
+          <a:bodyPr/>
+          <a:lstStyle>
+            <a:lvl1pPr>
+              <a:defRPr lang="en-AU" sz="1200" kern="1200" dirty="0" smtClean="0">
+                <a:solidFill>
+                  <a:schemeClr val="accent4">
+                    <a:lumMod val="75000"/>
+                  </a:schemeClr>
+                </a:solidFill>
+                <a:latin typeface="+mn-lt"/>
+                <a:ea typeface="+mn-ea"/>
+                <a:cs typeface="+mn-cs"/>
+              </a:defRPr>
+            </a:lvl1pPr>
+          </a:lstStyle>
+          <a:p>
+            <a:r>
+              <a:rPr lang="en-AU" dirty="0" smtClean="0">
+                <a:latin typeface="+mj-lt"/>
+              </a:rPr>
+              <a:t>SnapSat Preliminary Design Presentation</a:t>
+            </a:r>
+            <a:endParaRPr lang="en-AU" dirty="0">
+              <a:latin typeface="+mj-lt"/>
+            </a:endParaRPr>
+          </a:p>
+        </p:txBody>
+      </p:sp>
+      <p:sp>
+        <p:nvSpPr>
+          <p:cNvPr id="35" name="Slide Number Placeholder 5"/>
+          <p:cNvSpPr>
+            <a:spLocks noGrp="1"/>
+          </p:cNvSpPr>
+          <p:nvPr>
+            <p:ph type="sldNum" sz="quarter" idx="12"/>
+          </p:nvPr>
+        </p:nvSpPr>
+        <p:spPr>
+          <a:xfrm>
+            <a:off x="6457950" y="6356351"/>
+            <a:ext cx="2057400" cy="365125"/>
+          </a:xfrm>
+        </p:spPr>
+        <p:txBody>
+          <a:bodyPr/>
+          <a:lstStyle>
+            <a:lvl1pPr>
+              <a:defRPr lang="en-AU" sz="1200" kern="1200" smtClean="0">
+                <a:solidFill>
+                  <a:schemeClr val="accent4">
+                    <a:lumMod val="75000"/>
+                  </a:schemeClr>
+                </a:solidFill>
+                <a:latin typeface="+mn-lt"/>
+                <a:ea typeface="+mn-ea"/>
+                <a:cs typeface="+mn-cs"/>
+              </a:defRPr>
+            </a:lvl1pPr>
+          </a:lstStyle>
+          <a:p>
+            <a:fld id="{23C4C7DD-0F99-4C86-8090-6A492101F91C}" type="slidenum">
+              <a:rPr lang="en-AU" smtClean="0">
+                <a:latin typeface="+mj-lt"/>
+              </a:rPr>
+              <a:t>18</a:t>
+            </a:fld>
+            <a:endParaRPr lang="en-AU" dirty="0">
+              <a:latin typeface="+mj-lt"/>
+            </a:endParaRPr>
+          </a:p>
+        </p:txBody>
+      </p:sp>
+      <p:pic>
+        <p:nvPicPr>
+          <p:cNvPr id="3" name="Picture 2"/>
+          <p:cNvPicPr>
+            <a:picLocks noChangeAspect="1"/>
+          </p:cNvPicPr>
+          <p:nvPr/>
+        </p:nvPicPr>
+        <p:blipFill>
+          <a:blip r:embed="rId2">
+            <a:extLst>
+              <a:ext uri="{28A0092B-C50C-407E-A947-70E740481C1C}">
+                <a14:useLocalDpi xmlns:a14="http://schemas.microsoft.com/office/drawing/2010/main" val="0"/>
+              </a:ext>
+            </a:extLst>
+          </a:blip>
+          <a:stretch>
+            <a:fillRect/>
+          </a:stretch>
+        </p:blipFill>
+        <p:spPr>
+          <a:xfrm>
+            <a:off x="1866508" y="1178351"/>
+            <a:ext cx="5688169" cy="5079210"/>
+          </a:xfrm>
+          <a:prstGeom prst="rect">
+            <a:avLst/>
+          </a:prstGeom>
+        </p:spPr>
+      </p:pic>
+    </p:spTree>
+    <p:extLst>
+      <p:ext uri="{BB962C8B-B14F-4D97-AF65-F5344CB8AC3E}">
+        <p14:creationId xmlns:p14="http://schemas.microsoft.com/office/powerpoint/2010/main" val="745331210"/>
+      </p:ext>
+    </p:extLst>
+  </p:cSld>
+  <p:clrMapOvr>
+    <a:masterClrMapping/>
+  </p:clrMapOvr>
+  <p:timing>
+    <p:tnLst>
+      <p:par>
+        <p:cTn id="1" dur="indefinite" restart="never" nodeType="tmRoot"/>
+      </p:par>
+    </p:tnLst>
+  </p:timing>
+</p:sld>
+</file>
+
+<file path=ppt/slides/slide19.xml><?xml version="1.0" encoding="utf-8"?>
+<p:sld xmlns:a="http://schemas.openxmlformats.org/drawingml/2006/main" xmlns:r="http://schemas.openxmlformats.org/officeDocument/2006/relationships" xmlns:p="http://schemas.openxmlformats.org/presentationml/2006/main">
+  <p:cSld>
+    <p:spTree>
+      <p:nvGrpSpPr>
+        <p:cNvPr id="1" name=""/>
+        <p:cNvGrpSpPr/>
+        <p:nvPr/>
+      </p:nvGrpSpPr>
+      <p:grpSpPr>
+        <a:xfrm>
+          <a:off x="0" y="0"/>
+          <a:ext cx="0" cy="0"/>
+          <a:chOff x="0" y="0"/>
+          <a:chExt cx="0" cy="0"/>
+        </a:xfrm>
+      </p:grpSpPr>
+      <p:sp>
+        <p:nvSpPr>
+          <p:cNvPr id="2" name="Title 1"/>
+          <p:cNvSpPr>
+            <a:spLocks noGrp="1"/>
+          </p:cNvSpPr>
+          <p:nvPr>
+            <p:ph type="title"/>
+          </p:nvPr>
+        </p:nvSpPr>
+        <p:spPr/>
+        <p:txBody>
+          <a:bodyPr/>
+          <a:lstStyle/>
+          <a:p>
+            <a:r>
+              <a:rPr lang="en-AU" dirty="0" smtClean="0"/>
+              <a:t>Design Schematic</a:t>
+            </a:r>
+            <a:endParaRPr lang="en-AU" dirty="0"/>
+          </a:p>
+        </p:txBody>
+      </p:sp>
+      <p:pic>
+        <p:nvPicPr>
+          <p:cNvPr id="4" name="Picture 3"/>
+          <p:cNvPicPr>
+            <a:picLocks noChangeAspect="1"/>
+          </p:cNvPicPr>
+          <p:nvPr/>
+        </p:nvPicPr>
+        <p:blipFill>
+          <a:blip r:embed="rId2">
+            <a:extLst>
+              <a:ext uri="{28A0092B-C50C-407E-A947-70E740481C1C}">
+                <a14:useLocalDpi xmlns:a14="http://schemas.microsoft.com/office/drawing/2010/main" val="0"/>
+              </a:ext>
+            </a:extLst>
+          </a:blip>
+          <a:stretch>
+            <a:fillRect/>
+          </a:stretch>
+        </p:blipFill>
+        <p:spPr>
+          <a:xfrm>
+            <a:off x="2139884" y="1266334"/>
+            <a:ext cx="4962153" cy="4914080"/>
+          </a:xfrm>
+          <a:prstGeom prst="rect">
+            <a:avLst/>
+          </a:prstGeom>
+        </p:spPr>
+      </p:pic>
+    </p:spTree>
+    <p:extLst>
+      <p:ext uri="{BB962C8B-B14F-4D97-AF65-F5344CB8AC3E}">
+        <p14:creationId xmlns:p14="http://schemas.microsoft.com/office/powerpoint/2010/main" val="1382147126"/>
+      </p:ext>
+    </p:extLst>
+  </p:cSld>
+  <p:clrMapOvr>
+    <a:masterClrMapping/>
+  </p:clrMapOvr>
+  <p:timing>
+    <p:tnLst>
+      <p:par>
+        <p:cTn id="1" dur="indefinite" restart="never" nodeType="tmRoot"/>
+      </p:par>
+    </p:tnLst>
+  </p:timing>
+</p:sld>
+</file>
+
+<file path=ppt/slides/slide2.xml><?xml version="1.0" encoding="utf-8"?>
+<p:sld xmlns:a="http://schemas.openxmlformats.org/drawingml/2006/main" xmlns:r="http://schemas.openxmlformats.org/officeDocument/2006/relationships" xmlns:p="http://schemas.openxmlformats.org/presentationml/2006/main">
+  <p:cSld>
+    <p:spTree>
+      <p:nvGrpSpPr>
+        <p:cNvPr id="1" name=""/>
+        <p:cNvGrpSpPr/>
+        <p:nvPr/>
+      </p:nvGrpSpPr>
+      <p:grpSpPr>
+        <a:xfrm>
+          <a:off x="0" y="0"/>
+          <a:ext cx="0" cy="0"/>
+          <a:chOff x="0" y="0"/>
+          <a:chExt cx="0" cy="0"/>
+        </a:xfrm>
+      </p:grpSpPr>
+      <p:sp>
+        <p:nvSpPr>
+          <p:cNvPr id="2" name="Title 1"/>
+          <p:cNvSpPr>
+            <a:spLocks noGrp="1"/>
+          </p:cNvSpPr>
+          <p:nvPr>
+            <p:ph type="title"/>
+          </p:nvPr>
+        </p:nvSpPr>
+        <p:spPr/>
+        <p:txBody>
+          <a:bodyPr/>
+          <a:lstStyle/>
+          <a:p>
+            <a:r>
+              <a:rPr lang="en-AU" dirty="0" smtClean="0"/>
+              <a:t>Meet the Team</a:t>
+            </a:r>
+            <a:endParaRPr lang="en-AU" dirty="0"/>
+          </a:p>
+        </p:txBody>
+      </p:sp>
+      <p:sp>
+        <p:nvSpPr>
+          <p:cNvPr id="3" name="Content Placeholder 2"/>
+          <p:cNvSpPr>
+            <a:spLocks noGrp="1"/>
+          </p:cNvSpPr>
+          <p:nvPr>
+            <p:ph idx="1"/>
+          </p:nvPr>
+        </p:nvSpPr>
+        <p:spPr/>
+        <p:txBody>
+          <a:bodyPr/>
+          <a:lstStyle/>
+          <a:p>
+            <a:pPr>
+              <a:buClr>
+                <a:schemeClr val="tx1"/>
+              </a:buClr>
+            </a:pPr>
+            <a:r>
+              <a:rPr lang="en-AU" dirty="0" smtClean="0">
+                <a:solidFill>
+                  <a:schemeClr val="accent5">
+                    <a:lumMod val="75000"/>
+                  </a:schemeClr>
+                </a:solidFill>
+              </a:rPr>
+              <a:t>James Allworth </a:t>
+            </a:r>
+            <a:r>
+              <a:rPr lang="en-AU" dirty="0" smtClean="0"/>
+              <a:t>– 	Attitude Determination and 				Control</a:t>
+            </a:r>
+          </a:p>
+          <a:p>
+            <a:pPr>
+              <a:buClr>
+                <a:schemeClr val="tx1"/>
+              </a:buClr>
+            </a:pPr>
+            <a:r>
+              <a:rPr lang="en-AU" dirty="0">
+                <a:solidFill>
+                  <a:schemeClr val="accent5">
+                    <a:lumMod val="75000"/>
+                  </a:schemeClr>
+                </a:solidFill>
+              </a:rPr>
+              <a:t>Thomas </a:t>
+            </a:r>
+            <a:r>
+              <a:rPr lang="en-AU" dirty="0" smtClean="0">
+                <a:solidFill>
+                  <a:schemeClr val="accent5">
+                    <a:lumMod val="75000"/>
+                  </a:schemeClr>
+                </a:solidFill>
+              </a:rPr>
+              <a:t>Forbutt </a:t>
+            </a:r>
+            <a:r>
+              <a:rPr lang="en-AU" dirty="0" smtClean="0"/>
+              <a:t>– Communications and On-board 			Data Handling</a:t>
+            </a:r>
+          </a:p>
+          <a:p>
+            <a:pPr>
+              <a:buClr>
+                <a:schemeClr val="tx1"/>
+              </a:buClr>
+            </a:pPr>
+            <a:r>
+              <a:rPr lang="en-AU" dirty="0">
+                <a:solidFill>
+                  <a:schemeClr val="accent5">
+                    <a:lumMod val="75000"/>
+                  </a:schemeClr>
+                </a:solidFill>
+              </a:rPr>
+              <a:t>Oscar McNulty </a:t>
+            </a:r>
+            <a:r>
+              <a:rPr lang="en-AU" dirty="0" smtClean="0"/>
+              <a:t>– 	Structural Design and 					Development</a:t>
+            </a:r>
+          </a:p>
+          <a:p>
+            <a:pPr>
+              <a:buClr>
+                <a:schemeClr val="tx1"/>
+              </a:buClr>
+            </a:pPr>
+            <a:r>
+              <a:rPr lang="en-AU" dirty="0">
+                <a:solidFill>
+                  <a:schemeClr val="accent5">
+                    <a:lumMod val="75000"/>
+                  </a:schemeClr>
+                </a:solidFill>
+              </a:rPr>
+              <a:t>Penelope Player </a:t>
+            </a:r>
+            <a:r>
+              <a:rPr lang="en-AU" dirty="0" smtClean="0"/>
+              <a:t>– On-board Computer and Power 			System</a:t>
+            </a:r>
+          </a:p>
+          <a:p>
+            <a:pPr>
+              <a:buClr>
+                <a:schemeClr val="tx1"/>
+              </a:buClr>
+            </a:pPr>
+            <a:r>
+              <a:rPr lang="en-AU" dirty="0">
+                <a:solidFill>
+                  <a:schemeClr val="accent5">
+                    <a:lumMod val="75000"/>
+                  </a:schemeClr>
+                </a:solidFill>
+              </a:rPr>
+              <a:t>Nikita Sardesai </a:t>
+            </a:r>
+            <a:r>
+              <a:rPr lang="en-AU" dirty="0" smtClean="0"/>
+              <a:t>– Thermal Control and Payload</a:t>
+            </a:r>
+            <a:endParaRPr lang="en-AU" dirty="0"/>
+          </a:p>
+        </p:txBody>
+      </p:sp>
+      <p:sp>
+        <p:nvSpPr>
+          <p:cNvPr id="4" name="Date Placeholder 3"/>
+          <p:cNvSpPr>
+            <a:spLocks noGrp="1"/>
+          </p:cNvSpPr>
+          <p:nvPr>
+            <p:ph type="dt" sz="half" idx="10"/>
+          </p:nvPr>
+        </p:nvSpPr>
+        <p:spPr>
+          <a:xfrm>
+            <a:off x="628650" y="6356351"/>
+            <a:ext cx="2057400" cy="365125"/>
+          </a:xfrm>
+        </p:spPr>
+        <p:txBody>
+          <a:bodyPr/>
+          <a:lstStyle>
+            <a:lvl1pPr>
+              <a:defRPr>
+                <a:solidFill>
+                  <a:schemeClr val="accent4">
+                    <a:lumMod val="75000"/>
+                  </a:schemeClr>
+                </a:solidFill>
+              </a:defRPr>
+            </a:lvl1pPr>
+          </a:lstStyle>
+          <a:p>
+            <a:r>
+              <a:rPr lang="en-AU" dirty="0" smtClean="0">
+                <a:latin typeface="+mj-lt"/>
+              </a:rPr>
+              <a:t>Tuesday 24 August 2015</a:t>
+            </a:r>
+            <a:endParaRPr lang="en-AU" dirty="0">
+              <a:latin typeface="+mj-lt"/>
+            </a:endParaRPr>
+          </a:p>
+        </p:txBody>
+      </p:sp>
+      <p:sp>
+        <p:nvSpPr>
+          <p:cNvPr id="5" name="Footer Placeholder 4"/>
+          <p:cNvSpPr>
+            <a:spLocks noGrp="1"/>
+          </p:cNvSpPr>
+          <p:nvPr>
+            <p:ph type="ftr" sz="quarter" idx="11"/>
+          </p:nvPr>
+        </p:nvSpPr>
+        <p:spPr>
+          <a:xfrm>
+            <a:off x="3028950" y="6356351"/>
+            <a:ext cx="3086100" cy="365125"/>
+          </a:xfrm>
+        </p:spPr>
+        <p:txBody>
+          <a:bodyPr/>
+          <a:lstStyle>
+            <a:lvl1pPr>
+              <a:defRPr lang="en-AU" sz="1200" kern="1200" dirty="0" smtClean="0">
+                <a:solidFill>
+                  <a:schemeClr val="accent4">
+                    <a:lumMod val="75000"/>
+                  </a:schemeClr>
+                </a:solidFill>
+                <a:latin typeface="+mn-lt"/>
+                <a:ea typeface="+mn-ea"/>
+                <a:cs typeface="+mn-cs"/>
+              </a:defRPr>
+            </a:lvl1pPr>
+          </a:lstStyle>
+          <a:p>
+            <a:r>
+              <a:rPr lang="en-AU" dirty="0" smtClean="0">
+                <a:latin typeface="+mj-lt"/>
+              </a:rPr>
+              <a:t>SnapSat Preliminary Design Presentation</a:t>
+            </a:r>
+            <a:endParaRPr lang="en-AU" dirty="0">
+              <a:latin typeface="+mj-lt"/>
+            </a:endParaRPr>
+          </a:p>
+        </p:txBody>
+      </p:sp>
+      <p:sp>
+        <p:nvSpPr>
+          <p:cNvPr id="6" name="Slide Number Placeholder 5"/>
+          <p:cNvSpPr>
+            <a:spLocks noGrp="1"/>
+          </p:cNvSpPr>
+          <p:nvPr>
+            <p:ph type="sldNum" sz="quarter" idx="12"/>
+          </p:nvPr>
+        </p:nvSpPr>
+        <p:spPr>
+          <a:xfrm>
+            <a:off x="6457950" y="6356351"/>
+            <a:ext cx="2057400" cy="365125"/>
+          </a:xfrm>
+        </p:spPr>
+        <p:txBody>
+          <a:bodyPr/>
+          <a:lstStyle>
+            <a:lvl1pPr>
+              <a:defRPr lang="en-AU" sz="1200" kern="1200" smtClean="0">
+                <a:solidFill>
+                  <a:schemeClr val="accent4">
+                    <a:lumMod val="75000"/>
+                  </a:schemeClr>
+                </a:solidFill>
+                <a:latin typeface="+mn-lt"/>
+                <a:ea typeface="+mn-ea"/>
+                <a:cs typeface="+mn-cs"/>
+              </a:defRPr>
+            </a:lvl1pPr>
+          </a:lstStyle>
+          <a:p>
+            <a:fld id="{C4ECF3C4-FF48-446E-AC9C-C0875A373764}" type="slidenum">
+              <a:rPr lang="en-AU" smtClean="0">
+                <a:latin typeface="+mj-lt"/>
+              </a:rPr>
+              <a:t>2</a:t>
+            </a:fld>
+            <a:endParaRPr lang="en-AU" dirty="0">
+              <a:latin typeface="+mj-lt"/>
+            </a:endParaRPr>
+          </a:p>
+        </p:txBody>
+      </p:sp>
+    </p:spTree>
+    <p:extLst>
+      <p:ext uri="{BB962C8B-B14F-4D97-AF65-F5344CB8AC3E}">
+        <p14:creationId xmlns:p14="http://schemas.microsoft.com/office/powerpoint/2010/main" val="3032752866"/>
+      </p:ext>
+    </p:extLst>
+  </p:cSld>
+  <p:clrMapOvr>
+    <a:masterClrMapping/>
+  </p:clrMapOvr>
+  <p:timing>
+    <p:tnLst>
+      <p:par>
+        <p:cTn id="1" dur="indefinite" restart="never" nodeType="tmRoot"/>
+      </p:par>
+    </p:tnLst>
+  </p:timing>
+</p:sld>
+</file>
+
+<file path=ppt/slides/slide20.xml><?xml version="1.0" encoding="utf-8"?>
 <p:sld xmlns:a="http://schemas.openxmlformats.org/drawingml/2006/main" xmlns:r="http://schemas.openxmlformats.org/officeDocument/2006/relationships" xmlns:p="http://schemas.openxmlformats.org/presentationml/2006/main">
   <p:cSld>
     <p:spTree>
@@ -8018,330 +9095,6 @@
 </p:sld>
 </file>
 
-<file path=ppt/slides/slide2.xml><?xml version="1.0" encoding="utf-8"?>
-<p:sld xmlns:a="http://schemas.openxmlformats.org/drawingml/2006/main" xmlns:r="http://schemas.openxmlformats.org/officeDocument/2006/relationships" xmlns:p="http://schemas.openxmlformats.org/presentationml/2006/main">
-  <p:cSld>
-    <p:spTree>
-      <p:nvGrpSpPr>
-        <p:cNvPr id="1" name=""/>
-        <p:cNvGrpSpPr/>
-        <p:nvPr/>
-      </p:nvGrpSpPr>
-      <p:grpSpPr>
-        <a:xfrm>
-          <a:off x="0" y="0"/>
-          <a:ext cx="0" cy="0"/>
-          <a:chOff x="0" y="0"/>
-          <a:chExt cx="0" cy="0"/>
-        </a:xfrm>
-      </p:grpSpPr>
-      <p:sp>
-        <p:nvSpPr>
-          <p:cNvPr id="2" name="Title 1"/>
-          <p:cNvSpPr>
-            <a:spLocks noGrp="1"/>
-          </p:cNvSpPr>
-          <p:nvPr>
-            <p:ph type="title"/>
-          </p:nvPr>
-        </p:nvSpPr>
-        <p:spPr/>
-        <p:txBody>
-          <a:bodyPr/>
-          <a:lstStyle/>
-          <a:p>
-            <a:r>
-              <a:rPr lang="en-AU" dirty="0" smtClean="0"/>
-              <a:t>Meet the Team</a:t>
-            </a:r>
-            <a:endParaRPr lang="en-AU" dirty="0"/>
-          </a:p>
-        </p:txBody>
-      </p:sp>
-      <p:sp>
-        <p:nvSpPr>
-          <p:cNvPr id="3" name="Content Placeholder 2"/>
-          <p:cNvSpPr>
-            <a:spLocks noGrp="1"/>
-          </p:cNvSpPr>
-          <p:nvPr>
-            <p:ph idx="1"/>
-          </p:nvPr>
-        </p:nvSpPr>
-        <p:spPr/>
-        <p:txBody>
-          <a:bodyPr/>
-          <a:lstStyle/>
-          <a:p>
-            <a:pPr>
-              <a:buClr>
-                <a:schemeClr val="tx1"/>
-              </a:buClr>
-            </a:pPr>
-            <a:r>
-              <a:rPr lang="en-AU" dirty="0" smtClean="0">
-                <a:solidFill>
-                  <a:schemeClr val="accent5">
-                    <a:lumMod val="75000"/>
-                  </a:schemeClr>
-                </a:solidFill>
-              </a:rPr>
-              <a:t>James Allworth </a:t>
-            </a:r>
-            <a:r>
-              <a:rPr lang="en-AU" dirty="0" smtClean="0"/>
-              <a:t>– 	Attitude Determination and 				Control</a:t>
-            </a:r>
-          </a:p>
-          <a:p>
-            <a:pPr>
-              <a:buClr>
-                <a:schemeClr val="tx1"/>
-              </a:buClr>
-            </a:pPr>
-            <a:r>
-              <a:rPr lang="en-AU" dirty="0">
-                <a:solidFill>
-                  <a:schemeClr val="accent5">
-                    <a:lumMod val="75000"/>
-                  </a:schemeClr>
-                </a:solidFill>
-              </a:rPr>
-              <a:t>Thomas </a:t>
-            </a:r>
-            <a:r>
-              <a:rPr lang="en-AU" dirty="0" smtClean="0">
-                <a:solidFill>
-                  <a:schemeClr val="accent5">
-                    <a:lumMod val="75000"/>
-                  </a:schemeClr>
-                </a:solidFill>
-              </a:rPr>
-              <a:t>Forbutt </a:t>
-            </a:r>
-            <a:r>
-              <a:rPr lang="en-AU" dirty="0" smtClean="0"/>
-              <a:t>– Communications and On-board 			Data Handling</a:t>
-            </a:r>
-          </a:p>
-          <a:p>
-            <a:pPr>
-              <a:buClr>
-                <a:schemeClr val="tx1"/>
-              </a:buClr>
-            </a:pPr>
-            <a:r>
-              <a:rPr lang="en-AU" dirty="0">
-                <a:solidFill>
-                  <a:schemeClr val="accent5">
-                    <a:lumMod val="75000"/>
-                  </a:schemeClr>
-                </a:solidFill>
-              </a:rPr>
-              <a:t>Oscar McNulty </a:t>
-            </a:r>
-            <a:r>
-              <a:rPr lang="en-AU" dirty="0" smtClean="0"/>
-              <a:t>– 	Structural Design and 					Development</a:t>
-            </a:r>
-          </a:p>
-          <a:p>
-            <a:pPr>
-              <a:buClr>
-                <a:schemeClr val="tx1"/>
-              </a:buClr>
-            </a:pPr>
-            <a:r>
-              <a:rPr lang="en-AU" dirty="0">
-                <a:solidFill>
-                  <a:schemeClr val="accent5">
-                    <a:lumMod val="75000"/>
-                  </a:schemeClr>
-                </a:solidFill>
-              </a:rPr>
-              <a:t>Penelope Player </a:t>
-            </a:r>
-            <a:r>
-              <a:rPr lang="en-AU" dirty="0" smtClean="0"/>
-              <a:t>– On-board Computer and Power 			System</a:t>
-            </a:r>
-          </a:p>
-          <a:p>
-            <a:pPr>
-              <a:buClr>
-                <a:schemeClr val="tx1"/>
-              </a:buClr>
-            </a:pPr>
-            <a:r>
-              <a:rPr lang="en-AU" dirty="0">
-                <a:solidFill>
-                  <a:schemeClr val="accent5">
-                    <a:lumMod val="75000"/>
-                  </a:schemeClr>
-                </a:solidFill>
-              </a:rPr>
-              <a:t>Nikita Sardesai </a:t>
-            </a:r>
-            <a:r>
-              <a:rPr lang="en-AU" dirty="0" smtClean="0"/>
-              <a:t>– Thermal Control and Payload</a:t>
-            </a:r>
-            <a:endParaRPr lang="en-AU" dirty="0"/>
-          </a:p>
-        </p:txBody>
-      </p:sp>
-      <p:sp>
-        <p:nvSpPr>
-          <p:cNvPr id="4" name="Date Placeholder 3"/>
-          <p:cNvSpPr>
-            <a:spLocks noGrp="1"/>
-          </p:cNvSpPr>
-          <p:nvPr>
-            <p:ph type="dt" sz="half" idx="10"/>
-          </p:nvPr>
-        </p:nvSpPr>
-        <p:spPr>
-          <a:xfrm>
-            <a:off x="628650" y="6356351"/>
-            <a:ext cx="2057400" cy="365125"/>
-          </a:xfrm>
-        </p:spPr>
-        <p:txBody>
-          <a:bodyPr/>
-          <a:lstStyle>
-            <a:lvl1pPr>
-              <a:defRPr>
-                <a:solidFill>
-                  <a:schemeClr val="accent4">
-                    <a:lumMod val="75000"/>
-                  </a:schemeClr>
-                </a:solidFill>
-              </a:defRPr>
-            </a:lvl1pPr>
-          </a:lstStyle>
-          <a:p>
-            <a:r>
-              <a:rPr lang="en-AU" dirty="0" smtClean="0">
-                <a:latin typeface="+mj-lt"/>
-              </a:rPr>
-              <a:t>Tuesday 24 August 2015</a:t>
-            </a:r>
-            <a:endParaRPr lang="en-AU" dirty="0">
-              <a:latin typeface="+mj-lt"/>
-            </a:endParaRPr>
-          </a:p>
-        </p:txBody>
-      </p:sp>
-      <p:sp>
-        <p:nvSpPr>
-          <p:cNvPr id="5" name="Footer Placeholder 4"/>
-          <p:cNvSpPr>
-            <a:spLocks noGrp="1"/>
-          </p:cNvSpPr>
-          <p:nvPr>
-            <p:ph type="ftr" sz="quarter" idx="11"/>
-          </p:nvPr>
-        </p:nvSpPr>
-        <p:spPr>
-          <a:xfrm>
-            <a:off x="3028950" y="6356351"/>
-            <a:ext cx="3086100" cy="365125"/>
-          </a:xfrm>
-        </p:spPr>
-        <p:txBody>
-          <a:bodyPr/>
-          <a:lstStyle>
-            <a:lvl1pPr>
-              <a:defRPr lang="en-AU" sz="1200" kern="1200" dirty="0" smtClean="0">
-                <a:solidFill>
-                  <a:schemeClr val="accent4">
-                    <a:lumMod val="75000"/>
-                  </a:schemeClr>
-                </a:solidFill>
-                <a:latin typeface="+mn-lt"/>
-                <a:ea typeface="+mn-ea"/>
-                <a:cs typeface="+mn-cs"/>
-              </a:defRPr>
-            </a:lvl1pPr>
-          </a:lstStyle>
-          <a:p>
-            <a:r>
-              <a:rPr lang="en-AU" dirty="0" smtClean="0">
-                <a:latin typeface="+mj-lt"/>
-              </a:rPr>
-              <a:t>SnapSat Preliminary Design Presentation</a:t>
-            </a:r>
-            <a:endParaRPr lang="en-AU" dirty="0">
-              <a:latin typeface="+mj-lt"/>
-            </a:endParaRPr>
-          </a:p>
-        </p:txBody>
-      </p:sp>
-      <p:sp>
-        <p:nvSpPr>
-          <p:cNvPr id="6" name="Slide Number Placeholder 5"/>
-          <p:cNvSpPr>
-            <a:spLocks noGrp="1"/>
-          </p:cNvSpPr>
-          <p:nvPr>
-            <p:ph type="sldNum" sz="quarter" idx="12"/>
-          </p:nvPr>
-        </p:nvSpPr>
-        <p:spPr>
-          <a:xfrm>
-            <a:off x="6457950" y="6356351"/>
-            <a:ext cx="2057400" cy="365125"/>
-          </a:xfrm>
-        </p:spPr>
-        <p:txBody>
-          <a:bodyPr/>
-          <a:lstStyle>
-            <a:lvl1pPr>
-              <a:defRPr lang="en-AU" sz="1200" kern="1200" smtClean="0">
-                <a:solidFill>
-                  <a:schemeClr val="accent4">
-                    <a:lumMod val="75000"/>
-                  </a:schemeClr>
-                </a:solidFill>
-                <a:latin typeface="+mn-lt"/>
-                <a:ea typeface="+mn-ea"/>
-                <a:cs typeface="+mn-cs"/>
-              </a:defRPr>
-            </a:lvl1pPr>
-          </a:lstStyle>
-          <a:p>
-            <a:fld id="{C4ECF3C4-FF48-446E-AC9C-C0875A373764}" type="slidenum">
-              <a:rPr lang="en-AU" smtClean="0">
-                <a:latin typeface="+mj-lt"/>
-              </a:rPr>
-              <a:t>2</a:t>
-            </a:fld>
-            <a:endParaRPr lang="en-AU" dirty="0">
-              <a:latin typeface="+mj-lt"/>
-            </a:endParaRPr>
-          </a:p>
-        </p:txBody>
-      </p:sp>
-    </p:spTree>
-    <p:extLst>
-      <p:ext uri="{BB962C8B-B14F-4D97-AF65-F5344CB8AC3E}">
-        <p14:creationId xmlns:p14="http://schemas.microsoft.com/office/powerpoint/2010/main" val="3032752866"/>
-      </p:ext>
-    </p:extLst>
-  </p:cSld>
-  <p:clrMapOvr>
-    <a:masterClrMapping/>
-  </p:clrMapOvr>
-  <p:timing>
-    <p:tnLst>
-      <p:par>
-        <p:cTn id="1" dur="indefinite" restart="never" nodeType="tmRoot"/>
-      </p:par>
-    </p:tnLst>
-  </p:timing>
-</p:sld>
-</file>
-
 <file path=ppt/slides/slide3.xml><?xml version="1.0" encoding="utf-8"?>
 <p:sld xmlns:a="http://schemas.openxmlformats.org/drawingml/2006/main" xmlns:r="http://schemas.openxmlformats.org/officeDocument/2006/relationships" xmlns:p="http://schemas.openxmlformats.org/presentationml/2006/main">
   <p:cSld>
@@ -8406,11 +9159,30 @@
           <a:bodyPr/>
           <a:lstStyle/>
           <a:p>
+            <a:pPr marL="0" indent="0">
+              <a:buNone/>
+            </a:pPr>
             <a:r>
               <a:rPr lang="en-AU" dirty="0" smtClean="0"/>
-              <a:t>To bring space to YOU</a:t>
-            </a:r>
-            <a:endParaRPr lang="en-AU" dirty="0"/>
+              <a:t>PRIMARY</a:t>
+            </a:r>
+          </a:p>
+          <a:p>
+            <a:r>
+              <a:rPr lang="en-AU" dirty="0" smtClean="0"/>
+              <a:t>To </a:t>
+            </a:r>
+            <a:r>
+              <a:rPr lang="en-AU" dirty="0" smtClean="0"/>
+              <a:t>bring space to </a:t>
+            </a:r>
+            <a:r>
+              <a:rPr lang="en-AU" dirty="0" smtClean="0"/>
+              <a:t>YOU</a:t>
+            </a:r>
+          </a:p>
+          <a:p>
+            <a:endParaRPr lang="en-AU" dirty="0" smtClean="0"/>
           </a:p>
         </p:txBody>
       </p:sp>
@@ -9016,7 +9788,7 @@
           <a:p>
             <a:r>
               <a:rPr lang="en-AU" dirty="0" smtClean="0"/>
-              <a:t>Operation Overview</a:t>
+              <a:t>Our Mission</a:t>
             </a:r>
             <a:endParaRPr lang="en-AU" dirty="0"/>
           </a:p>
@@ -9024,12 +9796,12 @@
       </p:sp>
       <p:sp>
         <p:nvSpPr>
-          <p:cNvPr id="3" name="Text Placeholder 2"/>
-          <p:cNvSpPr>
-            <a:spLocks noGrp="1"/>
-          </p:cNvSpPr>
-          <p:nvPr>
-            <p:ph type="body" idx="1"/>
+          <p:cNvPr id="3" name="Content Placeholder 2"/>
+          <p:cNvSpPr>
+            <a:spLocks noGrp="1"/>
+          </p:cNvSpPr>
+          <p:nvPr>
+            <p:ph idx="1"/>
           </p:nvPr>
         </p:nvSpPr>
         <p:spPr/>
@@ -9037,31 +9809,517 @@
           <a:bodyPr/>
           <a:lstStyle/>
           <a:p>
-            <a:r>
-              <a:rPr lang="en-AU" dirty="0" smtClean="0"/>
-              <a:t>Component Selection and Operation</a:t>
-            </a:r>
+            <a:pPr marL="0" indent="0">
+              <a:buNone/>
+            </a:pPr>
+            <a:r>
+              <a:rPr lang="en-AU" dirty="0"/>
+              <a:t>SECONDARY</a:t>
+            </a:r>
+          </a:p>
+          <a:p>
+            <a:r>
+              <a:rPr lang="en-AU" dirty="0"/>
+              <a:t>To demonstrate that a functional CubeSat can be built on a low budget</a:t>
+            </a:r>
+          </a:p>
+          <a:p>
             <a:endParaRPr lang="en-AU" dirty="0"/>
+          </a:p>
+        </p:txBody>
+      </p:sp>
+      <p:pic>
+        <p:nvPicPr>
+          <p:cNvPr id="4" name="Picture 3"/>
+          <p:cNvPicPr>
+            <a:picLocks noChangeAspect="1"/>
+          </p:cNvPicPr>
+          <p:nvPr/>
+        </p:nvPicPr>
+        <p:blipFill>
+          <a:blip r:embed="rId3">
+            <a:extLst>
+              <a:ext uri="{28A0092B-C50C-407E-A947-70E740481C1C}">
+                <a14:useLocalDpi xmlns:a14="http://schemas.microsoft.com/office/drawing/2010/main" val="0"/>
+              </a:ext>
+            </a:extLst>
+          </a:blip>
+          <a:stretch>
+            <a:fillRect/>
+          </a:stretch>
+        </p:blipFill>
+        <p:spPr>
+          <a:xfrm>
+            <a:off x="2706624" y="2679280"/>
+            <a:ext cx="6227064" cy="3580701"/>
+          </a:xfrm>
+          <a:prstGeom prst="rect">
+            <a:avLst/>
+          </a:prstGeom>
+        </p:spPr>
+      </p:pic>
+      <p:sp>
+        <p:nvSpPr>
+          <p:cNvPr id="7" name="Freeform 6"/>
+          <p:cNvSpPr/>
+          <p:nvPr/>
+        </p:nvSpPr>
+        <p:spPr>
+          <a:xfrm>
+            <a:off x="7729142" y="5561162"/>
+            <a:ext cx="548083" cy="325288"/>
+          </a:xfrm>
+          <a:custGeom>
+            <a:avLst/>
+            <a:gdLst>
+              <a:gd name="connsiteX0" fmla="*/ 252808 w 548083"/>
+              <a:gd name="connsiteY0" fmla="*/ 15726 h 325288"/>
+              <a:gd name="connsiteX1" fmla="*/ 209946 w 548083"/>
+              <a:gd name="connsiteY1" fmla="*/ 1438 h 325288"/>
+              <a:gd name="connsiteX2" fmla="*/ 33733 w 548083"/>
+              <a:gd name="connsiteY2" fmla="*/ 10963 h 325288"/>
+              <a:gd name="connsiteX3" fmla="*/ 19446 w 548083"/>
+              <a:gd name="connsiteY3" fmla="*/ 15726 h 325288"/>
+              <a:gd name="connsiteX4" fmla="*/ 9921 w 548083"/>
+              <a:gd name="connsiteY4" fmla="*/ 58588 h 325288"/>
+              <a:gd name="connsiteX5" fmla="*/ 14683 w 548083"/>
+              <a:gd name="connsiteY5" fmla="*/ 77638 h 325288"/>
+              <a:gd name="connsiteX6" fmla="*/ 24208 w 548083"/>
+              <a:gd name="connsiteY6" fmla="*/ 91926 h 325288"/>
+              <a:gd name="connsiteX7" fmla="*/ 38496 w 548083"/>
+              <a:gd name="connsiteY7" fmla="*/ 130026 h 325288"/>
+              <a:gd name="connsiteX8" fmla="*/ 43258 w 548083"/>
+              <a:gd name="connsiteY8" fmla="*/ 158601 h 325288"/>
+              <a:gd name="connsiteX9" fmla="*/ 48021 w 548083"/>
+              <a:gd name="connsiteY9" fmla="*/ 172888 h 325288"/>
+              <a:gd name="connsiteX10" fmla="*/ 52783 w 548083"/>
+              <a:gd name="connsiteY10" fmla="*/ 201463 h 325288"/>
+              <a:gd name="connsiteX11" fmla="*/ 57546 w 548083"/>
+              <a:gd name="connsiteY11" fmla="*/ 215751 h 325288"/>
+              <a:gd name="connsiteX12" fmla="*/ 62308 w 548083"/>
+              <a:gd name="connsiteY12" fmla="*/ 234801 h 325288"/>
+              <a:gd name="connsiteX13" fmla="*/ 81358 w 548083"/>
+              <a:gd name="connsiteY13" fmla="*/ 263376 h 325288"/>
+              <a:gd name="connsiteX14" fmla="*/ 100408 w 548083"/>
+              <a:gd name="connsiteY14" fmla="*/ 272901 h 325288"/>
+              <a:gd name="connsiteX15" fmla="*/ 114696 w 548083"/>
+              <a:gd name="connsiteY15" fmla="*/ 282426 h 325288"/>
+              <a:gd name="connsiteX16" fmla="*/ 148033 w 548083"/>
+              <a:gd name="connsiteY16" fmla="*/ 291951 h 325288"/>
+              <a:gd name="connsiteX17" fmla="*/ 167083 w 548083"/>
+              <a:gd name="connsiteY17" fmla="*/ 301476 h 325288"/>
+              <a:gd name="connsiteX18" fmla="*/ 190896 w 548083"/>
+              <a:gd name="connsiteY18" fmla="*/ 306238 h 325288"/>
+              <a:gd name="connsiteX19" fmla="*/ 209946 w 548083"/>
+              <a:gd name="connsiteY19" fmla="*/ 311001 h 325288"/>
+              <a:gd name="connsiteX20" fmla="*/ 309958 w 548083"/>
+              <a:gd name="connsiteY20" fmla="*/ 320526 h 325288"/>
+              <a:gd name="connsiteX21" fmla="*/ 343296 w 548083"/>
+              <a:gd name="connsiteY21" fmla="*/ 325288 h 325288"/>
+              <a:gd name="connsiteX22" fmla="*/ 409971 w 548083"/>
+              <a:gd name="connsiteY22" fmla="*/ 320526 h 325288"/>
+              <a:gd name="connsiteX23" fmla="*/ 443308 w 548083"/>
+              <a:gd name="connsiteY23" fmla="*/ 311001 h 325288"/>
+              <a:gd name="connsiteX24" fmla="*/ 476646 w 548083"/>
+              <a:gd name="connsiteY24" fmla="*/ 301476 h 325288"/>
+              <a:gd name="connsiteX25" fmla="*/ 486171 w 548083"/>
+              <a:gd name="connsiteY25" fmla="*/ 287188 h 325288"/>
+              <a:gd name="connsiteX26" fmla="*/ 514746 w 548083"/>
+              <a:gd name="connsiteY26" fmla="*/ 268138 h 325288"/>
+              <a:gd name="connsiteX27" fmla="*/ 524271 w 548083"/>
+              <a:gd name="connsiteY27" fmla="*/ 253851 h 325288"/>
+              <a:gd name="connsiteX28" fmla="*/ 538558 w 548083"/>
+              <a:gd name="connsiteY28" fmla="*/ 249088 h 325288"/>
+              <a:gd name="connsiteX29" fmla="*/ 548083 w 548083"/>
+              <a:gd name="connsiteY29" fmla="*/ 220513 h 325288"/>
+              <a:gd name="connsiteX30" fmla="*/ 533796 w 548083"/>
+              <a:gd name="connsiteY30" fmla="*/ 125263 h 325288"/>
+              <a:gd name="connsiteX31" fmla="*/ 514746 w 548083"/>
+              <a:gd name="connsiteY31" fmla="*/ 96688 h 325288"/>
+              <a:gd name="connsiteX32" fmla="*/ 481408 w 548083"/>
+              <a:gd name="connsiteY32" fmla="*/ 82401 h 325288"/>
+              <a:gd name="connsiteX33" fmla="*/ 448071 w 548083"/>
+              <a:gd name="connsiteY33" fmla="*/ 63351 h 325288"/>
+              <a:gd name="connsiteX34" fmla="*/ 419496 w 548083"/>
+              <a:gd name="connsiteY34" fmla="*/ 44301 h 325288"/>
+              <a:gd name="connsiteX35" fmla="*/ 276621 w 548083"/>
+              <a:gd name="connsiteY35" fmla="*/ 30013 h 325288"/>
+              <a:gd name="connsiteX36" fmla="*/ 329008 w 548083"/>
+              <a:gd name="connsiteY36" fmla="*/ 30013 h 325288"/>
+              <a:gd name="connsiteX37" fmla="*/ 314721 w 548083"/>
+              <a:gd name="connsiteY37" fmla="*/ 25251 h 325288"/>
+              <a:gd name="connsiteX38" fmla="*/ 329008 w 548083"/>
+              <a:gd name="connsiteY38" fmla="*/ 39538 h 325288"/>
+              <a:gd name="connsiteX39" fmla="*/ 314721 w 548083"/>
+              <a:gd name="connsiteY39" fmla="*/ 30013 h 325288"/>
+            </a:gdLst>
+            <a:ahLst/>
+            <a:cxnLst>
+              <a:cxn ang="0">
+                <a:pos x="connsiteX0" y="connsiteY0"/>
+              </a:cxn>
+              <a:cxn ang="0">
+                <a:pos x="connsiteX1" y="connsiteY1"/>
+              </a:cxn>
+              <a:cxn ang="0">
+                <a:pos x="connsiteX2" y="connsiteY2"/>
+              </a:cxn>
+              <a:cxn ang="0">
+                <a:pos x="connsiteX3" y="connsiteY3"/>
+              </a:cxn>
+              <a:cxn ang="0">
+                <a:pos x="connsiteX4" y="connsiteY4"/>
+              </a:cxn>
+              <a:cxn ang="0">
+                <a:pos x="connsiteX5" y="connsiteY5"/>
+              </a:cxn>
+              <a:cxn ang="0">
+                <a:pos x="connsiteX6" y="connsiteY6"/>
+              </a:cxn>
+              <a:cxn ang="0">
+                <a:pos x="connsiteX7" y="connsiteY7"/>
+              </a:cxn>
+              <a:cxn ang="0">
+                <a:pos x="connsiteX8" y="connsiteY8"/>
+              </a:cxn>
+              <a:cxn ang="0">
+                <a:pos x="connsiteX9" y="connsiteY9"/>
+              </a:cxn>
+              <a:cxn ang="0">
+                <a:pos x="connsiteX10" y="connsiteY10"/>
+              </a:cxn>
+              <a:cxn ang="0">
+                <a:pos x="connsiteX11" y="connsiteY11"/>
+              </a:cxn>
+              <a:cxn ang="0">
+                <a:pos x="connsiteX12" y="connsiteY12"/>
+              </a:cxn>
+              <a:cxn ang="0">
+                <a:pos x="connsiteX13" y="connsiteY13"/>
+              </a:cxn>
+              <a:cxn ang="0">
+                <a:pos x="connsiteX14" y="connsiteY14"/>
+              </a:cxn>
+              <a:cxn ang="0">
+                <a:pos x="connsiteX15" y="connsiteY15"/>
+              </a:cxn>
+              <a:cxn ang="0">
+                <a:pos x="connsiteX16" y="connsiteY16"/>
+              </a:cxn>
+              <a:cxn ang="0">
+                <a:pos x="connsiteX17" y="connsiteY17"/>
+              </a:cxn>
+              <a:cxn ang="0">
+                <a:pos x="connsiteX18" y="connsiteY18"/>
+              </a:cxn>
+              <a:cxn ang="0">
+                <a:pos x="connsiteX19" y="connsiteY19"/>
+              </a:cxn>
+              <a:cxn ang="0">
+                <a:pos x="connsiteX20" y="connsiteY20"/>
+              </a:cxn>
+              <a:cxn ang="0">
+                <a:pos x="connsiteX21" y="connsiteY21"/>
+              </a:cxn>
+              <a:cxn ang="0">
+                <a:pos x="connsiteX22" y="connsiteY22"/>
+              </a:cxn>
+              <a:cxn ang="0">
+                <a:pos x="connsiteX23" y="connsiteY23"/>
+              </a:cxn>
+              <a:cxn ang="0">
+                <a:pos x="connsiteX24" y="connsiteY24"/>
+              </a:cxn>
+              <a:cxn ang="0">
+                <a:pos x="connsiteX25" y="connsiteY25"/>
+              </a:cxn>
+              <a:cxn ang="0">
+                <a:pos x="connsiteX26" y="connsiteY26"/>
+              </a:cxn>
+              <a:cxn ang="0">
+                <a:pos x="connsiteX27" y="connsiteY27"/>
+              </a:cxn>
+              <a:cxn ang="0">
+                <a:pos x="connsiteX28" y="connsiteY28"/>
+              </a:cxn>
+              <a:cxn ang="0">
+                <a:pos x="connsiteX29" y="connsiteY29"/>
+              </a:cxn>
+              <a:cxn ang="0">
+                <a:pos x="connsiteX30" y="connsiteY30"/>
+              </a:cxn>
+              <a:cxn ang="0">
+                <a:pos x="connsiteX31" y="connsiteY31"/>
+              </a:cxn>
+              <a:cxn ang="0">
+                <a:pos x="connsiteX32" y="connsiteY32"/>
+              </a:cxn>
+              <a:cxn ang="0">
+                <a:pos x="connsiteX33" y="connsiteY33"/>
+              </a:cxn>
+              <a:cxn ang="0">
+                <a:pos x="connsiteX34" y="connsiteY34"/>
+              </a:cxn>
+              <a:cxn ang="0">
+                <a:pos x="connsiteX35" y="connsiteY35"/>
+              </a:cxn>
+              <a:cxn ang="0">
+                <a:pos x="connsiteX36" y="connsiteY36"/>
+              </a:cxn>
+              <a:cxn ang="0">
+                <a:pos x="connsiteX37" y="connsiteY37"/>
+              </a:cxn>
+              <a:cxn ang="0">
+                <a:pos x="connsiteX38" y="connsiteY38"/>
+              </a:cxn>
+              <a:cxn ang="0">
+                <a:pos x="connsiteX39" y="connsiteY39"/>
+              </a:cxn>
+            </a:cxnLst>
+            <a:rect l="l" t="t" r="r" b="b"/>
+            <a:pathLst>
+              <a:path w="548083" h="325288">
+                <a:moveTo>
+                  <a:pt x="252808" y="15726"/>
+                </a:moveTo>
+                <a:cubicBezTo>
+                  <a:pt x="238521" y="10963"/>
+                  <a:pt x="224988" y="2172"/>
+                  <a:pt x="209946" y="1438"/>
+                </a:cubicBezTo>
+                <a:cubicBezTo>
+                  <a:pt x="169871" y="-517"/>
+                  <a:pt x="88206" y="-2655"/>
+                  <a:pt x="33733" y="10963"/>
+                </a:cubicBezTo>
+                <a:cubicBezTo>
+                  <a:pt x="28863" y="12181"/>
+                  <a:pt x="24208" y="14138"/>
+                  <a:pt x="19446" y="15726"/>
+                </a:cubicBezTo>
+                <a:cubicBezTo>
+                  <a:pt x="-2779" y="49063"/>
+                  <a:pt x="-5954" y="34776"/>
+                  <a:pt x="9921" y="58588"/>
+                </a:cubicBezTo>
+                <a:cubicBezTo>
+                  <a:pt x="11508" y="64938"/>
+                  <a:pt x="12105" y="71622"/>
+                  <a:pt x="14683" y="77638"/>
+                </a:cubicBezTo>
+                <a:cubicBezTo>
+                  <a:pt x="16938" y="82899"/>
+                  <a:pt x="22198" y="86567"/>
+                  <a:pt x="24208" y="91926"/>
+                </a:cubicBezTo>
+                <a:cubicBezTo>
+                  <a:pt x="41864" y="139007"/>
+                  <a:pt x="16158" y="96518"/>
+                  <a:pt x="38496" y="130026"/>
+                </a:cubicBezTo>
+                <a:cubicBezTo>
+                  <a:pt x="40083" y="139551"/>
+                  <a:pt x="41163" y="149175"/>
+                  <a:pt x="43258" y="158601"/>
+                </a:cubicBezTo>
+                <a:cubicBezTo>
+                  <a:pt x="44347" y="163501"/>
+                  <a:pt x="46932" y="167988"/>
+                  <a:pt x="48021" y="172888"/>
+                </a:cubicBezTo>
+                <a:cubicBezTo>
+                  <a:pt x="50116" y="182314"/>
+                  <a:pt x="50688" y="192037"/>
+                  <a:pt x="52783" y="201463"/>
+                </a:cubicBezTo>
+                <a:cubicBezTo>
+                  <a:pt x="53872" y="206364"/>
+                  <a:pt x="56167" y="210924"/>
+                  <a:pt x="57546" y="215751"/>
+                </a:cubicBezTo>
+                <a:cubicBezTo>
+                  <a:pt x="59344" y="222045"/>
+                  <a:pt x="59381" y="228947"/>
+                  <a:pt x="62308" y="234801"/>
+                </a:cubicBezTo>
+                <a:cubicBezTo>
+                  <a:pt x="67427" y="245040"/>
+                  <a:pt x="71119" y="258256"/>
+                  <a:pt x="81358" y="263376"/>
+                </a:cubicBezTo>
+                <a:cubicBezTo>
+                  <a:pt x="87708" y="266551"/>
+                  <a:pt x="94244" y="269379"/>
+                  <a:pt x="100408" y="272901"/>
+                </a:cubicBezTo>
+                <a:cubicBezTo>
+                  <a:pt x="105378" y="275741"/>
+                  <a:pt x="109381" y="280300"/>
+                  <a:pt x="114696" y="282426"/>
+                </a:cubicBezTo>
+                <a:cubicBezTo>
+                  <a:pt x="125426" y="286718"/>
+                  <a:pt x="137172" y="288001"/>
+                  <a:pt x="148033" y="291951"/>
+                </a:cubicBezTo>
+                <a:cubicBezTo>
+                  <a:pt x="154705" y="294377"/>
+                  <a:pt x="160348" y="299231"/>
+                  <a:pt x="167083" y="301476"/>
+                </a:cubicBezTo>
+                <a:cubicBezTo>
+                  <a:pt x="174762" y="304036"/>
+                  <a:pt x="182994" y="304482"/>
+                  <a:pt x="190896" y="306238"/>
+                </a:cubicBezTo>
+                <a:cubicBezTo>
+                  <a:pt x="197286" y="307658"/>
+                  <a:pt x="203447" y="310221"/>
+                  <a:pt x="209946" y="311001"/>
+                </a:cubicBezTo>
+                <a:cubicBezTo>
+                  <a:pt x="243196" y="314991"/>
+                  <a:pt x="276806" y="315791"/>
+                  <a:pt x="309958" y="320526"/>
+                </a:cubicBezTo>
+                <a:lnTo>
+                  <a:pt x="343296" y="325288"/>
+                </a:lnTo>
+                <a:cubicBezTo>
+                  <a:pt x="365521" y="323701"/>
+                  <a:pt x="387826" y="322987"/>
+                  <a:pt x="409971" y="320526"/>
+                </a:cubicBezTo>
+                <a:cubicBezTo>
+                  <a:pt x="422145" y="319173"/>
+                  <a:pt x="431820" y="314283"/>
+                  <a:pt x="443308" y="311001"/>
+                </a:cubicBezTo>
+                <a:cubicBezTo>
+                  <a:pt x="485177" y="299038"/>
+                  <a:pt x="442382" y="312896"/>
+                  <a:pt x="476646" y="301476"/>
+                </a:cubicBezTo>
+                <a:cubicBezTo>
+                  <a:pt x="479821" y="296713"/>
+                  <a:pt x="481863" y="290957"/>
+                  <a:pt x="486171" y="287188"/>
+                </a:cubicBezTo>
+                <a:cubicBezTo>
+                  <a:pt x="494786" y="279650"/>
+                  <a:pt x="514746" y="268138"/>
+                  <a:pt x="514746" y="268138"/>
+                </a:cubicBezTo>
+                <a:cubicBezTo>
+                  <a:pt x="517921" y="263376"/>
+                  <a:pt x="519802" y="257427"/>
+                  <a:pt x="524271" y="253851"/>
+                </a:cubicBezTo>
+                <a:cubicBezTo>
+                  <a:pt x="528191" y="250715"/>
+                  <a:pt x="535640" y="253173"/>
+                  <a:pt x="538558" y="249088"/>
+                </a:cubicBezTo>
+                <a:cubicBezTo>
+                  <a:pt x="544394" y="240918"/>
+                  <a:pt x="548083" y="220513"/>
+                  <a:pt x="548083" y="220513"/>
+                </a:cubicBezTo>
+                <a:cubicBezTo>
+                  <a:pt x="547157" y="209400"/>
+                  <a:pt x="544586" y="141448"/>
+                  <a:pt x="533796" y="125263"/>
+                </a:cubicBezTo>
+                <a:cubicBezTo>
+                  <a:pt x="527446" y="115738"/>
+                  <a:pt x="525606" y="100308"/>
+                  <a:pt x="514746" y="96688"/>
+                </a:cubicBezTo>
+                <a:cubicBezTo>
+                  <a:pt x="500856" y="92059"/>
+                  <a:pt x="494861" y="90809"/>
+                  <a:pt x="481408" y="82401"/>
+                </a:cubicBezTo>
+                <a:cubicBezTo>
+                  <a:pt x="448457" y="61806"/>
+                  <a:pt x="476140" y="72707"/>
+                  <a:pt x="448071" y="63351"/>
+                </a:cubicBezTo>
+                <a:cubicBezTo>
+                  <a:pt x="438546" y="57001"/>
+                  <a:pt x="430356" y="47921"/>
+                  <a:pt x="419496" y="44301"/>
+                </a:cubicBezTo>
+                <a:cubicBezTo>
+                  <a:pt x="354745" y="22717"/>
+                  <a:pt x="400953" y="35194"/>
+                  <a:pt x="276621" y="30013"/>
+                </a:cubicBezTo>
+                <a:cubicBezTo>
+                  <a:pt x="280388" y="31089"/>
+                  <a:pt x="321980" y="51095"/>
+                  <a:pt x="329008" y="30013"/>
+                </a:cubicBezTo>
+                <a:cubicBezTo>
+                  <a:pt x="330596" y="25251"/>
+                  <a:pt x="319483" y="26838"/>
+                  <a:pt x="314721" y="25251"/>
+                </a:cubicBezTo>
+                <a:cubicBezTo>
+                  <a:pt x="319483" y="30013"/>
+                  <a:pt x="329008" y="32803"/>
+                  <a:pt x="329008" y="39538"/>
+                </a:cubicBezTo>
+                <a:cubicBezTo>
+                  <a:pt x="329008" y="45262"/>
+                  <a:pt x="314721" y="30013"/>
+                  <a:pt x="314721" y="30013"/>
+                </a:cubicBezTo>
+              </a:path>
+            </a:pathLst>
+          </a:custGeom>
+          <a:noFill/>
+          <a:ln w="28575">
+            <a:solidFill>
+              <a:srgbClr val="FF0000"/>
+            </a:solidFill>
+          </a:ln>
+        </p:spPr>
+        <p:style>
+          <a:lnRef idx="2">
+            <a:schemeClr val="accent1">
+              <a:shade val="50000"/>
+            </a:schemeClr>
+          </a:lnRef>
+          <a:fillRef idx="1">
+            <a:schemeClr val="accent1"/>
+          </a:fillRef>
+          <a:effectRef idx="0">
+            <a:schemeClr val="accent1"/>
+          </a:effectRef>
+          <a:fontRef idx="minor">
+            <a:schemeClr val="lt1"/>
+          </a:fontRef>
+        </p:style>
+        <p:txBody>
+          <a:bodyPr rtlCol="0" anchor="ctr"/>
+          <a:lstStyle/>
+          <a:p>
+            <a:pPr algn="ctr"/>
+            <a:endParaRPr lang="en-AU"/>
           </a:p>
         </p:txBody>
       </p:sp>
     </p:spTree>
     <p:extLst>
       <p:ext uri="{BB962C8B-B14F-4D97-AF65-F5344CB8AC3E}">
-        <p14:creationId xmlns:p14="http://schemas.microsoft.com/office/powerpoint/2010/main" val="3357271950"/>
+        <p14:creationId xmlns:p14="http://schemas.microsoft.com/office/powerpoint/2010/main" val="3686100345"/>
       </p:ext>
     </p:extLst>
   </p:cSld>
   <p:clrMapOvr>
     <a:masterClrMapping/>
   </p:clrMapOvr>
-  <p:timing>
-    <p:tnLst>
-      <p:par>
-        <p:cTn id="1" dur="indefinite" restart="never" nodeType="tmRoot"/>
-      </p:par>
-    </p:tnLst>
-  </p:timing>
 </p:sld>
 </file>
 
@@ -9099,7 +10357,7 @@
           <a:p>
             <a:r>
               <a:rPr lang="en-AU" dirty="0" smtClean="0"/>
-              <a:t>Modes of Operation</a:t>
+              <a:t>CubeSat Limitations</a:t>
             </a:r>
             <a:endParaRPr lang="en-AU" dirty="0"/>
           </a:p>
@@ -9107,170 +10365,88 @@
       </p:sp>
       <p:sp>
         <p:nvSpPr>
-          <p:cNvPr id="33" name="Date Placeholder 3"/>
-          <p:cNvSpPr>
-            <a:spLocks noGrp="1"/>
-          </p:cNvSpPr>
-          <p:nvPr>
-            <p:ph type="dt" sz="half" idx="10"/>
-          </p:nvPr>
-        </p:nvSpPr>
-        <p:spPr>
-          <a:xfrm>
-            <a:off x="628650" y="6356351"/>
-            <a:ext cx="2057400" cy="365125"/>
-          </a:xfrm>
-        </p:spPr>
-        <p:txBody>
-          <a:bodyPr/>
-          <a:lstStyle>
-            <a:lvl1pPr>
-              <a:defRPr>
-                <a:solidFill>
-                  <a:schemeClr val="accent4">
-                    <a:lumMod val="75000"/>
-                  </a:schemeClr>
-                </a:solidFill>
-              </a:defRPr>
-            </a:lvl1pPr>
-          </a:lstStyle>
-          <a:p>
-            <a:r>
-              <a:rPr lang="en-AU" dirty="0" smtClean="0">
-                <a:latin typeface="+mj-lt"/>
-              </a:rPr>
-              <a:t>Tuesday 24 August 2015</a:t>
-            </a:r>
-            <a:endParaRPr lang="en-AU" dirty="0">
-              <a:latin typeface="+mj-lt"/>
-            </a:endParaRPr>
-          </a:p>
-        </p:txBody>
-      </p:sp>
-      <p:sp>
-        <p:nvSpPr>
-          <p:cNvPr id="34" name="Footer Placeholder 4"/>
-          <p:cNvSpPr>
-            <a:spLocks noGrp="1"/>
-          </p:cNvSpPr>
-          <p:nvPr>
-            <p:ph type="ftr" sz="quarter" idx="11"/>
-          </p:nvPr>
-        </p:nvSpPr>
-        <p:spPr>
-          <a:xfrm>
-            <a:off x="3028950" y="6356351"/>
-            <a:ext cx="3086100" cy="365125"/>
-          </a:xfrm>
-        </p:spPr>
-        <p:txBody>
-          <a:bodyPr/>
-          <a:lstStyle>
-            <a:lvl1pPr>
-              <a:defRPr lang="en-AU" sz="1200" kern="1200" dirty="0" smtClean="0">
-                <a:solidFill>
-                  <a:schemeClr val="accent4">
-                    <a:lumMod val="75000"/>
-                  </a:schemeClr>
-                </a:solidFill>
-                <a:latin typeface="+mn-lt"/>
-                <a:ea typeface="+mn-ea"/>
-                <a:cs typeface="+mn-cs"/>
-              </a:defRPr>
-            </a:lvl1pPr>
-          </a:lstStyle>
-          <a:p>
-            <a:r>
-              <a:rPr lang="en-AU" dirty="0" smtClean="0">
-                <a:latin typeface="+mj-lt"/>
-              </a:rPr>
-              <a:t>SnapSat Preliminary Design Presentation</a:t>
-            </a:r>
-            <a:endParaRPr lang="en-AU" dirty="0">
-              <a:latin typeface="+mj-lt"/>
-            </a:endParaRPr>
-          </a:p>
-        </p:txBody>
-      </p:sp>
-      <p:sp>
-        <p:nvSpPr>
-          <p:cNvPr id="35" name="Slide Number Placeholder 5"/>
-          <p:cNvSpPr>
-            <a:spLocks noGrp="1"/>
-          </p:cNvSpPr>
-          <p:nvPr>
-            <p:ph type="sldNum" sz="quarter" idx="12"/>
-          </p:nvPr>
-        </p:nvSpPr>
-        <p:spPr>
-          <a:xfrm>
-            <a:off x="6457950" y="6356351"/>
-            <a:ext cx="2057400" cy="365125"/>
-          </a:xfrm>
-        </p:spPr>
-        <p:txBody>
-          <a:bodyPr/>
-          <a:lstStyle>
-            <a:lvl1pPr>
-              <a:defRPr lang="en-AU" sz="1200" kern="1200" smtClean="0">
-                <a:solidFill>
-                  <a:schemeClr val="accent4">
-                    <a:lumMod val="75000"/>
-                  </a:schemeClr>
-                </a:solidFill>
-                <a:latin typeface="+mn-lt"/>
-                <a:ea typeface="+mn-ea"/>
-                <a:cs typeface="+mn-cs"/>
-              </a:defRPr>
-            </a:lvl1pPr>
-          </a:lstStyle>
-          <a:p>
-            <a:fld id="{23C4C7DD-0F99-4C86-8090-6A492101F91C}" type="slidenum">
-              <a:rPr lang="en-AU" smtClean="0">
-                <a:latin typeface="+mj-lt"/>
-              </a:rPr>
-              <a:t>6</a:t>
-            </a:fld>
-            <a:endParaRPr lang="en-AU" dirty="0">
-              <a:latin typeface="+mj-lt"/>
-            </a:endParaRPr>
-          </a:p>
-        </p:txBody>
-      </p:sp>
-      <p:pic>
-        <p:nvPicPr>
-          <p:cNvPr id="25" name="Picture 24"/>
-          <p:cNvPicPr>
-            <a:picLocks noChangeAspect="1"/>
-          </p:cNvPicPr>
-          <p:nvPr/>
-        </p:nvPicPr>
-        <p:blipFill>
-          <a:blip r:embed="rId2">
-            <a:extLst>
-              <a:ext uri="{28A0092B-C50C-407E-A947-70E740481C1C}">
-                <a14:useLocalDpi xmlns:a14="http://schemas.microsoft.com/office/drawing/2010/main" val="0"/>
-              </a:ext>
-            </a:extLst>
-          </a:blip>
-          <a:stretch>
-            <a:fillRect/>
-          </a:stretch>
-        </p:blipFill>
-        <p:spPr>
-          <a:xfrm>
-            <a:off x="968190" y="1625429"/>
-            <a:ext cx="5371650" cy="4434570"/>
-          </a:xfrm>
-          <a:prstGeom prst="rect">
-            <a:avLst/>
-          </a:prstGeom>
-        </p:spPr>
-      </p:pic>
+          <p:cNvPr id="3" name="Content Placeholder 2"/>
+          <p:cNvSpPr>
+            <a:spLocks noGrp="1"/>
+          </p:cNvSpPr>
+          <p:nvPr>
+            <p:ph idx="1"/>
+          </p:nvPr>
+        </p:nvSpPr>
+        <p:spPr/>
+        <p:txBody>
+          <a:bodyPr/>
+          <a:lstStyle/>
+          <a:p>
+            <a:pPr marL="0" indent="0">
+              <a:buNone/>
+            </a:pPr>
+            <a:r>
+              <a:rPr lang="en-AU" dirty="0" smtClean="0"/>
+              <a:t>Common Problems</a:t>
+            </a:r>
+          </a:p>
+          <a:p>
+            <a:r>
+              <a:rPr lang="en-AU" dirty="0" smtClean="0"/>
+              <a:t>Power Limitations</a:t>
+            </a:r>
+            <a:endParaRPr lang="en-AU" dirty="0" smtClean="0"/>
+          </a:p>
+          <a:p>
+            <a:r>
+              <a:rPr lang="en-AU" dirty="0" smtClean="0"/>
+              <a:t>Size Limitations</a:t>
+            </a:r>
+            <a:endParaRPr lang="en-AU" dirty="0" smtClean="0"/>
+          </a:p>
+          <a:p>
+            <a:r>
+              <a:rPr lang="en-AU" dirty="0" smtClean="0"/>
+              <a:t>Transmission </a:t>
+            </a:r>
+            <a:r>
+              <a:rPr lang="en-AU" dirty="0" smtClean="0"/>
+              <a:t>Power Problems</a:t>
+            </a:r>
+          </a:p>
+          <a:p>
+            <a:endParaRPr lang="en-AU" dirty="0"/>
+          </a:p>
+          <a:p>
+            <a:pPr marL="0" indent="0">
+              <a:buNone/>
+            </a:pPr>
+            <a:r>
+              <a:rPr lang="en-AU" dirty="0" smtClean="0"/>
+              <a:t>Innovative Subsections</a:t>
+            </a:r>
+            <a:endParaRPr lang="en-AU" dirty="0" smtClean="0"/>
+          </a:p>
+          <a:p>
+            <a:r>
+              <a:rPr lang="en-AU" dirty="0" smtClean="0"/>
+              <a:t>Increase transmission power</a:t>
+            </a:r>
+          </a:p>
+          <a:p>
+            <a:r>
+              <a:rPr lang="en-AU" dirty="0" smtClean="0"/>
+              <a:t>Increase power generation</a:t>
+            </a:r>
+          </a:p>
+          <a:p>
+            <a:endParaRPr lang="en-AU" dirty="0" smtClean="0"/>
+          </a:p>
+          <a:p>
+            <a:endParaRPr lang="en-AU" dirty="0" smtClean="0"/>
+          </a:p>
+        </p:txBody>
+      </p:sp>
     </p:spTree>
     <p:extLst>
       <p:ext uri="{BB962C8B-B14F-4D97-AF65-F5344CB8AC3E}">
-        <p14:creationId xmlns:p14="http://schemas.microsoft.com/office/powerpoint/2010/main" val="745331210"/>
+        <p14:creationId xmlns:p14="http://schemas.microsoft.com/office/powerpoint/2010/main" val="4045029302"/>
       </p:ext>
     </p:extLst>
   </p:cSld>
@@ -9321,7 +10497,7 @@
           <a:p>
             <a:r>
               <a:rPr lang="en-AU" dirty="0" smtClean="0"/>
-              <a:t>CubeSat Limitations</a:t>
+              <a:t>Structural Design</a:t>
             </a:r>
             <a:endParaRPr lang="en-AU" dirty="0"/>
           </a:p>
@@ -9329,12 +10505,12 @@
       </p:sp>
       <p:sp>
         <p:nvSpPr>
-          <p:cNvPr id="3" name="Content Placeholder 2"/>
-          <p:cNvSpPr>
-            <a:spLocks noGrp="1"/>
-          </p:cNvSpPr>
-          <p:nvPr>
-            <p:ph idx="1"/>
+          <p:cNvPr id="3" name="Text Placeholder 2"/>
+          <p:cNvSpPr>
+            <a:spLocks noGrp="1"/>
+          </p:cNvSpPr>
+          <p:nvPr>
+            <p:ph type="body" idx="1"/>
           </p:nvPr>
         </p:nvSpPr>
         <p:spPr/>
@@ -9342,45 +10518,14 @@
           <a:bodyPr/>
           <a:lstStyle/>
           <a:p>
-            <a:r>
-              <a:rPr lang="en-AU" dirty="0" smtClean="0"/>
-              <a:t>Discuss mission and component limitations</a:t>
-            </a:r>
-          </a:p>
-          <a:p>
-            <a:r>
-              <a:rPr lang="en-AU" dirty="0" smtClean="0"/>
-              <a:t>Demonstration of capability</a:t>
-            </a:r>
-          </a:p>
-          <a:p>
-            <a:endParaRPr lang="en-AU" dirty="0"/>
-          </a:p>
-          <a:p>
-            <a:r>
-              <a:rPr lang="en-AU" dirty="0" smtClean="0"/>
-              <a:t>Power</a:t>
-            </a:r>
-          </a:p>
-          <a:p>
-            <a:r>
-              <a:rPr lang="en-AU" dirty="0" smtClean="0"/>
-              <a:t>Size</a:t>
-            </a:r>
-          </a:p>
-          <a:p>
-            <a:r>
-              <a:rPr lang="en-AU" dirty="0" smtClean="0"/>
-              <a:t>Transmission (power)</a:t>
-            </a:r>
-            <a:endParaRPr lang="en-AU" dirty="0"/>
+            <a:endParaRPr lang="en-AU"/>
           </a:p>
         </p:txBody>
       </p:sp>
     </p:spTree>
     <p:extLst>
       <p:ext uri="{BB962C8B-B14F-4D97-AF65-F5344CB8AC3E}">
-        <p14:creationId xmlns:p14="http://schemas.microsoft.com/office/powerpoint/2010/main" val="4045029302"/>
+        <p14:creationId xmlns:p14="http://schemas.microsoft.com/office/powerpoint/2010/main" val="4036474924"/>
       </p:ext>
     </p:extLst>
   </p:cSld>
@@ -9431,7 +10576,40 @@
           <a:p>
             <a:r>
               <a:rPr lang="en-AU" dirty="0" smtClean="0"/>
-              <a:t>Design Schematic</a:t>
+              <a:t>Design Considerations</a:t>
+            </a:r>
+            <a:endParaRPr lang="en-AU" dirty="0"/>
+          </a:p>
+        </p:txBody>
+      </p:sp>
+      <p:sp>
+        <p:nvSpPr>
+          <p:cNvPr id="3" name="Content Placeholder 2"/>
+          <p:cNvSpPr>
+            <a:spLocks noGrp="1"/>
+          </p:cNvSpPr>
+          <p:nvPr>
+            <p:ph sz="half" idx="1"/>
+          </p:nvPr>
+        </p:nvSpPr>
+        <p:spPr/>
+        <p:txBody>
+          <a:bodyPr/>
+          <a:lstStyle/>
+          <a:p>
+            <a:r>
+              <a:rPr lang="en-AU" dirty="0" smtClean="0"/>
+              <a:t>(include picture of deployed solar panels also</a:t>
+            </a:r>
+            <a:r>
+              <a:rPr lang="en-AU" dirty="0" smtClean="0"/>
+              <a:t>?)</a:t>
+            </a:r>
+          </a:p>
+          <a:p>
+            <a:r>
+              <a:rPr lang="en-AU" dirty="0" smtClean="0"/>
+              <a:t>OSCAR?</a:t>
             </a:r>
             <a:endParaRPr lang="en-AU" dirty="0"/>
           </a:p>
@@ -9439,38 +10617,182 @@
       </p:sp>
       <p:pic>
         <p:nvPicPr>
-          <p:cNvPr id="4" name="Picture 3"/>
+          <p:cNvPr id="5" name="Content Placeholder 4"/>
           <p:cNvPicPr>
-            <a:picLocks noChangeAspect="1"/>
+            <a:picLocks noGrp="1" noChangeAspect="1"/>
           </p:cNvPicPr>
-          <p:nvPr/>
+          <p:nvPr>
+            <p:ph sz="half" idx="2"/>
+          </p:nvPr>
         </p:nvPicPr>
-        <p:blipFill>
-          <a:blip r:embed="rId2">
+        <p:blipFill rotWithShape="1">
+          <a:blip r:embed="rId3" cstate="print">
             <a:extLst>
               <a:ext uri="{28A0092B-C50C-407E-A947-70E740481C1C}">
                 <a14:useLocalDpi xmlns:a14="http://schemas.microsoft.com/office/drawing/2010/main" val="0"/>
               </a:ext>
             </a:extLst>
           </a:blip>
-          <a:stretch>
-            <a:fillRect/>
-          </a:stretch>
+          <a:srcRect l="30126" r="19902"/>
+          <a:stretch/>
         </p:blipFill>
         <p:spPr>
           <a:xfrm>
-            <a:off x="1120827" y="1219200"/>
-            <a:ext cx="4784007" cy="4737660"/>
+            <a:off x="4641668" y="1288869"/>
+            <a:ext cx="4190866" cy="4798422"/>
           </a:xfrm>
-          <a:prstGeom prst="rect">
-            <a:avLst/>
+          <a:prstGeom prst="roundRect">
+            <a:avLst>
+              <a:gd name="adj" fmla="val 2542"/>
+            </a:avLst>
           </a:prstGeom>
+          <a:solidFill>
+            <a:srgbClr val="FFFFFF">
+              <a:shade val="85000"/>
+            </a:srgbClr>
+          </a:solidFill>
+          <a:ln>
+            <a:noFill/>
+          </a:ln>
+          <a:effectLst/>
         </p:spPr>
       </p:pic>
+      <p:sp>
+        <p:nvSpPr>
+          <p:cNvPr id="6" name="Date Placeholder 3"/>
+          <p:cNvSpPr>
+            <a:spLocks noGrp="1"/>
+          </p:cNvSpPr>
+          <p:nvPr>
+            <p:ph type="dt" sz="half" idx="10"/>
+          </p:nvPr>
+        </p:nvSpPr>
+        <p:spPr>
+          <a:xfrm>
+            <a:off x="628650" y="6356351"/>
+            <a:ext cx="2057400" cy="365125"/>
+          </a:xfrm>
+        </p:spPr>
+        <p:txBody>
+          <a:bodyPr/>
+          <a:lstStyle>
+            <a:lvl1pPr>
+              <a:defRPr>
+                <a:solidFill>
+                  <a:schemeClr val="accent4">
+                    <a:lumMod val="75000"/>
+                  </a:schemeClr>
+                </a:solidFill>
+              </a:defRPr>
+            </a:lvl1pPr>
+          </a:lstStyle>
+          <a:p>
+            <a:r>
+              <a:rPr lang="en-AU" dirty="0" smtClean="0">
+                <a:latin typeface="+mj-lt"/>
+              </a:rPr>
+              <a:t>Tuesday 24 August 2015</a:t>
+            </a:r>
+            <a:endParaRPr lang="en-AU" dirty="0">
+              <a:latin typeface="+mj-lt"/>
+            </a:endParaRPr>
+          </a:p>
+        </p:txBody>
+      </p:sp>
+      <p:sp>
+        <p:nvSpPr>
+          <p:cNvPr id="7" name="Footer Placeholder 4"/>
+          <p:cNvSpPr>
+            <a:spLocks noGrp="1"/>
+          </p:cNvSpPr>
+          <p:nvPr>
+            <p:ph type="ftr" sz="quarter" idx="11"/>
+          </p:nvPr>
+        </p:nvSpPr>
+        <p:spPr>
+          <a:xfrm>
+            <a:off x="3028950" y="6356351"/>
+            <a:ext cx="3086100" cy="365125"/>
+          </a:xfrm>
+        </p:spPr>
+        <p:txBody>
+          <a:bodyPr/>
+          <a:lstStyle>
+            <a:lvl1pPr>
+              <a:defRPr lang="en-AU" sz="1200" kern="1200" dirty="0" smtClean="0">
+                <a:solidFill>
+                  <a:schemeClr val="accent4">
+                    <a:lumMod val="75000"/>
+                  </a:schemeClr>
+                </a:solidFill>
+                <a:latin typeface="+mn-lt"/>
+                <a:ea typeface="+mn-ea"/>
+                <a:cs typeface="+mn-cs"/>
+              </a:defRPr>
+            </a:lvl1pPr>
+          </a:lstStyle>
+          <a:p>
+            <a:r>
+              <a:rPr lang="en-AU" dirty="0" smtClean="0">
+                <a:latin typeface="+mj-lt"/>
+              </a:rPr>
+              <a:t>SnapSat Preliminary Design Presentation</a:t>
+            </a:r>
+            <a:endParaRPr lang="en-AU" dirty="0">
+              <a:latin typeface="+mj-lt"/>
+            </a:endParaRPr>
+          </a:p>
+        </p:txBody>
+      </p:sp>
+      <p:sp>
+        <p:nvSpPr>
+          <p:cNvPr id="8" name="Slide Number Placeholder 5"/>
+          <p:cNvSpPr>
+            <a:spLocks noGrp="1"/>
+          </p:cNvSpPr>
+          <p:nvPr>
+            <p:ph type="sldNum" sz="quarter" idx="12"/>
+          </p:nvPr>
+        </p:nvSpPr>
+        <p:spPr>
+          <a:xfrm>
+            <a:off x="6457950" y="6356351"/>
+            <a:ext cx="2057400" cy="365125"/>
+          </a:xfrm>
+        </p:spPr>
+        <p:txBody>
+          <a:bodyPr/>
+          <a:lstStyle>
+            <a:lvl1pPr>
+              <a:defRPr lang="en-AU" sz="1200" kern="1200" smtClean="0">
+                <a:solidFill>
+                  <a:schemeClr val="accent4">
+                    <a:lumMod val="75000"/>
+                  </a:schemeClr>
+                </a:solidFill>
+                <a:latin typeface="+mn-lt"/>
+                <a:ea typeface="+mn-ea"/>
+                <a:cs typeface="+mn-cs"/>
+              </a:defRPr>
+            </a:lvl1pPr>
+          </a:lstStyle>
+          <a:p>
+            <a:fld id="{6C5E801A-27FC-4E4C-A43C-DCD3D3677F04}" type="slidenum">
+              <a:rPr lang="en-AU" smtClean="0">
+                <a:latin typeface="+mj-lt"/>
+              </a:rPr>
+              <a:t>8</a:t>
+            </a:fld>
+            <a:endParaRPr lang="en-AU" dirty="0">
+              <a:latin typeface="+mj-lt"/>
+            </a:endParaRPr>
+          </a:p>
+        </p:txBody>
+      </p:sp>
     </p:spTree>
     <p:extLst>
       <p:ext uri="{BB962C8B-B14F-4D97-AF65-F5344CB8AC3E}">
-        <p14:creationId xmlns:p14="http://schemas.microsoft.com/office/powerpoint/2010/main" val="1382147126"/>
+        <p14:creationId xmlns:p14="http://schemas.microsoft.com/office/powerpoint/2010/main" val="1456499067"/>
       </p:ext>
     </p:extLst>
   </p:cSld>
@@ -9521,7 +10843,7 @@
           <a:p>
             <a:r>
               <a:rPr lang="en-AU" dirty="0" smtClean="0"/>
-              <a:t>Structural Design</a:t>
+              <a:t>Simulation</a:t>
             </a:r>
             <a:endParaRPr lang="en-AU" dirty="0"/>
           </a:p>
@@ -9529,12 +10851,12 @@
       </p:sp>
       <p:sp>
         <p:nvSpPr>
-          <p:cNvPr id="3" name="Text Placeholder 2"/>
-          <p:cNvSpPr>
-            <a:spLocks noGrp="1"/>
-          </p:cNvSpPr>
-          <p:nvPr>
-            <p:ph type="body" idx="1"/>
+          <p:cNvPr id="3" name="Content Placeholder 2"/>
+          <p:cNvSpPr>
+            <a:spLocks noGrp="1"/>
+          </p:cNvSpPr>
+          <p:nvPr>
+            <p:ph idx="1"/>
           </p:nvPr>
         </p:nvSpPr>
         <p:spPr/>
@@ -9549,20 +10871,13 @@
     </p:spTree>
     <p:extLst>
       <p:ext uri="{BB962C8B-B14F-4D97-AF65-F5344CB8AC3E}">
-        <p14:creationId xmlns:p14="http://schemas.microsoft.com/office/powerpoint/2010/main" val="4036474924"/>
+        <p14:creationId xmlns:p14="http://schemas.microsoft.com/office/powerpoint/2010/main" val="2685337617"/>
       </p:ext>
     </p:extLst>
   </p:cSld>
   <p:clrMapOvr>
     <a:masterClrMapping/>
   </p:clrMapOvr>
-  <p:timing>
-    <p:tnLst>
-      <p:par>
-        <p:cTn id="1" dur="indefinite" restart="never" nodeType="tmRoot"/>
-      </p:par>
-    </p:tnLst>
-  </p:timing>
 </p:sld>
 </file>
 

</xml_diff>